<commit_message>
Kontrol kartı yeni test planı eklendi.
</commit_message>
<xml_diff>
--- a/Simulation/dcbusmodelwrapup/immd_dcbusmodelwrapup.pptx
+++ b/Simulation/dcbusmodelwrapup/immd_dcbusmodelwrapup.pptx
@@ -6978,7 +6978,7 @@
         </p:nvCxnSpPr>
         <p:spPr>
           <a:xfrm>
-            <a:off x="5701333" y="2122715"/>
+            <a:off x="6934140" y="2122715"/>
             <a:ext cx="702129" cy="0"/>
           </a:xfrm>
           <a:prstGeom prst="line">
@@ -7171,7 +7171,7 @@
         <p:spPr>
           <a:xfrm>
             <a:off x="193846" y="3841388"/>
-            <a:ext cx="8721553" cy="2585323"/>
+            <a:ext cx="8721553" cy="2308324"/>
           </a:xfrm>
           <a:prstGeom prst="rect">
             <a:avLst/>
@@ -7188,13 +7188,85 @@
               <a:buChar char="•"/>
             </a:pPr>
             <a:r>
+              <a:rPr lang="tr-TR" b="1" dirty="0" smtClean="0">
+                <a:solidFill>
+                  <a:srgbClr val="002060"/>
+                </a:solidFill>
+                <a:cs typeface="Arial" panose="020B0604020202020204" pitchFamily="34" charset="0"/>
+              </a:rPr>
+              <a:t>Inner </a:t>
+            </a:r>
+            <a:r>
+              <a:rPr lang="tr-TR" b="1" dirty="0" err="1" smtClean="0">
+                <a:solidFill>
+                  <a:srgbClr val="002060"/>
+                </a:solidFill>
+                <a:cs typeface="Arial" panose="020B0604020202020204" pitchFamily="34" charset="0"/>
+              </a:rPr>
+              <a:t>power</a:t>
+            </a:r>
+            <a:r>
+              <a:rPr lang="tr-TR" b="1" dirty="0" smtClean="0">
+                <a:solidFill>
+                  <a:srgbClr val="002060"/>
+                </a:solidFill>
+                <a:cs typeface="Arial" panose="020B0604020202020204" pitchFamily="34" charset="0"/>
+              </a:rPr>
+              <a:t> </a:t>
+            </a:r>
+            <a:r>
+              <a:rPr lang="tr-TR" b="1" dirty="0" err="1" smtClean="0">
+                <a:solidFill>
+                  <a:srgbClr val="002060"/>
+                </a:solidFill>
+                <a:cs typeface="Arial" panose="020B0604020202020204" pitchFamily="34" charset="0"/>
+              </a:rPr>
+              <a:t>loop</a:t>
+            </a:r>
+            <a:r>
+              <a:rPr lang="tr-TR" b="1" dirty="0" smtClean="0">
+                <a:solidFill>
+                  <a:srgbClr val="002060"/>
+                </a:solidFill>
+                <a:cs typeface="Arial" panose="020B0604020202020204" pitchFamily="34" charset="0"/>
+              </a:rPr>
+              <a:t> </a:t>
+            </a:r>
+            <a:r>
+              <a:rPr lang="tr-TR" dirty="0" err="1" smtClean="0">
+                <a:solidFill>
+                  <a:srgbClr val="002060"/>
+                </a:solidFill>
+                <a:cs typeface="Arial" panose="020B0604020202020204" pitchFamily="34" charset="0"/>
+              </a:rPr>
+              <a:t>consists</a:t>
+            </a:r>
+            <a:r>
               <a:rPr lang="tr-TR" dirty="0" smtClean="0">
                 <a:solidFill>
                   <a:srgbClr val="002060"/>
                 </a:solidFill>
                 <a:cs typeface="Arial" panose="020B0604020202020204" pitchFamily="34" charset="0"/>
               </a:rPr>
-              <a:t>Inner </a:t>
+              <a:t> of </a:t>
+            </a:r>
+            <a:r>
+              <a:rPr lang="tr-TR" b="1" dirty="0" err="1" smtClean="0">
+                <a:solidFill>
+                  <a:srgbClr val="002060"/>
+                </a:solidFill>
+                <a:cs typeface="Arial" panose="020B0604020202020204" pitchFamily="34" charset="0"/>
+              </a:rPr>
+              <a:t>seramic</a:t>
+            </a:r>
+            <a:r>
+              <a:rPr lang="tr-TR" dirty="0" smtClean="0">
+                <a:solidFill>
+                  <a:srgbClr val="002060"/>
+                </a:solidFill>
+                <a:cs typeface="Arial" panose="020B0604020202020204" pitchFamily="34" charset="0"/>
+              </a:rPr>
+              <a:t> </a:t>
             </a:r>
             <a:r>
               <a:rPr lang="tr-TR" dirty="0" err="1" smtClean="0">
@@ -7203,7 +7275,7 @@
                 </a:solidFill>
                 <a:cs typeface="Arial" panose="020B0604020202020204" pitchFamily="34" charset="0"/>
               </a:rPr>
-              <a:t>power</a:t>
+              <a:t>capacitors</a:t>
             </a:r>
             <a:r>
               <a:rPr lang="tr-TR" dirty="0" smtClean="0">
@@ -7221,7 +7293,7 @@
                 </a:solidFill>
                 <a:cs typeface="Arial" panose="020B0604020202020204" pitchFamily="34" charset="0"/>
               </a:rPr>
-              <a:t>loop</a:t>
+              <a:t>and</a:t>
             </a:r>
             <a:r>
               <a:rPr lang="tr-TR" dirty="0" smtClean="0">
@@ -7239,7 +7311,7 @@
                 </a:solidFill>
                 <a:cs typeface="Arial" panose="020B0604020202020204" pitchFamily="34" charset="0"/>
               </a:rPr>
-              <a:t>consists</a:t>
+              <a:t>handles</a:t>
             </a:r>
             <a:r>
               <a:rPr lang="tr-TR" dirty="0" smtClean="0">
@@ -7248,16 +7320,133 @@
                 </a:solidFill>
                 <a:cs typeface="Arial" panose="020B0604020202020204" pitchFamily="34" charset="0"/>
               </a:rPr>
+              <a:t> </a:t>
+            </a:r>
+            <a:r>
+              <a:rPr lang="tr-TR" dirty="0" err="1" smtClean="0">
+                <a:solidFill>
+                  <a:srgbClr val="002060"/>
+                </a:solidFill>
+                <a:cs typeface="Arial" panose="020B0604020202020204" pitchFamily="34" charset="0"/>
+              </a:rPr>
+              <a:t>the</a:t>
+            </a:r>
+            <a:r>
+              <a:rPr lang="tr-TR" dirty="0" smtClean="0">
+                <a:solidFill>
+                  <a:srgbClr val="002060"/>
+                </a:solidFill>
+                <a:cs typeface="Arial" panose="020B0604020202020204" pitchFamily="34" charset="0"/>
+              </a:rPr>
+              <a:t> </a:t>
+            </a:r>
+            <a:r>
+              <a:rPr lang="tr-TR" b="1" dirty="0" err="1" smtClean="0">
+                <a:solidFill>
+                  <a:srgbClr val="002060"/>
+                </a:solidFill>
+                <a:cs typeface="Arial" panose="020B0604020202020204" pitchFamily="34" charset="0"/>
+              </a:rPr>
+              <a:t>switching</a:t>
+            </a:r>
+            <a:r>
+              <a:rPr lang="tr-TR" b="1" dirty="0" smtClean="0">
+                <a:solidFill>
+                  <a:srgbClr val="002060"/>
+                </a:solidFill>
+                <a:cs typeface="Arial" panose="020B0604020202020204" pitchFamily="34" charset="0"/>
+              </a:rPr>
+              <a:t> </a:t>
+            </a:r>
+            <a:r>
+              <a:rPr lang="tr-TR" b="1" dirty="0" err="1" smtClean="0">
+                <a:solidFill>
+                  <a:srgbClr val="002060"/>
+                </a:solidFill>
+                <a:cs typeface="Arial" panose="020B0604020202020204" pitchFamily="34" charset="0"/>
+              </a:rPr>
+              <a:t>oscillation</a:t>
+            </a:r>
+            <a:r>
+              <a:rPr lang="tr-TR" b="1" dirty="0" smtClean="0">
+                <a:solidFill>
+                  <a:srgbClr val="002060"/>
+                </a:solidFill>
+                <a:cs typeface="Arial" panose="020B0604020202020204" pitchFamily="34" charset="0"/>
+              </a:rPr>
+              <a:t> </a:t>
+            </a:r>
+            <a:r>
+              <a:rPr lang="tr-TR" dirty="0" smtClean="0">
+                <a:solidFill>
+                  <a:srgbClr val="002060"/>
+                </a:solidFill>
+                <a:cs typeface="Arial" panose="020B0604020202020204" pitchFamily="34" charset="0"/>
+              </a:rPr>
+              <a:t>(in </a:t>
+            </a:r>
+            <a:r>
+              <a:rPr lang="tr-TR" dirty="0" err="1" smtClean="0">
+                <a:solidFill>
+                  <a:srgbClr val="002060"/>
+                </a:solidFill>
+                <a:cs typeface="Arial" panose="020B0604020202020204" pitchFamily="34" charset="0"/>
+              </a:rPr>
+              <a:t>the</a:t>
+            </a:r>
+            <a:r>
+              <a:rPr lang="tr-TR" dirty="0" smtClean="0">
+                <a:solidFill>
+                  <a:srgbClr val="002060"/>
+                </a:solidFill>
+                <a:cs typeface="Arial" panose="020B0604020202020204" pitchFamily="34" charset="0"/>
+              </a:rPr>
+              <a:t> </a:t>
+            </a:r>
+            <a:r>
+              <a:rPr lang="tr-TR" dirty="0" err="1" smtClean="0">
+                <a:solidFill>
+                  <a:srgbClr val="002060"/>
+                </a:solidFill>
+                <a:cs typeface="Arial" panose="020B0604020202020204" pitchFamily="34" charset="0"/>
+              </a:rPr>
+              <a:t>order</a:t>
+            </a:r>
+            <a:r>
+              <a:rPr lang="tr-TR" dirty="0" smtClean="0">
+                <a:solidFill>
+                  <a:srgbClr val="002060"/>
+                </a:solidFill>
+                <a:cs typeface="Arial" panose="020B0604020202020204" pitchFamily="34" charset="0"/>
+              </a:rPr>
               <a:t> of </a:t>
             </a:r>
             <a:r>
+              <a:rPr lang="tr-TR" b="1" dirty="0" smtClean="0">
+                <a:solidFill>
+                  <a:srgbClr val="002060"/>
+                </a:solidFill>
+                <a:cs typeface="Arial" panose="020B0604020202020204" pitchFamily="34" charset="0"/>
+              </a:rPr>
+              <a:t>100MHz</a:t>
+            </a:r>
+            <a:r>
+              <a:rPr lang="tr-TR" dirty="0" smtClean="0">
+                <a:solidFill>
+                  <a:srgbClr val="002060"/>
+                </a:solidFill>
+                <a:cs typeface="Arial" panose="020B0604020202020204" pitchFamily="34" charset="0"/>
+              </a:rPr>
+              <a:t>). </a:t>
+            </a:r>
+            <a:r>
               <a:rPr lang="tr-TR" dirty="0" err="1" smtClean="0">
                 <a:solidFill>
                   <a:srgbClr val="002060"/>
                 </a:solidFill>
                 <a:cs typeface="Arial" panose="020B0604020202020204" pitchFamily="34" charset="0"/>
               </a:rPr>
-              <a:t>seramic</a:t>
+              <a:t>It</a:t>
             </a:r>
             <a:r>
               <a:rPr lang="tr-TR" dirty="0" smtClean="0">
@@ -7266,7 +7455,7 @@
                 </a:solidFill>
                 <a:cs typeface="Arial" panose="020B0604020202020204" pitchFamily="34" charset="0"/>
               </a:rPr>
-              <a:t> </a:t>
+              <a:t> is </a:t>
             </a:r>
             <a:r>
               <a:rPr lang="tr-TR" dirty="0" err="1" smtClean="0">
@@ -7275,7 +7464,7 @@
                 </a:solidFill>
                 <a:cs typeface="Arial" panose="020B0604020202020204" pitchFamily="34" charset="0"/>
               </a:rPr>
-              <a:t>capacitors</a:t>
+              <a:t>directly</a:t>
             </a:r>
             <a:r>
               <a:rPr lang="tr-TR" dirty="0" smtClean="0">
@@ -7293,7 +7482,7 @@
                 </a:solidFill>
                 <a:cs typeface="Arial" panose="020B0604020202020204" pitchFamily="34" charset="0"/>
               </a:rPr>
-              <a:t>and</a:t>
+              <a:t>related</a:t>
             </a:r>
             <a:r>
               <a:rPr lang="tr-TR" dirty="0" smtClean="0">
@@ -7311,7 +7500,7 @@
                 </a:solidFill>
                 <a:cs typeface="Arial" panose="020B0604020202020204" pitchFamily="34" charset="0"/>
               </a:rPr>
-              <a:t>handles</a:t>
+              <a:t>to</a:t>
             </a:r>
             <a:r>
               <a:rPr lang="tr-TR" dirty="0" smtClean="0">
@@ -7347,7 +7536,7 @@
                 </a:solidFill>
                 <a:cs typeface="Arial" panose="020B0604020202020204" pitchFamily="34" charset="0"/>
               </a:rPr>
-              <a:t>switching</a:t>
+              <a:t>device</a:t>
             </a:r>
             <a:r>
               <a:rPr lang="tr-TR" dirty="0" smtClean="0">
@@ -7365,7 +7554,7 @@
                 </a:solidFill>
                 <a:cs typeface="Arial" panose="020B0604020202020204" pitchFamily="34" charset="0"/>
               </a:rPr>
-              <a:t>oscillation</a:t>
+              <a:t>Vds</a:t>
             </a:r>
             <a:r>
               <a:rPr lang="tr-TR" dirty="0" smtClean="0">
@@ -7374,7 +7563,7 @@
                 </a:solidFill>
                 <a:cs typeface="Arial" panose="020B0604020202020204" pitchFamily="34" charset="0"/>
               </a:rPr>
-              <a:t> (in </a:t>
+              <a:t> </a:t>
             </a:r>
             <a:r>
               <a:rPr lang="tr-TR" dirty="0" err="1" smtClean="0">
@@ -7383,7 +7572,16 @@
                 </a:solidFill>
                 <a:cs typeface="Arial" panose="020B0604020202020204" pitchFamily="34" charset="0"/>
               </a:rPr>
-              <a:t>the</a:t>
+              <a:t>breakdown</a:t>
+            </a:r>
+            <a:r>
+              <a:rPr lang="tr-TR" dirty="0">
+                <a:solidFill>
+                  <a:srgbClr val="002060"/>
+                </a:solidFill>
+                <a:cs typeface="Arial" panose="020B0604020202020204" pitchFamily="34" charset="0"/>
+              </a:rPr>
+              <a:t> </a:t>
             </a:r>
             <a:r>
               <a:rPr lang="tr-TR" dirty="0" smtClean="0">
@@ -7392,7 +7590,7 @@
                 </a:solidFill>
                 <a:cs typeface="Arial" panose="020B0604020202020204" pitchFamily="34" charset="0"/>
               </a:rPr>
-              <a:t> </a:t>
+              <a:t>(</a:t>
             </a:r>
             <a:r>
               <a:rPr lang="tr-TR" dirty="0" err="1" smtClean="0">
@@ -7401,7 +7599,7 @@
                 </a:solidFill>
                 <a:cs typeface="Arial" panose="020B0604020202020204" pitchFamily="34" charset="0"/>
               </a:rPr>
-              <a:t>order</a:t>
+              <a:t>out</a:t>
             </a:r>
             <a:r>
               <a:rPr lang="tr-TR" dirty="0" smtClean="0">
@@ -7410,7 +7608,7 @@
                 </a:solidFill>
                 <a:cs typeface="Arial" panose="020B0604020202020204" pitchFamily="34" charset="0"/>
               </a:rPr>
-              <a:t> of 100MHz). </a:t>
+              <a:t> of </a:t>
             </a:r>
             <a:r>
               <a:rPr lang="tr-TR" dirty="0" err="1" smtClean="0">
@@ -7419,7 +7617,7 @@
                 </a:solidFill>
                 <a:cs typeface="Arial" panose="020B0604020202020204" pitchFamily="34" charset="0"/>
               </a:rPr>
-              <a:t>It</a:t>
+              <a:t>scope</a:t>
             </a:r>
             <a:r>
               <a:rPr lang="tr-TR" dirty="0" smtClean="0">
@@ -7428,134 +7626,14 @@
                 </a:solidFill>
                 <a:cs typeface="Arial" panose="020B0604020202020204" pitchFamily="34" charset="0"/>
               </a:rPr>
-              <a:t> is </a:t>
-            </a:r>
-            <a:r>
-              <a:rPr lang="tr-TR" dirty="0" err="1" smtClean="0">
-                <a:solidFill>
-                  <a:srgbClr val="002060"/>
-                </a:solidFill>
-                <a:cs typeface="Arial" panose="020B0604020202020204" pitchFamily="34" charset="0"/>
-              </a:rPr>
-              <a:t>directly</a:t>
-            </a:r>
-            <a:r>
-              <a:rPr lang="tr-TR" dirty="0" smtClean="0">
-                <a:solidFill>
-                  <a:srgbClr val="002060"/>
-                </a:solidFill>
-                <a:cs typeface="Arial" panose="020B0604020202020204" pitchFamily="34" charset="0"/>
-              </a:rPr>
-              <a:t> </a:t>
-            </a:r>
-            <a:r>
-              <a:rPr lang="tr-TR" dirty="0" err="1" smtClean="0">
-                <a:solidFill>
-                  <a:srgbClr val="002060"/>
-                </a:solidFill>
-                <a:cs typeface="Arial" panose="020B0604020202020204" pitchFamily="34" charset="0"/>
-              </a:rPr>
-              <a:t>related</a:t>
-            </a:r>
-            <a:r>
-              <a:rPr lang="tr-TR" dirty="0" smtClean="0">
-                <a:solidFill>
-                  <a:srgbClr val="002060"/>
-                </a:solidFill>
-                <a:cs typeface="Arial" panose="020B0604020202020204" pitchFamily="34" charset="0"/>
-              </a:rPr>
-              <a:t> </a:t>
-            </a:r>
-            <a:r>
-              <a:rPr lang="tr-TR" dirty="0" err="1" smtClean="0">
-                <a:solidFill>
-                  <a:srgbClr val="002060"/>
-                </a:solidFill>
-                <a:cs typeface="Arial" panose="020B0604020202020204" pitchFamily="34" charset="0"/>
-              </a:rPr>
-              <a:t>to</a:t>
-            </a:r>
-            <a:r>
-              <a:rPr lang="tr-TR" dirty="0" smtClean="0">
-                <a:solidFill>
-                  <a:srgbClr val="002060"/>
-                </a:solidFill>
-                <a:cs typeface="Arial" panose="020B0604020202020204" pitchFamily="34" charset="0"/>
-              </a:rPr>
-              <a:t> </a:t>
-            </a:r>
-            <a:r>
-              <a:rPr lang="tr-TR" dirty="0" err="1" smtClean="0">
-                <a:solidFill>
-                  <a:srgbClr val="002060"/>
-                </a:solidFill>
-                <a:cs typeface="Arial" panose="020B0604020202020204" pitchFamily="34" charset="0"/>
-              </a:rPr>
-              <a:t>the</a:t>
-            </a:r>
-            <a:r>
-              <a:rPr lang="tr-TR" dirty="0" smtClean="0">
-                <a:solidFill>
-                  <a:srgbClr val="002060"/>
-                </a:solidFill>
-                <a:cs typeface="Arial" panose="020B0604020202020204" pitchFamily="34" charset="0"/>
-              </a:rPr>
-              <a:t> </a:t>
-            </a:r>
-            <a:r>
-              <a:rPr lang="tr-TR" dirty="0" err="1" smtClean="0">
-                <a:solidFill>
-                  <a:srgbClr val="002060"/>
-                </a:solidFill>
-                <a:cs typeface="Arial" panose="020B0604020202020204" pitchFamily="34" charset="0"/>
-              </a:rPr>
-              <a:t>device</a:t>
-            </a:r>
-            <a:r>
-              <a:rPr lang="tr-TR" dirty="0" smtClean="0">
-                <a:solidFill>
-                  <a:srgbClr val="002060"/>
-                </a:solidFill>
-                <a:cs typeface="Arial" panose="020B0604020202020204" pitchFamily="34" charset="0"/>
-              </a:rPr>
-              <a:t> </a:t>
-            </a:r>
-            <a:r>
-              <a:rPr lang="tr-TR" dirty="0" err="1" smtClean="0">
-                <a:solidFill>
-                  <a:srgbClr val="002060"/>
-                </a:solidFill>
-                <a:cs typeface="Arial" panose="020B0604020202020204" pitchFamily="34" charset="0"/>
-              </a:rPr>
-              <a:t>Vds</a:t>
-            </a:r>
-            <a:r>
-              <a:rPr lang="tr-TR" dirty="0" smtClean="0">
-                <a:solidFill>
-                  <a:srgbClr val="002060"/>
-                </a:solidFill>
-                <a:cs typeface="Arial" panose="020B0604020202020204" pitchFamily="34" charset="0"/>
-              </a:rPr>
-              <a:t> </a:t>
-            </a:r>
-            <a:r>
-              <a:rPr lang="tr-TR" dirty="0" err="1" smtClean="0">
-                <a:solidFill>
-                  <a:srgbClr val="002060"/>
-                </a:solidFill>
-                <a:cs typeface="Arial" panose="020B0604020202020204" pitchFamily="34" charset="0"/>
-              </a:rPr>
-              <a:t>breakdown</a:t>
-            </a:r>
-            <a:r>
-              <a:rPr lang="tr-TR" dirty="0" smtClean="0">
-                <a:solidFill>
-                  <a:srgbClr val="002060"/>
-                </a:solidFill>
-                <a:cs typeface="Arial" panose="020B0604020202020204" pitchFamily="34" charset="0"/>
-              </a:rPr>
-              <a:t>.</a:t>
-            </a:r>
+              <a:t>).</a:t>
+            </a:r>
+            <a:endParaRPr lang="tr-TR" dirty="0" smtClean="0">
+              <a:solidFill>
+                <a:srgbClr val="002060"/>
+              </a:solidFill>
+              <a:cs typeface="Arial" panose="020B0604020202020204" pitchFamily="34" charset="0"/>
+            </a:endParaRPr>
           </a:p>
           <a:p>
             <a:pPr marL="285750" indent="-285750">
@@ -7563,13 +7641,67 @@
               <a:buChar char="•"/>
             </a:pPr>
             <a:r>
+              <a:rPr lang="tr-TR" b="1" dirty="0" smtClean="0">
+                <a:solidFill>
+                  <a:srgbClr val="002060"/>
+                </a:solidFill>
+                <a:cs typeface="Arial" panose="020B0604020202020204" pitchFamily="34" charset="0"/>
+              </a:rPr>
+              <a:t>Outer </a:t>
+            </a:r>
+            <a:r>
+              <a:rPr lang="tr-TR" b="1" dirty="0" err="1" smtClean="0">
+                <a:solidFill>
+                  <a:srgbClr val="002060"/>
+                </a:solidFill>
+                <a:cs typeface="Arial" panose="020B0604020202020204" pitchFamily="34" charset="0"/>
+              </a:rPr>
+              <a:t>power</a:t>
+            </a:r>
+            <a:r>
+              <a:rPr lang="tr-TR" b="1" dirty="0" smtClean="0">
+                <a:solidFill>
+                  <a:srgbClr val="002060"/>
+                </a:solidFill>
+                <a:cs typeface="Arial" panose="020B0604020202020204" pitchFamily="34" charset="0"/>
+              </a:rPr>
+              <a:t> </a:t>
+            </a:r>
+            <a:r>
+              <a:rPr lang="tr-TR" b="1" dirty="0" err="1" smtClean="0">
+                <a:solidFill>
+                  <a:srgbClr val="002060"/>
+                </a:solidFill>
+                <a:cs typeface="Arial" panose="020B0604020202020204" pitchFamily="34" charset="0"/>
+              </a:rPr>
+              <a:t>loop</a:t>
+            </a:r>
+            <a:r>
+              <a:rPr lang="tr-TR" b="1" dirty="0" smtClean="0">
+                <a:solidFill>
+                  <a:srgbClr val="002060"/>
+                </a:solidFill>
+                <a:cs typeface="Arial" panose="020B0604020202020204" pitchFamily="34" charset="0"/>
+              </a:rPr>
+              <a:t> </a:t>
+            </a:r>
+            <a:r>
+              <a:rPr lang="tr-TR" dirty="0" err="1" smtClean="0">
+                <a:solidFill>
+                  <a:srgbClr val="002060"/>
+                </a:solidFill>
+                <a:cs typeface="Arial" panose="020B0604020202020204" pitchFamily="34" charset="0"/>
+              </a:rPr>
+              <a:t>consists</a:t>
+            </a:r>
+            <a:r>
               <a:rPr lang="tr-TR" dirty="0" smtClean="0">
                 <a:solidFill>
                   <a:srgbClr val="002060"/>
                 </a:solidFill>
                 <a:cs typeface="Arial" panose="020B0604020202020204" pitchFamily="34" charset="0"/>
               </a:rPr>
-              <a:t>Outer </a:t>
+              <a:t> of </a:t>
             </a:r>
             <a:r>
               <a:rPr lang="tr-TR" dirty="0" err="1" smtClean="0">
@@ -7578,7 +7710,7 @@
                 </a:solidFill>
                 <a:cs typeface="Arial" panose="020B0604020202020204" pitchFamily="34" charset="0"/>
               </a:rPr>
-              <a:t>power</a:t>
+              <a:t>the</a:t>
             </a:r>
             <a:r>
               <a:rPr lang="tr-TR" dirty="0" smtClean="0">
@@ -7596,6 +7728,132 @@
                 </a:solidFill>
                 <a:cs typeface="Arial" panose="020B0604020202020204" pitchFamily="34" charset="0"/>
               </a:rPr>
+              <a:t>large</a:t>
+            </a:r>
+            <a:r>
+              <a:rPr lang="tr-TR" dirty="0" smtClean="0">
+                <a:solidFill>
+                  <a:srgbClr val="002060"/>
+                </a:solidFill>
+                <a:cs typeface="Arial" panose="020B0604020202020204" pitchFamily="34" charset="0"/>
+              </a:rPr>
+              <a:t> </a:t>
+            </a:r>
+            <a:r>
+              <a:rPr lang="tr-TR" b="1" dirty="0" smtClean="0">
+                <a:solidFill>
+                  <a:srgbClr val="002060"/>
+                </a:solidFill>
+                <a:cs typeface="Arial" panose="020B0604020202020204" pitchFamily="34" charset="0"/>
+              </a:rPr>
+              <a:t>film</a:t>
+            </a:r>
+            <a:r>
+              <a:rPr lang="tr-TR" dirty="0" smtClean="0">
+                <a:solidFill>
+                  <a:srgbClr val="002060"/>
+                </a:solidFill>
+                <a:cs typeface="Arial" panose="020B0604020202020204" pitchFamily="34" charset="0"/>
+              </a:rPr>
+              <a:t> </a:t>
+            </a:r>
+            <a:r>
+              <a:rPr lang="tr-TR" dirty="0" err="1" smtClean="0">
+                <a:solidFill>
+                  <a:srgbClr val="002060"/>
+                </a:solidFill>
+                <a:cs typeface="Arial" panose="020B0604020202020204" pitchFamily="34" charset="0"/>
+              </a:rPr>
+              <a:t>capacitor</a:t>
+            </a:r>
+            <a:r>
+              <a:rPr lang="tr-TR" dirty="0" smtClean="0">
+                <a:solidFill>
+                  <a:srgbClr val="002060"/>
+                </a:solidFill>
+                <a:cs typeface="Arial" panose="020B0604020202020204" pitchFamily="34" charset="0"/>
+              </a:rPr>
+              <a:t> (5 </a:t>
+            </a:r>
+            <a:r>
+              <a:rPr lang="tr-TR" dirty="0" err="1" smtClean="0">
+                <a:solidFill>
+                  <a:srgbClr val="002060"/>
+                </a:solidFill>
+                <a:cs typeface="Arial" panose="020B0604020202020204" pitchFamily="34" charset="0"/>
+              </a:rPr>
+              <a:t>uF</a:t>
+            </a:r>
+            <a:r>
+              <a:rPr lang="tr-TR" dirty="0" smtClean="0">
+                <a:solidFill>
+                  <a:srgbClr val="002060"/>
+                </a:solidFill>
+                <a:cs typeface="Arial" panose="020B0604020202020204" pitchFamily="34" charset="0"/>
+              </a:rPr>
+              <a:t> </a:t>
+            </a:r>
+            <a:r>
+              <a:rPr lang="tr-TR" dirty="0" err="1" smtClean="0">
+                <a:solidFill>
+                  <a:srgbClr val="002060"/>
+                </a:solidFill>
+                <a:cs typeface="Arial" panose="020B0604020202020204" pitchFamily="34" charset="0"/>
+              </a:rPr>
+              <a:t>each</a:t>
+            </a:r>
+            <a:r>
+              <a:rPr lang="tr-TR" dirty="0" smtClean="0">
+                <a:solidFill>
+                  <a:srgbClr val="002060"/>
+                </a:solidFill>
+                <a:cs typeface="Arial" panose="020B0604020202020204" pitchFamily="34" charset="0"/>
+              </a:rPr>
+              <a:t>). </a:t>
+            </a:r>
+            <a:r>
+              <a:rPr lang="tr-TR" dirty="0" err="1" smtClean="0">
+                <a:solidFill>
+                  <a:srgbClr val="002060"/>
+                </a:solidFill>
+                <a:cs typeface="Arial" panose="020B0604020202020204" pitchFamily="34" charset="0"/>
+              </a:rPr>
+              <a:t>It</a:t>
+            </a:r>
+            <a:r>
+              <a:rPr lang="tr-TR" dirty="0" smtClean="0">
+                <a:solidFill>
+                  <a:srgbClr val="002060"/>
+                </a:solidFill>
+                <a:cs typeface="Arial" panose="020B0604020202020204" pitchFamily="34" charset="0"/>
+              </a:rPr>
+              <a:t> is </a:t>
+            </a:r>
+            <a:r>
+              <a:rPr lang="tr-TR" dirty="0" err="1" smtClean="0">
+                <a:solidFill>
+                  <a:srgbClr val="002060"/>
+                </a:solidFill>
+                <a:cs typeface="Arial" panose="020B0604020202020204" pitchFamily="34" charset="0"/>
+              </a:rPr>
+              <a:t>the</a:t>
+            </a:r>
+            <a:r>
+              <a:rPr lang="tr-TR" dirty="0" smtClean="0">
+                <a:solidFill>
+                  <a:srgbClr val="002060"/>
+                </a:solidFill>
+                <a:cs typeface="Arial" panose="020B0604020202020204" pitchFamily="34" charset="0"/>
+              </a:rPr>
+              <a:t> </a:t>
+            </a:r>
+            <a:r>
+              <a:rPr lang="tr-TR" dirty="0" err="1" smtClean="0">
+                <a:solidFill>
+                  <a:srgbClr val="002060"/>
+                </a:solidFill>
+                <a:cs typeface="Arial" panose="020B0604020202020204" pitchFamily="34" charset="0"/>
+              </a:rPr>
               <a:t>loop</a:t>
             </a:r>
             <a:r>
@@ -7614,7 +7872,7 @@
                 </a:solidFill>
                 <a:cs typeface="Arial" panose="020B0604020202020204" pitchFamily="34" charset="0"/>
               </a:rPr>
-              <a:t>consists</a:t>
+              <a:t>where</a:t>
             </a:r>
             <a:r>
               <a:rPr lang="tr-TR" dirty="0" smtClean="0">
@@ -7623,7 +7881,7 @@
                 </a:solidFill>
                 <a:cs typeface="Arial" panose="020B0604020202020204" pitchFamily="34" charset="0"/>
               </a:rPr>
-              <a:t> of </a:t>
+              <a:t> </a:t>
             </a:r>
             <a:r>
               <a:rPr lang="tr-TR" dirty="0" err="1" smtClean="0">
@@ -7644,13 +7902,58 @@
               <a:t> </a:t>
             </a:r>
             <a:r>
+              <a:rPr lang="tr-TR" b="1" dirty="0" err="1" smtClean="0">
+                <a:solidFill>
+                  <a:srgbClr val="002060"/>
+                </a:solidFill>
+                <a:cs typeface="Arial" panose="020B0604020202020204" pitchFamily="34" charset="0"/>
+              </a:rPr>
+              <a:t>switching</a:t>
+            </a:r>
+            <a:r>
+              <a:rPr lang="tr-TR" b="1" dirty="0" smtClean="0">
+                <a:solidFill>
+                  <a:srgbClr val="002060"/>
+                </a:solidFill>
+                <a:cs typeface="Arial" panose="020B0604020202020204" pitchFamily="34" charset="0"/>
+              </a:rPr>
+              <a:t> </a:t>
+            </a:r>
+            <a:r>
+              <a:rPr lang="tr-TR" b="1" dirty="0" err="1" smtClean="0">
+                <a:solidFill>
+                  <a:srgbClr val="002060"/>
+                </a:solidFill>
+                <a:cs typeface="Arial" panose="020B0604020202020204" pitchFamily="34" charset="0"/>
+              </a:rPr>
+              <a:t>harmonics</a:t>
+            </a:r>
+            <a:r>
+              <a:rPr lang="tr-TR" b="1" dirty="0" smtClean="0">
+                <a:solidFill>
+                  <a:srgbClr val="002060"/>
+                </a:solidFill>
+                <a:cs typeface="Arial" panose="020B0604020202020204" pitchFamily="34" charset="0"/>
+              </a:rPr>
+              <a:t> </a:t>
+            </a:r>
+            <a:r>
+              <a:rPr lang="tr-TR" dirty="0" smtClean="0">
+                <a:solidFill>
+                  <a:srgbClr val="002060"/>
+                </a:solidFill>
+                <a:cs typeface="Arial" panose="020B0604020202020204" pitchFamily="34" charset="0"/>
+              </a:rPr>
+              <a:t>(</a:t>
+            </a:r>
+            <a:r>
               <a:rPr lang="tr-TR" dirty="0" err="1" smtClean="0">
                 <a:solidFill>
                   <a:srgbClr val="002060"/>
                 </a:solidFill>
                 <a:cs typeface="Arial" panose="020B0604020202020204" pitchFamily="34" charset="0"/>
               </a:rPr>
-              <a:t>large</a:t>
+              <a:t>components</a:t>
             </a:r>
             <a:r>
               <a:rPr lang="tr-TR" dirty="0" smtClean="0">
@@ -7659,7 +7962,34 @@
                 </a:solidFill>
                 <a:cs typeface="Arial" panose="020B0604020202020204" pitchFamily="34" charset="0"/>
               </a:rPr>
-              <a:t> film </a:t>
+              <a:t> </a:t>
+            </a:r>
+            <a:r>
+              <a:rPr lang="tr-TR" dirty="0" smtClean="0">
+                <a:solidFill>
+                  <a:srgbClr val="002060"/>
+                </a:solidFill>
+                <a:cs typeface="Arial" panose="020B0604020202020204" pitchFamily="34" charset="0"/>
+              </a:rPr>
+              <a:t>of </a:t>
+            </a:r>
+            <a:r>
+              <a:rPr lang="tr-TR" b="1" dirty="0" err="1" smtClean="0">
+                <a:solidFill>
+                  <a:srgbClr val="002060"/>
+                </a:solidFill>
+                <a:cs typeface="Arial" panose="020B0604020202020204" pitchFamily="34" charset="0"/>
+              </a:rPr>
+              <a:t>Idc</a:t>
+            </a:r>
+            <a:r>
+              <a:rPr lang="tr-TR" dirty="0" smtClean="0">
+                <a:solidFill>
+                  <a:srgbClr val="002060"/>
+                </a:solidFill>
+                <a:cs typeface="Arial" panose="020B0604020202020204" pitchFamily="34" charset="0"/>
+              </a:rPr>
+              <a:t>) </a:t>
             </a:r>
             <a:r>
               <a:rPr lang="tr-TR" dirty="0" err="1" smtClean="0">
@@ -7668,7 +7998,7 @@
                 </a:solidFill>
                 <a:cs typeface="Arial" panose="020B0604020202020204" pitchFamily="34" charset="0"/>
               </a:rPr>
-              <a:t>capacitor</a:t>
+              <a:t>flow</a:t>
             </a:r>
             <a:r>
               <a:rPr lang="tr-TR" dirty="0" smtClean="0">
@@ -7677,7 +8007,7 @@
                 </a:solidFill>
                 <a:cs typeface="Arial" panose="020B0604020202020204" pitchFamily="34" charset="0"/>
               </a:rPr>
-              <a:t> (5 </a:t>
+              <a:t>, </a:t>
             </a:r>
             <a:r>
               <a:rPr lang="tr-TR" dirty="0" err="1" smtClean="0">
@@ -7686,7 +8016,7 @@
                 </a:solidFill>
                 <a:cs typeface="Arial" panose="020B0604020202020204" pitchFamily="34" charset="0"/>
               </a:rPr>
-              <a:t>uF</a:t>
+              <a:t>which</a:t>
             </a:r>
             <a:r>
               <a:rPr lang="tr-TR" dirty="0" smtClean="0">
@@ -7695,7 +8025,7 @@
                 </a:solidFill>
                 <a:cs typeface="Arial" panose="020B0604020202020204" pitchFamily="34" charset="0"/>
               </a:rPr>
-              <a:t> </a:t>
+              <a:t> is </a:t>
             </a:r>
             <a:r>
               <a:rPr lang="tr-TR" dirty="0" err="1" smtClean="0">
@@ -7704,7 +8034,7 @@
                 </a:solidFill>
                 <a:cs typeface="Arial" panose="020B0604020202020204" pitchFamily="34" charset="0"/>
               </a:rPr>
-              <a:t>each</a:t>
+              <a:t>our</a:t>
             </a:r>
             <a:r>
               <a:rPr lang="tr-TR" dirty="0" smtClean="0">
@@ -7713,7 +8043,7 @@
                 </a:solidFill>
                 <a:cs typeface="Arial" panose="020B0604020202020204" pitchFamily="34" charset="0"/>
               </a:rPr>
-              <a:t>). </a:t>
+              <a:t> </a:t>
             </a:r>
             <a:r>
               <a:rPr lang="tr-TR" dirty="0" err="1" smtClean="0">
@@ -7722,7 +8052,7 @@
                 </a:solidFill>
                 <a:cs typeface="Arial" panose="020B0604020202020204" pitchFamily="34" charset="0"/>
               </a:rPr>
-              <a:t>It</a:t>
+              <a:t>interest</a:t>
             </a:r>
             <a:r>
               <a:rPr lang="tr-TR" dirty="0" smtClean="0">
@@ -7731,170 +8061,14 @@
                 </a:solidFill>
                 <a:cs typeface="Arial" panose="020B0604020202020204" pitchFamily="34" charset="0"/>
               </a:rPr>
-              <a:t> is </a:t>
-            </a:r>
-            <a:r>
-              <a:rPr lang="tr-TR" dirty="0" err="1" smtClean="0">
-                <a:solidFill>
-                  <a:srgbClr val="002060"/>
-                </a:solidFill>
-                <a:cs typeface="Arial" panose="020B0604020202020204" pitchFamily="34" charset="0"/>
-              </a:rPr>
-              <a:t>the</a:t>
-            </a:r>
-            <a:r>
-              <a:rPr lang="tr-TR" dirty="0" smtClean="0">
-                <a:solidFill>
-                  <a:srgbClr val="002060"/>
-                </a:solidFill>
-                <a:cs typeface="Arial" panose="020B0604020202020204" pitchFamily="34" charset="0"/>
-              </a:rPr>
-              <a:t> </a:t>
-            </a:r>
-            <a:r>
-              <a:rPr lang="tr-TR" dirty="0" err="1" smtClean="0">
-                <a:solidFill>
-                  <a:srgbClr val="002060"/>
-                </a:solidFill>
-                <a:cs typeface="Arial" panose="020B0604020202020204" pitchFamily="34" charset="0"/>
-              </a:rPr>
-              <a:t>loop</a:t>
-            </a:r>
-            <a:r>
-              <a:rPr lang="tr-TR" dirty="0" smtClean="0">
-                <a:solidFill>
-                  <a:srgbClr val="002060"/>
-                </a:solidFill>
-                <a:cs typeface="Arial" panose="020B0604020202020204" pitchFamily="34" charset="0"/>
-              </a:rPr>
-              <a:t> </a:t>
-            </a:r>
-            <a:r>
-              <a:rPr lang="tr-TR" dirty="0" err="1" smtClean="0">
-                <a:solidFill>
-                  <a:srgbClr val="002060"/>
-                </a:solidFill>
-                <a:cs typeface="Arial" panose="020B0604020202020204" pitchFamily="34" charset="0"/>
-              </a:rPr>
-              <a:t>where</a:t>
-            </a:r>
-            <a:r>
-              <a:rPr lang="tr-TR" dirty="0" smtClean="0">
-                <a:solidFill>
-                  <a:srgbClr val="002060"/>
-                </a:solidFill>
-                <a:cs typeface="Arial" panose="020B0604020202020204" pitchFamily="34" charset="0"/>
-              </a:rPr>
-              <a:t> </a:t>
-            </a:r>
-            <a:r>
-              <a:rPr lang="tr-TR" dirty="0" err="1" smtClean="0">
-                <a:solidFill>
-                  <a:srgbClr val="002060"/>
-                </a:solidFill>
-                <a:cs typeface="Arial" panose="020B0604020202020204" pitchFamily="34" charset="0"/>
-              </a:rPr>
-              <a:t>the</a:t>
-            </a:r>
-            <a:r>
-              <a:rPr lang="tr-TR" dirty="0" smtClean="0">
-                <a:solidFill>
-                  <a:srgbClr val="002060"/>
-                </a:solidFill>
-                <a:cs typeface="Arial" panose="020B0604020202020204" pitchFamily="34" charset="0"/>
-              </a:rPr>
-              <a:t> </a:t>
-            </a:r>
-            <a:r>
-              <a:rPr lang="tr-TR" dirty="0" err="1" smtClean="0">
-                <a:solidFill>
-                  <a:srgbClr val="002060"/>
-                </a:solidFill>
-                <a:cs typeface="Arial" panose="020B0604020202020204" pitchFamily="34" charset="0"/>
-              </a:rPr>
-              <a:t>switching</a:t>
-            </a:r>
-            <a:r>
-              <a:rPr lang="tr-TR" dirty="0" smtClean="0">
-                <a:solidFill>
-                  <a:srgbClr val="002060"/>
-                </a:solidFill>
-                <a:cs typeface="Arial" panose="020B0604020202020204" pitchFamily="34" charset="0"/>
-              </a:rPr>
-              <a:t> </a:t>
-            </a:r>
-            <a:r>
-              <a:rPr lang="tr-TR" dirty="0" err="1" smtClean="0">
-                <a:solidFill>
-                  <a:srgbClr val="002060"/>
-                </a:solidFill>
-                <a:cs typeface="Arial" panose="020B0604020202020204" pitchFamily="34" charset="0"/>
-              </a:rPr>
-              <a:t>harmonics</a:t>
-            </a:r>
-            <a:r>
-              <a:rPr lang="tr-TR" dirty="0" smtClean="0">
-                <a:solidFill>
-                  <a:srgbClr val="002060"/>
-                </a:solidFill>
-                <a:cs typeface="Arial" panose="020B0604020202020204" pitchFamily="34" charset="0"/>
-              </a:rPr>
-              <a:t> (</a:t>
-            </a:r>
-            <a:r>
-              <a:rPr lang="tr-TR" dirty="0" err="1" smtClean="0">
-                <a:solidFill>
-                  <a:srgbClr val="002060"/>
-                </a:solidFill>
-                <a:cs typeface="Arial" panose="020B0604020202020204" pitchFamily="34" charset="0"/>
-              </a:rPr>
-              <a:t>component</a:t>
-            </a:r>
-            <a:r>
-              <a:rPr lang="tr-TR" dirty="0" smtClean="0">
-                <a:solidFill>
-                  <a:srgbClr val="002060"/>
-                </a:solidFill>
-                <a:cs typeface="Arial" panose="020B0604020202020204" pitchFamily="34" charset="0"/>
-              </a:rPr>
-              <a:t> of </a:t>
-            </a:r>
-            <a:r>
-              <a:rPr lang="tr-TR" dirty="0" err="1" smtClean="0">
-                <a:solidFill>
-                  <a:srgbClr val="002060"/>
-                </a:solidFill>
-                <a:cs typeface="Arial" panose="020B0604020202020204" pitchFamily="34" charset="0"/>
-              </a:rPr>
-              <a:t>Idc</a:t>
-            </a:r>
-            <a:r>
-              <a:rPr lang="tr-TR" dirty="0" smtClean="0">
-                <a:solidFill>
-                  <a:srgbClr val="002060"/>
-                </a:solidFill>
-                <a:cs typeface="Arial" panose="020B0604020202020204" pitchFamily="34" charset="0"/>
-              </a:rPr>
-              <a:t>) </a:t>
-            </a:r>
-            <a:r>
-              <a:rPr lang="tr-TR" dirty="0" err="1" smtClean="0">
-                <a:solidFill>
-                  <a:srgbClr val="002060"/>
-                </a:solidFill>
-                <a:cs typeface="Arial" panose="020B0604020202020204" pitchFamily="34" charset="0"/>
-              </a:rPr>
-              <a:t>flow</a:t>
-            </a:r>
-            <a:r>
-              <a:rPr lang="tr-TR" dirty="0" smtClean="0">
-                <a:solidFill>
-                  <a:srgbClr val="002060"/>
-                </a:solidFill>
-                <a:cs typeface="Arial" panose="020B0604020202020204" pitchFamily="34" charset="0"/>
-              </a:rPr>
               <a:t>.</a:t>
             </a:r>
+            <a:endParaRPr lang="tr-TR" dirty="0" smtClean="0">
+              <a:solidFill>
+                <a:srgbClr val="002060"/>
+              </a:solidFill>
+              <a:cs typeface="Arial" panose="020B0604020202020204" pitchFamily="34" charset="0"/>
+            </a:endParaRPr>
           </a:p>
           <a:p>
             <a:pPr marL="285750" indent="-285750">
@@ -7920,13 +8094,49 @@
               <a:t> </a:t>
             </a:r>
             <a:r>
+              <a:rPr lang="tr-TR" b="1" dirty="0" err="1" smtClean="0">
+                <a:solidFill>
+                  <a:srgbClr val="002060"/>
+                </a:solidFill>
+                <a:cs typeface="Arial" panose="020B0604020202020204" pitchFamily="34" charset="0"/>
+              </a:rPr>
+              <a:t>commutation</a:t>
+            </a:r>
+            <a:r>
+              <a:rPr lang="tr-TR" b="1" dirty="0" smtClean="0">
+                <a:solidFill>
+                  <a:srgbClr val="002060"/>
+                </a:solidFill>
+                <a:cs typeface="Arial" panose="020B0604020202020204" pitchFamily="34" charset="0"/>
+              </a:rPr>
+              <a:t> </a:t>
+            </a:r>
+            <a:r>
+              <a:rPr lang="tr-TR" b="1" dirty="0" err="1" smtClean="0">
+                <a:solidFill>
+                  <a:srgbClr val="002060"/>
+                </a:solidFill>
+                <a:cs typeface="Arial" panose="020B0604020202020204" pitchFamily="34" charset="0"/>
+              </a:rPr>
+              <a:t>loops</a:t>
+            </a:r>
+            <a:r>
+              <a:rPr lang="tr-TR" dirty="0" smtClean="0">
+                <a:solidFill>
+                  <a:srgbClr val="002060"/>
+                </a:solidFill>
+                <a:cs typeface="Arial" panose="020B0604020202020204" pitchFamily="34" charset="0"/>
+              </a:rPr>
+              <a:t>, </a:t>
+            </a:r>
+            <a:r>
               <a:rPr lang="tr-TR" dirty="0" err="1" smtClean="0">
                 <a:solidFill>
                   <a:srgbClr val="002060"/>
                 </a:solidFill>
                 <a:cs typeface="Arial" panose="020B0604020202020204" pitchFamily="34" charset="0"/>
               </a:rPr>
-              <a:t>commutation</a:t>
+              <a:t>the</a:t>
             </a:r>
             <a:r>
               <a:rPr lang="tr-TR" dirty="0" smtClean="0">
@@ -7944,7 +8154,7 @@
                 </a:solidFill>
                 <a:cs typeface="Arial" panose="020B0604020202020204" pitchFamily="34" charset="0"/>
               </a:rPr>
-              <a:t>loops</a:t>
+              <a:t>switching</a:t>
             </a:r>
             <a:r>
               <a:rPr lang="tr-TR" dirty="0" smtClean="0">
@@ -7953,6 +8163,240 @@
                 </a:solidFill>
                 <a:cs typeface="Arial" panose="020B0604020202020204" pitchFamily="34" charset="0"/>
               </a:rPr>
+              <a:t> </a:t>
+            </a:r>
+            <a:r>
+              <a:rPr lang="tr-TR" dirty="0" err="1" smtClean="0">
+                <a:solidFill>
+                  <a:srgbClr val="002060"/>
+                </a:solidFill>
+                <a:cs typeface="Arial" panose="020B0604020202020204" pitchFamily="34" charset="0"/>
+              </a:rPr>
+              <a:t>harmonic</a:t>
+            </a:r>
+            <a:r>
+              <a:rPr lang="tr-TR" dirty="0" smtClean="0">
+                <a:solidFill>
+                  <a:srgbClr val="002060"/>
+                </a:solidFill>
+                <a:cs typeface="Arial" panose="020B0604020202020204" pitchFamily="34" charset="0"/>
+              </a:rPr>
+              <a:t> </a:t>
+            </a:r>
+            <a:r>
+              <a:rPr lang="tr-TR" dirty="0" err="1" smtClean="0">
+                <a:solidFill>
+                  <a:srgbClr val="002060"/>
+                </a:solidFill>
+                <a:cs typeface="Arial" panose="020B0604020202020204" pitchFamily="34" charset="0"/>
+              </a:rPr>
+              <a:t>current</a:t>
+            </a:r>
+            <a:r>
+              <a:rPr lang="tr-TR" dirty="0" smtClean="0">
+                <a:solidFill>
+                  <a:srgbClr val="002060"/>
+                </a:solidFill>
+                <a:cs typeface="Arial" panose="020B0604020202020204" pitchFamily="34" charset="0"/>
+              </a:rPr>
+              <a:t> </a:t>
+            </a:r>
+            <a:r>
+              <a:rPr lang="tr-TR" dirty="0" err="1" smtClean="0">
+                <a:solidFill>
+                  <a:srgbClr val="002060"/>
+                </a:solidFill>
+                <a:cs typeface="Arial" panose="020B0604020202020204" pitchFamily="34" charset="0"/>
+              </a:rPr>
+              <a:t>flows</a:t>
+            </a:r>
+            <a:r>
+              <a:rPr lang="tr-TR" dirty="0" smtClean="0">
+                <a:solidFill>
+                  <a:srgbClr val="002060"/>
+                </a:solidFill>
+                <a:cs typeface="Arial" panose="020B0604020202020204" pitchFamily="34" charset="0"/>
+              </a:rPr>
+              <a:t> </a:t>
+            </a:r>
+            <a:r>
+              <a:rPr lang="tr-TR" dirty="0" err="1" smtClean="0">
+                <a:solidFill>
+                  <a:srgbClr val="002060"/>
+                </a:solidFill>
+                <a:cs typeface="Arial" panose="020B0604020202020204" pitchFamily="34" charset="0"/>
+              </a:rPr>
+              <a:t>from</a:t>
+            </a:r>
+            <a:r>
+              <a:rPr lang="tr-TR" dirty="0" smtClean="0">
+                <a:solidFill>
+                  <a:srgbClr val="002060"/>
+                </a:solidFill>
+                <a:cs typeface="Arial" panose="020B0604020202020204" pitchFamily="34" charset="0"/>
+              </a:rPr>
+              <a:t> </a:t>
+            </a:r>
+            <a:r>
+              <a:rPr lang="tr-TR" dirty="0" err="1" smtClean="0">
+                <a:solidFill>
+                  <a:srgbClr val="002060"/>
+                </a:solidFill>
+                <a:cs typeface="Arial" panose="020B0604020202020204" pitchFamily="34" charset="0"/>
+              </a:rPr>
+              <a:t>one</a:t>
+            </a:r>
+            <a:r>
+              <a:rPr lang="tr-TR" dirty="0" smtClean="0">
+                <a:solidFill>
+                  <a:srgbClr val="002060"/>
+                </a:solidFill>
+                <a:cs typeface="Arial" panose="020B0604020202020204" pitchFamily="34" charset="0"/>
+              </a:rPr>
+              <a:t> </a:t>
+            </a:r>
+            <a:r>
+              <a:rPr lang="tr-TR" dirty="0" err="1" smtClean="0">
+                <a:solidFill>
+                  <a:srgbClr val="002060"/>
+                </a:solidFill>
+                <a:cs typeface="Arial" panose="020B0604020202020204" pitchFamily="34" charset="0"/>
+              </a:rPr>
+              <a:t>phase</a:t>
+            </a:r>
+            <a:r>
+              <a:rPr lang="tr-TR" dirty="0" smtClean="0">
+                <a:solidFill>
+                  <a:srgbClr val="002060"/>
+                </a:solidFill>
+                <a:cs typeface="Arial" panose="020B0604020202020204" pitchFamily="34" charset="0"/>
+              </a:rPr>
+              <a:t> </a:t>
+            </a:r>
+            <a:r>
+              <a:rPr lang="tr-TR" dirty="0" err="1" smtClean="0">
+                <a:solidFill>
+                  <a:srgbClr val="002060"/>
+                </a:solidFill>
+                <a:cs typeface="Arial" panose="020B0604020202020204" pitchFamily="34" charset="0"/>
+              </a:rPr>
+              <a:t>to</a:t>
+            </a:r>
+            <a:r>
+              <a:rPr lang="tr-TR" dirty="0" smtClean="0">
+                <a:solidFill>
+                  <a:srgbClr val="002060"/>
+                </a:solidFill>
+                <a:cs typeface="Arial" panose="020B0604020202020204" pitchFamily="34" charset="0"/>
+              </a:rPr>
+              <a:t> a </a:t>
+            </a:r>
+            <a:r>
+              <a:rPr lang="tr-TR" dirty="0" err="1" smtClean="0">
+                <a:solidFill>
+                  <a:srgbClr val="002060"/>
+                </a:solidFill>
+                <a:cs typeface="Arial" panose="020B0604020202020204" pitchFamily="34" charset="0"/>
+              </a:rPr>
+              <a:t>capacitor</a:t>
+            </a:r>
+            <a:r>
+              <a:rPr lang="tr-TR" dirty="0" smtClean="0">
+                <a:solidFill>
+                  <a:srgbClr val="002060"/>
+                </a:solidFill>
+                <a:cs typeface="Arial" panose="020B0604020202020204" pitchFamily="34" charset="0"/>
+              </a:rPr>
+              <a:t> </a:t>
+            </a:r>
+            <a:r>
+              <a:rPr lang="tr-TR" dirty="0" err="1" smtClean="0">
+                <a:solidFill>
+                  <a:srgbClr val="002060"/>
+                </a:solidFill>
+                <a:cs typeface="Arial" panose="020B0604020202020204" pitchFamily="34" charset="0"/>
+              </a:rPr>
+              <a:t>belonging</a:t>
+            </a:r>
+            <a:r>
+              <a:rPr lang="tr-TR" dirty="0" smtClean="0">
+                <a:solidFill>
+                  <a:srgbClr val="002060"/>
+                </a:solidFill>
+                <a:cs typeface="Arial" panose="020B0604020202020204" pitchFamily="34" charset="0"/>
+              </a:rPr>
+              <a:t> </a:t>
+            </a:r>
+            <a:r>
+              <a:rPr lang="tr-TR" dirty="0" err="1" smtClean="0">
+                <a:solidFill>
+                  <a:srgbClr val="002060"/>
+                </a:solidFill>
+                <a:cs typeface="Arial" panose="020B0604020202020204" pitchFamily="34" charset="0"/>
+              </a:rPr>
+              <a:t>to</a:t>
+            </a:r>
+            <a:r>
+              <a:rPr lang="tr-TR" dirty="0" smtClean="0">
+                <a:solidFill>
+                  <a:srgbClr val="002060"/>
+                </a:solidFill>
+                <a:cs typeface="Arial" panose="020B0604020202020204" pitchFamily="34" charset="0"/>
+              </a:rPr>
+              <a:t> a </a:t>
+            </a:r>
+            <a:r>
+              <a:rPr lang="tr-TR" dirty="0" err="1" smtClean="0">
+                <a:solidFill>
+                  <a:srgbClr val="002060"/>
+                </a:solidFill>
+                <a:cs typeface="Arial" panose="020B0604020202020204" pitchFamily="34" charset="0"/>
+              </a:rPr>
+              <a:t>different</a:t>
+            </a:r>
+            <a:r>
+              <a:rPr lang="tr-TR" dirty="0" smtClean="0">
+                <a:solidFill>
+                  <a:srgbClr val="002060"/>
+                </a:solidFill>
+                <a:cs typeface="Arial" panose="020B0604020202020204" pitchFamily="34" charset="0"/>
+              </a:rPr>
+              <a:t> </a:t>
+            </a:r>
+            <a:r>
+              <a:rPr lang="tr-TR" dirty="0" err="1" smtClean="0">
+                <a:solidFill>
+                  <a:srgbClr val="002060"/>
+                </a:solidFill>
+                <a:cs typeface="Arial" panose="020B0604020202020204" pitchFamily="34" charset="0"/>
+              </a:rPr>
+              <a:t>phase</a:t>
+            </a:r>
+            <a:r>
+              <a:rPr lang="tr-TR" dirty="0" smtClean="0">
+                <a:solidFill>
+                  <a:srgbClr val="002060"/>
+                </a:solidFill>
+                <a:cs typeface="Arial" panose="020B0604020202020204" pitchFamily="34" charset="0"/>
+              </a:rPr>
+              <a:t>. </a:t>
+            </a:r>
+            <a:r>
+              <a:rPr lang="tr-TR" dirty="0" err="1" smtClean="0">
+                <a:solidFill>
+                  <a:srgbClr val="002060"/>
+                </a:solidFill>
+                <a:cs typeface="Arial" panose="020B0604020202020204" pitchFamily="34" charset="0"/>
+              </a:rPr>
+              <a:t>Therefore</a:t>
+            </a:r>
+            <a:r>
+              <a:rPr lang="tr-TR" dirty="0" smtClean="0">
+                <a:solidFill>
+                  <a:srgbClr val="002060"/>
+                </a:solidFill>
+                <a:cs typeface="Arial" panose="020B0604020202020204" pitchFamily="34" charset="0"/>
+              </a:rPr>
               <a:t>, </a:t>
             </a:r>
             <a:r>
@@ -7962,7 +8406,7 @@
                 </a:solidFill>
                 <a:cs typeface="Arial" panose="020B0604020202020204" pitchFamily="34" charset="0"/>
               </a:rPr>
-              <a:t>the</a:t>
+              <a:t>our</a:t>
             </a:r>
             <a:r>
               <a:rPr lang="tr-TR" dirty="0" smtClean="0">
@@ -7971,7 +8415,43 @@
                 </a:solidFill>
                 <a:cs typeface="Arial" panose="020B0604020202020204" pitchFamily="34" charset="0"/>
               </a:rPr>
-              <a:t> </a:t>
+              <a:t> «</a:t>
+            </a:r>
+            <a:r>
+              <a:rPr lang="tr-TR" b="1" dirty="0" err="1" smtClean="0">
+                <a:solidFill>
+                  <a:srgbClr val="002060"/>
+                </a:solidFill>
+                <a:cs typeface="Arial" panose="020B0604020202020204" pitchFamily="34" charset="0"/>
+              </a:rPr>
+              <a:t>single</a:t>
+            </a:r>
+            <a:r>
+              <a:rPr lang="tr-TR" b="1" dirty="0" smtClean="0">
+                <a:solidFill>
+                  <a:srgbClr val="002060"/>
+                </a:solidFill>
+                <a:cs typeface="Arial" panose="020B0604020202020204" pitchFamily="34" charset="0"/>
+              </a:rPr>
+              <a:t> </a:t>
+            </a:r>
+            <a:r>
+              <a:rPr lang="tr-TR" b="1" dirty="0" err="1" smtClean="0">
+                <a:solidFill>
+                  <a:srgbClr val="002060"/>
+                </a:solidFill>
+                <a:cs typeface="Arial" panose="020B0604020202020204" pitchFamily="34" charset="0"/>
+              </a:rPr>
+              <a:t>Idc</a:t>
+            </a:r>
+            <a:r>
+              <a:rPr lang="tr-TR" dirty="0" smtClean="0">
+                <a:solidFill>
+                  <a:srgbClr val="002060"/>
+                </a:solidFill>
+                <a:cs typeface="Arial" panose="020B0604020202020204" pitchFamily="34" charset="0"/>
+              </a:rPr>
+              <a:t>» </a:t>
             </a:r>
             <a:r>
               <a:rPr lang="tr-TR" dirty="0" err="1" smtClean="0">
@@ -7980,7 +8460,7 @@
                 </a:solidFill>
                 <a:cs typeface="Arial" panose="020B0604020202020204" pitchFamily="34" charset="0"/>
               </a:rPr>
-              <a:t>switching</a:t>
+              <a:t>assumption</a:t>
             </a:r>
             <a:r>
               <a:rPr lang="tr-TR" dirty="0" smtClean="0">
@@ -7998,7 +8478,7 @@
                 </a:solidFill>
                 <a:cs typeface="Arial" panose="020B0604020202020204" pitchFamily="34" charset="0"/>
               </a:rPr>
-              <a:t>harmonic</a:t>
+              <a:t>fails</a:t>
             </a:r>
             <a:r>
               <a:rPr lang="tr-TR" dirty="0" smtClean="0">
@@ -8007,314 +8487,14 @@
                 </a:solidFill>
                 <a:cs typeface="Arial" panose="020B0604020202020204" pitchFamily="34" charset="0"/>
               </a:rPr>
-              <a:t> </a:t>
-            </a:r>
-            <a:r>
-              <a:rPr lang="tr-TR" dirty="0" err="1" smtClean="0">
-                <a:solidFill>
-                  <a:srgbClr val="002060"/>
-                </a:solidFill>
-                <a:cs typeface="Arial" panose="020B0604020202020204" pitchFamily="34" charset="0"/>
-              </a:rPr>
-              <a:t>current</a:t>
-            </a:r>
-            <a:r>
-              <a:rPr lang="tr-TR" dirty="0" smtClean="0">
-                <a:solidFill>
-                  <a:srgbClr val="002060"/>
-                </a:solidFill>
-                <a:cs typeface="Arial" panose="020B0604020202020204" pitchFamily="34" charset="0"/>
-              </a:rPr>
-              <a:t> </a:t>
-            </a:r>
-            <a:r>
-              <a:rPr lang="tr-TR" dirty="0" err="1" smtClean="0">
-                <a:solidFill>
-                  <a:srgbClr val="002060"/>
-                </a:solidFill>
-                <a:cs typeface="Arial" panose="020B0604020202020204" pitchFamily="34" charset="0"/>
-              </a:rPr>
-              <a:t>flows</a:t>
-            </a:r>
-            <a:r>
-              <a:rPr lang="tr-TR" dirty="0" smtClean="0">
-                <a:solidFill>
-                  <a:srgbClr val="002060"/>
-                </a:solidFill>
-                <a:cs typeface="Arial" panose="020B0604020202020204" pitchFamily="34" charset="0"/>
-              </a:rPr>
-              <a:t> </a:t>
-            </a:r>
-            <a:r>
-              <a:rPr lang="tr-TR" dirty="0" err="1" smtClean="0">
-                <a:solidFill>
-                  <a:srgbClr val="002060"/>
-                </a:solidFill>
-                <a:cs typeface="Arial" panose="020B0604020202020204" pitchFamily="34" charset="0"/>
-              </a:rPr>
-              <a:t>from</a:t>
-            </a:r>
-            <a:r>
-              <a:rPr lang="tr-TR" dirty="0" smtClean="0">
-                <a:solidFill>
-                  <a:srgbClr val="002060"/>
-                </a:solidFill>
-                <a:cs typeface="Arial" panose="020B0604020202020204" pitchFamily="34" charset="0"/>
-              </a:rPr>
-              <a:t> </a:t>
-            </a:r>
-            <a:r>
-              <a:rPr lang="tr-TR" dirty="0" err="1" smtClean="0">
-                <a:solidFill>
-                  <a:srgbClr val="002060"/>
-                </a:solidFill>
-                <a:cs typeface="Arial" panose="020B0604020202020204" pitchFamily="34" charset="0"/>
-              </a:rPr>
-              <a:t>one</a:t>
-            </a:r>
-            <a:r>
-              <a:rPr lang="tr-TR" dirty="0" smtClean="0">
-                <a:solidFill>
-                  <a:srgbClr val="002060"/>
-                </a:solidFill>
-                <a:cs typeface="Arial" panose="020B0604020202020204" pitchFamily="34" charset="0"/>
-              </a:rPr>
-              <a:t> </a:t>
-            </a:r>
-            <a:r>
-              <a:rPr lang="tr-TR" dirty="0" err="1" smtClean="0">
-                <a:solidFill>
-                  <a:srgbClr val="002060"/>
-                </a:solidFill>
-                <a:cs typeface="Arial" panose="020B0604020202020204" pitchFamily="34" charset="0"/>
-              </a:rPr>
-              <a:t>phase</a:t>
-            </a:r>
-            <a:r>
-              <a:rPr lang="tr-TR" dirty="0" smtClean="0">
-                <a:solidFill>
-                  <a:srgbClr val="002060"/>
-                </a:solidFill>
-                <a:cs typeface="Arial" panose="020B0604020202020204" pitchFamily="34" charset="0"/>
-              </a:rPr>
-              <a:t> </a:t>
-            </a:r>
-            <a:r>
-              <a:rPr lang="tr-TR" dirty="0" err="1" smtClean="0">
-                <a:solidFill>
-                  <a:srgbClr val="002060"/>
-                </a:solidFill>
-                <a:cs typeface="Arial" panose="020B0604020202020204" pitchFamily="34" charset="0"/>
-              </a:rPr>
-              <a:t>to</a:t>
-            </a:r>
-            <a:r>
-              <a:rPr lang="tr-TR" dirty="0" smtClean="0">
-                <a:solidFill>
-                  <a:srgbClr val="002060"/>
-                </a:solidFill>
-                <a:cs typeface="Arial" panose="020B0604020202020204" pitchFamily="34" charset="0"/>
-              </a:rPr>
-              <a:t> a </a:t>
-            </a:r>
-            <a:r>
-              <a:rPr lang="tr-TR" dirty="0" err="1" smtClean="0">
-                <a:solidFill>
-                  <a:srgbClr val="002060"/>
-                </a:solidFill>
-                <a:cs typeface="Arial" panose="020B0604020202020204" pitchFamily="34" charset="0"/>
-              </a:rPr>
-              <a:t>capacitor</a:t>
-            </a:r>
-            <a:r>
-              <a:rPr lang="tr-TR" dirty="0" smtClean="0">
-                <a:solidFill>
-                  <a:srgbClr val="002060"/>
-                </a:solidFill>
-                <a:cs typeface="Arial" panose="020B0604020202020204" pitchFamily="34" charset="0"/>
-              </a:rPr>
-              <a:t> </a:t>
-            </a:r>
-            <a:r>
-              <a:rPr lang="tr-TR" dirty="0" err="1" smtClean="0">
-                <a:solidFill>
-                  <a:srgbClr val="002060"/>
-                </a:solidFill>
-                <a:cs typeface="Arial" panose="020B0604020202020204" pitchFamily="34" charset="0"/>
-              </a:rPr>
-              <a:t>belonging</a:t>
-            </a:r>
-            <a:r>
-              <a:rPr lang="tr-TR" dirty="0" smtClean="0">
-                <a:solidFill>
-                  <a:srgbClr val="002060"/>
-                </a:solidFill>
-                <a:cs typeface="Arial" panose="020B0604020202020204" pitchFamily="34" charset="0"/>
-              </a:rPr>
-              <a:t> </a:t>
-            </a:r>
-            <a:r>
-              <a:rPr lang="tr-TR" dirty="0" err="1" smtClean="0">
-                <a:solidFill>
-                  <a:srgbClr val="002060"/>
-                </a:solidFill>
-                <a:cs typeface="Arial" panose="020B0604020202020204" pitchFamily="34" charset="0"/>
-              </a:rPr>
-              <a:t>to</a:t>
-            </a:r>
-            <a:r>
-              <a:rPr lang="tr-TR" dirty="0" smtClean="0">
-                <a:solidFill>
-                  <a:srgbClr val="002060"/>
-                </a:solidFill>
-                <a:cs typeface="Arial" panose="020B0604020202020204" pitchFamily="34" charset="0"/>
-              </a:rPr>
-              <a:t> a </a:t>
-            </a:r>
-            <a:r>
-              <a:rPr lang="tr-TR" dirty="0" err="1" smtClean="0">
-                <a:solidFill>
-                  <a:srgbClr val="002060"/>
-                </a:solidFill>
-                <a:cs typeface="Arial" panose="020B0604020202020204" pitchFamily="34" charset="0"/>
-              </a:rPr>
-              <a:t>different</a:t>
-            </a:r>
-            <a:r>
-              <a:rPr lang="tr-TR" dirty="0" smtClean="0">
-                <a:solidFill>
-                  <a:srgbClr val="002060"/>
-                </a:solidFill>
-                <a:cs typeface="Arial" panose="020B0604020202020204" pitchFamily="34" charset="0"/>
-              </a:rPr>
-              <a:t> </a:t>
-            </a:r>
-            <a:r>
-              <a:rPr lang="tr-TR" dirty="0" err="1" smtClean="0">
-                <a:solidFill>
-                  <a:srgbClr val="002060"/>
-                </a:solidFill>
-                <a:cs typeface="Arial" panose="020B0604020202020204" pitchFamily="34" charset="0"/>
-              </a:rPr>
-              <a:t>phase</a:t>
-            </a:r>
-            <a:r>
-              <a:rPr lang="tr-TR" dirty="0" smtClean="0">
-                <a:solidFill>
-                  <a:srgbClr val="002060"/>
-                </a:solidFill>
-                <a:cs typeface="Arial" panose="020B0604020202020204" pitchFamily="34" charset="0"/>
-              </a:rPr>
-              <a:t>. </a:t>
-            </a:r>
-            <a:r>
-              <a:rPr lang="tr-TR" dirty="0" err="1" smtClean="0">
-                <a:solidFill>
-                  <a:srgbClr val="002060"/>
-                </a:solidFill>
-                <a:cs typeface="Arial" panose="020B0604020202020204" pitchFamily="34" charset="0"/>
-              </a:rPr>
-              <a:t>Therefore</a:t>
-            </a:r>
-            <a:r>
-              <a:rPr lang="tr-TR" dirty="0" smtClean="0">
-                <a:solidFill>
-                  <a:srgbClr val="002060"/>
-                </a:solidFill>
-                <a:cs typeface="Arial" panose="020B0604020202020204" pitchFamily="34" charset="0"/>
-              </a:rPr>
-              <a:t>, </a:t>
-            </a:r>
-            <a:r>
-              <a:rPr lang="tr-TR" dirty="0" err="1" smtClean="0">
-                <a:solidFill>
-                  <a:srgbClr val="002060"/>
-                </a:solidFill>
-                <a:cs typeface="Arial" panose="020B0604020202020204" pitchFamily="34" charset="0"/>
-              </a:rPr>
-              <a:t>our</a:t>
-            </a:r>
-            <a:r>
-              <a:rPr lang="tr-TR" dirty="0" smtClean="0">
-                <a:solidFill>
-                  <a:srgbClr val="002060"/>
-                </a:solidFill>
-                <a:cs typeface="Arial" panose="020B0604020202020204" pitchFamily="34" charset="0"/>
-              </a:rPr>
-              <a:t> «</a:t>
-            </a:r>
-            <a:r>
-              <a:rPr lang="tr-TR" dirty="0" err="1" smtClean="0">
-                <a:solidFill>
-                  <a:srgbClr val="002060"/>
-                </a:solidFill>
-                <a:cs typeface="Arial" panose="020B0604020202020204" pitchFamily="34" charset="0"/>
-              </a:rPr>
-              <a:t>single</a:t>
-            </a:r>
-            <a:r>
-              <a:rPr lang="tr-TR" dirty="0" smtClean="0">
-                <a:solidFill>
-                  <a:srgbClr val="002060"/>
-                </a:solidFill>
-                <a:cs typeface="Arial" panose="020B0604020202020204" pitchFamily="34" charset="0"/>
-              </a:rPr>
-              <a:t> </a:t>
-            </a:r>
-            <a:r>
-              <a:rPr lang="tr-TR" dirty="0" err="1" smtClean="0">
-                <a:solidFill>
-                  <a:srgbClr val="002060"/>
-                </a:solidFill>
-                <a:cs typeface="Arial" panose="020B0604020202020204" pitchFamily="34" charset="0"/>
-              </a:rPr>
-              <a:t>Idc</a:t>
-            </a:r>
-            <a:r>
-              <a:rPr lang="tr-TR" dirty="0" smtClean="0">
-                <a:solidFill>
-                  <a:srgbClr val="002060"/>
-                </a:solidFill>
-                <a:cs typeface="Arial" panose="020B0604020202020204" pitchFamily="34" charset="0"/>
-              </a:rPr>
-              <a:t>» </a:t>
-            </a:r>
-            <a:r>
-              <a:rPr lang="tr-TR" dirty="0" err="1" smtClean="0">
-                <a:solidFill>
-                  <a:srgbClr val="002060"/>
-                </a:solidFill>
-                <a:cs typeface="Arial" panose="020B0604020202020204" pitchFamily="34" charset="0"/>
-              </a:rPr>
-              <a:t>assumption</a:t>
-            </a:r>
-            <a:r>
-              <a:rPr lang="tr-TR" dirty="0" smtClean="0">
-                <a:solidFill>
-                  <a:srgbClr val="002060"/>
-                </a:solidFill>
-                <a:cs typeface="Arial" panose="020B0604020202020204" pitchFamily="34" charset="0"/>
-              </a:rPr>
-              <a:t> </a:t>
-            </a:r>
-            <a:r>
-              <a:rPr lang="tr-TR" dirty="0" err="1" smtClean="0">
-                <a:solidFill>
-                  <a:srgbClr val="002060"/>
-                </a:solidFill>
-                <a:cs typeface="Arial" panose="020B0604020202020204" pitchFamily="34" charset="0"/>
-              </a:rPr>
-              <a:t>fails</a:t>
-            </a:r>
-            <a:r>
-              <a:rPr lang="tr-TR" dirty="0" smtClean="0">
-                <a:solidFill>
-                  <a:srgbClr val="002060"/>
-                </a:solidFill>
-                <a:cs typeface="Arial" panose="020B0604020202020204" pitchFamily="34" charset="0"/>
-              </a:rPr>
-              <a:t> here.</a:t>
-            </a:r>
+              <a:t>.</a:t>
+            </a:r>
+            <a:endParaRPr lang="tr-TR" dirty="0" smtClean="0">
+              <a:solidFill>
+                <a:srgbClr val="002060"/>
+              </a:solidFill>
+              <a:cs typeface="Arial" panose="020B0604020202020204" pitchFamily="34" charset="0"/>
+            </a:endParaRPr>
           </a:p>
           <a:p>
             <a:pPr marL="285750" indent="-285750">
@@ -8340,13 +8520,49 @@
               <a:t> is a </a:t>
             </a:r>
             <a:r>
+              <a:rPr lang="tr-TR" b="1" dirty="0" err="1" smtClean="0">
+                <a:solidFill>
+                  <a:srgbClr val="002060"/>
+                </a:solidFill>
+                <a:cs typeface="Arial" panose="020B0604020202020204" pitchFamily="34" charset="0"/>
+              </a:rPr>
+              <a:t>stray</a:t>
+            </a:r>
+            <a:r>
+              <a:rPr lang="tr-TR" b="1" dirty="0" smtClean="0">
+                <a:solidFill>
+                  <a:srgbClr val="002060"/>
+                </a:solidFill>
+                <a:cs typeface="Arial" panose="020B0604020202020204" pitchFamily="34" charset="0"/>
+              </a:rPr>
+              <a:t> </a:t>
+            </a:r>
+            <a:r>
+              <a:rPr lang="tr-TR" b="1" dirty="0" err="1" smtClean="0">
+                <a:solidFill>
+                  <a:srgbClr val="002060"/>
+                </a:solidFill>
+                <a:cs typeface="Arial" panose="020B0604020202020204" pitchFamily="34" charset="0"/>
+              </a:rPr>
+              <a:t>inductance</a:t>
+            </a:r>
+            <a:r>
+              <a:rPr lang="tr-TR" b="1" dirty="0" smtClean="0">
+                <a:solidFill>
+                  <a:srgbClr val="002060"/>
+                </a:solidFill>
+                <a:cs typeface="Arial" panose="020B0604020202020204" pitchFamily="34" charset="0"/>
+              </a:rPr>
+              <a:t> </a:t>
+            </a:r>
+            <a:r>
               <a:rPr lang="tr-TR" dirty="0" err="1" smtClean="0">
                 <a:solidFill>
                   <a:srgbClr val="002060"/>
                 </a:solidFill>
                 <a:cs typeface="Arial" panose="020B0604020202020204" pitchFamily="34" charset="0"/>
               </a:rPr>
-              <a:t>stray</a:t>
+              <a:t>between</a:t>
             </a:r>
             <a:r>
               <a:rPr lang="tr-TR" dirty="0" smtClean="0">
@@ -8364,7 +8580,7 @@
                 </a:solidFill>
                 <a:cs typeface="Arial" panose="020B0604020202020204" pitchFamily="34" charset="0"/>
               </a:rPr>
-              <a:t>inductance</a:t>
+              <a:t>all</a:t>
             </a:r>
             <a:r>
               <a:rPr lang="tr-TR" dirty="0" smtClean="0">
@@ -8382,7 +8598,7 @@
                 </a:solidFill>
                 <a:cs typeface="Arial" panose="020B0604020202020204" pitchFamily="34" charset="0"/>
               </a:rPr>
-              <a:t>between</a:t>
+              <a:t>components</a:t>
             </a:r>
             <a:r>
               <a:rPr lang="tr-TR" dirty="0" smtClean="0">
@@ -8391,7 +8607,7 @@
                 </a:solidFill>
                 <a:cs typeface="Arial" panose="020B0604020202020204" pitchFamily="34" charset="0"/>
               </a:rPr>
-              <a:t> </a:t>
+              <a:t>, </a:t>
             </a:r>
             <a:r>
               <a:rPr lang="tr-TR" dirty="0" err="1" smtClean="0">
@@ -8400,7 +8616,7 @@
                 </a:solidFill>
                 <a:cs typeface="Arial" panose="020B0604020202020204" pitchFamily="34" charset="0"/>
               </a:rPr>
-              <a:t>all</a:t>
+              <a:t>consequently</a:t>
             </a:r>
             <a:r>
               <a:rPr lang="tr-TR" dirty="0" smtClean="0">
@@ -8418,7 +8634,7 @@
                 </a:solidFill>
                 <a:cs typeface="Arial" panose="020B0604020202020204" pitchFamily="34" charset="0"/>
               </a:rPr>
-              <a:t>components</a:t>
+              <a:t>resulting</a:t>
             </a:r>
             <a:r>
               <a:rPr lang="tr-TR" dirty="0" smtClean="0">
@@ -8427,7 +8643,7 @@
                 </a:solidFill>
                 <a:cs typeface="Arial" panose="020B0604020202020204" pitchFamily="34" charset="0"/>
               </a:rPr>
-              <a:t>, </a:t>
+              <a:t> in </a:t>
             </a:r>
             <a:r>
               <a:rPr lang="tr-TR" dirty="0" err="1" smtClean="0">
@@ -8436,7 +8652,7 @@
                 </a:solidFill>
                 <a:cs typeface="Arial" panose="020B0604020202020204" pitchFamily="34" charset="0"/>
               </a:rPr>
-              <a:t>conswquently</a:t>
+              <a:t>increase</a:t>
             </a:r>
             <a:r>
               <a:rPr lang="tr-TR" dirty="0" smtClean="0">
@@ -8445,46 +8661,10 @@
                 </a:solidFill>
                 <a:cs typeface="Arial" panose="020B0604020202020204" pitchFamily="34" charset="0"/>
               </a:rPr>
-              <a:t> </a:t>
-            </a:r>
-            <a:r>
-              <a:rPr lang="tr-TR" dirty="0" err="1" smtClean="0">
-                <a:solidFill>
-                  <a:srgbClr val="002060"/>
-                </a:solidFill>
-                <a:cs typeface="Arial" panose="020B0604020202020204" pitchFamily="34" charset="0"/>
-              </a:rPr>
-              <a:t>resulting</a:t>
-            </a:r>
-            <a:r>
-              <a:rPr lang="tr-TR" dirty="0" smtClean="0">
-                <a:solidFill>
-                  <a:srgbClr val="002060"/>
-                </a:solidFill>
-                <a:cs typeface="Arial" panose="020B0604020202020204" pitchFamily="34" charset="0"/>
-              </a:rPr>
-              <a:t> in </a:t>
-            </a:r>
-            <a:r>
-              <a:rPr lang="tr-TR" dirty="0" err="1" smtClean="0">
-                <a:solidFill>
-                  <a:srgbClr val="002060"/>
-                </a:solidFill>
-                <a:cs typeface="Arial" panose="020B0604020202020204" pitchFamily="34" charset="0"/>
-              </a:rPr>
-              <a:t>increase</a:t>
-            </a:r>
-            <a:r>
-              <a:rPr lang="tr-TR" dirty="0" smtClean="0">
-                <a:solidFill>
-                  <a:srgbClr val="002060"/>
-                </a:solidFill>
-                <a:cs typeface="Arial" panose="020B0604020202020204" pitchFamily="34" charset="0"/>
-              </a:rPr>
               <a:t> on </a:t>
             </a:r>
             <a:r>
-              <a:rPr lang="tr-TR" dirty="0" err="1" smtClean="0">
+              <a:rPr lang="tr-TR" b="1" dirty="0" err="1" smtClean="0">
                 <a:solidFill>
                   <a:srgbClr val="002060"/>
                 </a:solidFill>
@@ -8493,16 +8673,16 @@
               <a:t>capacitor</a:t>
             </a:r>
             <a:r>
-              <a:rPr lang="tr-TR" dirty="0" smtClean="0">
-                <a:solidFill>
-                  <a:srgbClr val="002060"/>
-                </a:solidFill>
-                <a:cs typeface="Arial" panose="020B0604020202020204" pitchFamily="34" charset="0"/>
-              </a:rPr>
-              <a:t> </a:t>
-            </a:r>
-            <a:r>
-              <a:rPr lang="tr-TR" dirty="0" err="1" smtClean="0">
+              <a:rPr lang="tr-TR" b="1" dirty="0" smtClean="0">
+                <a:solidFill>
+                  <a:srgbClr val="002060"/>
+                </a:solidFill>
+                <a:cs typeface="Arial" panose="020B0604020202020204" pitchFamily="34" charset="0"/>
+              </a:rPr>
+              <a:t> </a:t>
+            </a:r>
+            <a:r>
+              <a:rPr lang="tr-TR" b="1" dirty="0" err="1" smtClean="0">
                 <a:solidFill>
                   <a:srgbClr val="002060"/>
                 </a:solidFill>
@@ -8825,7 +9005,7 @@
                 </a:solidFill>
                 <a:cs typeface="Arial" panose="020B0604020202020204" pitchFamily="34" charset="0"/>
               </a:rPr>
-              <a:t>resulşts</a:t>
+              <a:t>results</a:t>
             </a:r>
             <a:r>
               <a:rPr lang="tr-TR" dirty="0" smtClean="0">

</xml_diff>

<commit_message>
Paralel bağlı 2-modül, with and without interleaving'e başlandı (simplest model).
</commit_message>
<xml_diff>
--- a/Simulation/dcbusmodelwrapup/immd_dcbusmodelwrapup.pptx
+++ b/Simulation/dcbusmodelwrapup/immd_dcbusmodelwrapup.pptx
@@ -5,7 +5,7 @@
     <p:sldMasterId id="2147483660" r:id="rId1"/>
   </p:sldMasterIdLst>
   <p:notesMasterIdLst>
-    <p:notesMasterId r:id="rId31"/>
+    <p:notesMasterId r:id="rId35"/>
   </p:notesMasterIdLst>
   <p:sldIdLst>
     <p:sldId id="256" r:id="rId2"/>
@@ -35,8 +35,12 @@
     <p:sldId id="384" r:id="rId26"/>
     <p:sldId id="380" r:id="rId27"/>
     <p:sldId id="385" r:id="rId28"/>
-    <p:sldId id="375" r:id="rId29"/>
-    <p:sldId id="359" r:id="rId30"/>
+    <p:sldId id="386" r:id="rId29"/>
+    <p:sldId id="388" r:id="rId30"/>
+    <p:sldId id="389" r:id="rId31"/>
+    <p:sldId id="387" r:id="rId32"/>
+    <p:sldId id="375" r:id="rId33"/>
+    <p:sldId id="359" r:id="rId34"/>
   </p:sldIdLst>
   <p:sldSz cx="9144000" cy="6858000" type="screen4x3"/>
   <p:notesSz cx="6858000" cy="9144000"/>
@@ -2163,7 +2167,7 @@
     </p:spTree>
     <p:extLst>
       <p:ext uri="{BB962C8B-B14F-4D97-AF65-F5344CB8AC3E}">
-        <p14:creationId xmlns:p14="http://schemas.microsoft.com/office/powerpoint/2010/main" val="2536577866"/>
+        <p14:creationId xmlns:p14="http://schemas.microsoft.com/office/powerpoint/2010/main" val="487388460"/>
       </p:ext>
     </p:extLst>
   </p:cSld>
@@ -2247,7 +2251,91 @@
     </p:spTree>
     <p:extLst>
       <p:ext uri="{BB962C8B-B14F-4D97-AF65-F5344CB8AC3E}">
-        <p14:creationId xmlns:p14="http://schemas.microsoft.com/office/powerpoint/2010/main" val="1349376005"/>
+        <p14:creationId xmlns:p14="http://schemas.microsoft.com/office/powerpoint/2010/main" val="2336896474"/>
+      </p:ext>
+    </p:extLst>
+  </p:cSld>
+  <p:clrMapOvr>
+    <a:masterClrMapping/>
+  </p:clrMapOvr>
+</p:notes>
+</file>
+
+<file path=ppt/notesSlides/notesSlide29.xml><?xml version="1.0" encoding="utf-8"?>
+<p:notes xmlns:a="http://schemas.openxmlformats.org/drawingml/2006/main" xmlns:r="http://schemas.openxmlformats.org/officeDocument/2006/relationships" xmlns:p="http://schemas.openxmlformats.org/presentationml/2006/main">
+  <p:cSld>
+    <p:spTree>
+      <p:nvGrpSpPr>
+        <p:cNvPr id="1" name=""/>
+        <p:cNvGrpSpPr/>
+        <p:nvPr/>
+      </p:nvGrpSpPr>
+      <p:grpSpPr>
+        <a:xfrm>
+          <a:off x="0" y="0"/>
+          <a:ext cx="0" cy="0"/>
+          <a:chOff x="0" y="0"/>
+          <a:chExt cx="0" cy="0"/>
+        </a:xfrm>
+      </p:grpSpPr>
+      <p:sp>
+        <p:nvSpPr>
+          <p:cNvPr id="2" name="Slide Image Placeholder 1"/>
+          <p:cNvSpPr>
+            <a:spLocks noGrp="1" noRot="1" noChangeAspect="1"/>
+          </p:cNvSpPr>
+          <p:nvPr>
+            <p:ph type="sldImg"/>
+          </p:nvPr>
+        </p:nvSpPr>
+        <p:spPr/>
+      </p:sp>
+      <p:sp>
+        <p:nvSpPr>
+          <p:cNvPr id="3" name="Notes Placeholder 2"/>
+          <p:cNvSpPr>
+            <a:spLocks noGrp="1"/>
+          </p:cNvSpPr>
+          <p:nvPr>
+            <p:ph type="body" idx="1"/>
+          </p:nvPr>
+        </p:nvSpPr>
+        <p:spPr/>
+        <p:txBody>
+          <a:bodyPr/>
+          <a:lstStyle/>
+          <a:p>
+            <a:endParaRPr lang="en-US" dirty="0"/>
+          </a:p>
+        </p:txBody>
+      </p:sp>
+      <p:sp>
+        <p:nvSpPr>
+          <p:cNvPr id="4" name="Slide Number Placeholder 3"/>
+          <p:cNvSpPr>
+            <a:spLocks noGrp="1"/>
+          </p:cNvSpPr>
+          <p:nvPr>
+            <p:ph type="sldNum" sz="quarter" idx="10"/>
+          </p:nvPr>
+        </p:nvSpPr>
+        <p:spPr/>
+        <p:txBody>
+          <a:bodyPr/>
+          <a:lstStyle/>
+          <a:p>
+            <a:fld id="{035DD5C9-B5A2-47F1-BC40-0D7BD2C50D7F}" type="slidenum">
+              <a:rPr lang="en-US" smtClean="0"/>
+              <a:t>30</a:t>
+            </a:fld>
+            <a:endParaRPr lang="en-US"/>
+          </a:p>
+        </p:txBody>
+      </p:sp>
+    </p:spTree>
+    <p:extLst>
+      <p:ext uri="{BB962C8B-B14F-4D97-AF65-F5344CB8AC3E}">
+        <p14:creationId xmlns:p14="http://schemas.microsoft.com/office/powerpoint/2010/main" val="2063730947"/>
       </p:ext>
     </p:extLst>
   </p:cSld>
@@ -2332,6 +2420,258 @@
     <p:extLst>
       <p:ext uri="{BB962C8B-B14F-4D97-AF65-F5344CB8AC3E}">
         <p14:creationId xmlns:p14="http://schemas.microsoft.com/office/powerpoint/2010/main" val="792925829"/>
+      </p:ext>
+    </p:extLst>
+  </p:cSld>
+  <p:clrMapOvr>
+    <a:masterClrMapping/>
+  </p:clrMapOvr>
+</p:notes>
+</file>
+
+<file path=ppt/notesSlides/notesSlide30.xml><?xml version="1.0" encoding="utf-8"?>
+<p:notes xmlns:a="http://schemas.openxmlformats.org/drawingml/2006/main" xmlns:r="http://schemas.openxmlformats.org/officeDocument/2006/relationships" xmlns:p="http://schemas.openxmlformats.org/presentationml/2006/main">
+  <p:cSld>
+    <p:spTree>
+      <p:nvGrpSpPr>
+        <p:cNvPr id="1" name=""/>
+        <p:cNvGrpSpPr/>
+        <p:nvPr/>
+      </p:nvGrpSpPr>
+      <p:grpSpPr>
+        <a:xfrm>
+          <a:off x="0" y="0"/>
+          <a:ext cx="0" cy="0"/>
+          <a:chOff x="0" y="0"/>
+          <a:chExt cx="0" cy="0"/>
+        </a:xfrm>
+      </p:grpSpPr>
+      <p:sp>
+        <p:nvSpPr>
+          <p:cNvPr id="2" name="Slide Image Placeholder 1"/>
+          <p:cNvSpPr>
+            <a:spLocks noGrp="1" noRot="1" noChangeAspect="1"/>
+          </p:cNvSpPr>
+          <p:nvPr>
+            <p:ph type="sldImg"/>
+          </p:nvPr>
+        </p:nvSpPr>
+        <p:spPr/>
+      </p:sp>
+      <p:sp>
+        <p:nvSpPr>
+          <p:cNvPr id="3" name="Notes Placeholder 2"/>
+          <p:cNvSpPr>
+            <a:spLocks noGrp="1"/>
+          </p:cNvSpPr>
+          <p:nvPr>
+            <p:ph type="body" idx="1"/>
+          </p:nvPr>
+        </p:nvSpPr>
+        <p:spPr/>
+        <p:txBody>
+          <a:bodyPr/>
+          <a:lstStyle/>
+          <a:p>
+            <a:endParaRPr lang="en-US" dirty="0"/>
+          </a:p>
+        </p:txBody>
+      </p:sp>
+      <p:sp>
+        <p:nvSpPr>
+          <p:cNvPr id="4" name="Slide Number Placeholder 3"/>
+          <p:cNvSpPr>
+            <a:spLocks noGrp="1"/>
+          </p:cNvSpPr>
+          <p:nvPr>
+            <p:ph type="sldNum" sz="quarter" idx="10"/>
+          </p:nvPr>
+        </p:nvSpPr>
+        <p:spPr/>
+        <p:txBody>
+          <a:bodyPr/>
+          <a:lstStyle/>
+          <a:p>
+            <a:fld id="{035DD5C9-B5A2-47F1-BC40-0D7BD2C50D7F}" type="slidenum">
+              <a:rPr lang="en-US" smtClean="0"/>
+              <a:t>31</a:t>
+            </a:fld>
+            <a:endParaRPr lang="en-US"/>
+          </a:p>
+        </p:txBody>
+      </p:sp>
+    </p:spTree>
+    <p:extLst>
+      <p:ext uri="{BB962C8B-B14F-4D97-AF65-F5344CB8AC3E}">
+        <p14:creationId xmlns:p14="http://schemas.microsoft.com/office/powerpoint/2010/main" val="701063222"/>
+      </p:ext>
+    </p:extLst>
+  </p:cSld>
+  <p:clrMapOvr>
+    <a:masterClrMapping/>
+  </p:clrMapOvr>
+</p:notes>
+</file>
+
+<file path=ppt/notesSlides/notesSlide31.xml><?xml version="1.0" encoding="utf-8"?>
+<p:notes xmlns:a="http://schemas.openxmlformats.org/drawingml/2006/main" xmlns:r="http://schemas.openxmlformats.org/officeDocument/2006/relationships" xmlns:p="http://schemas.openxmlformats.org/presentationml/2006/main">
+  <p:cSld>
+    <p:spTree>
+      <p:nvGrpSpPr>
+        <p:cNvPr id="1" name=""/>
+        <p:cNvGrpSpPr/>
+        <p:nvPr/>
+      </p:nvGrpSpPr>
+      <p:grpSpPr>
+        <a:xfrm>
+          <a:off x="0" y="0"/>
+          <a:ext cx="0" cy="0"/>
+          <a:chOff x="0" y="0"/>
+          <a:chExt cx="0" cy="0"/>
+        </a:xfrm>
+      </p:grpSpPr>
+      <p:sp>
+        <p:nvSpPr>
+          <p:cNvPr id="2" name="Slide Image Placeholder 1"/>
+          <p:cNvSpPr>
+            <a:spLocks noGrp="1" noRot="1" noChangeAspect="1"/>
+          </p:cNvSpPr>
+          <p:nvPr>
+            <p:ph type="sldImg"/>
+          </p:nvPr>
+        </p:nvSpPr>
+        <p:spPr/>
+      </p:sp>
+      <p:sp>
+        <p:nvSpPr>
+          <p:cNvPr id="3" name="Notes Placeholder 2"/>
+          <p:cNvSpPr>
+            <a:spLocks noGrp="1"/>
+          </p:cNvSpPr>
+          <p:nvPr>
+            <p:ph type="body" idx="1"/>
+          </p:nvPr>
+        </p:nvSpPr>
+        <p:spPr/>
+        <p:txBody>
+          <a:bodyPr/>
+          <a:lstStyle/>
+          <a:p>
+            <a:endParaRPr lang="en-US" dirty="0"/>
+          </a:p>
+        </p:txBody>
+      </p:sp>
+      <p:sp>
+        <p:nvSpPr>
+          <p:cNvPr id="4" name="Slide Number Placeholder 3"/>
+          <p:cNvSpPr>
+            <a:spLocks noGrp="1"/>
+          </p:cNvSpPr>
+          <p:nvPr>
+            <p:ph type="sldNum" sz="quarter" idx="10"/>
+          </p:nvPr>
+        </p:nvSpPr>
+        <p:spPr/>
+        <p:txBody>
+          <a:bodyPr/>
+          <a:lstStyle/>
+          <a:p>
+            <a:fld id="{035DD5C9-B5A2-47F1-BC40-0D7BD2C50D7F}" type="slidenum">
+              <a:rPr lang="en-US" smtClean="0"/>
+              <a:t>32</a:t>
+            </a:fld>
+            <a:endParaRPr lang="en-US"/>
+          </a:p>
+        </p:txBody>
+      </p:sp>
+    </p:spTree>
+    <p:extLst>
+      <p:ext uri="{BB962C8B-B14F-4D97-AF65-F5344CB8AC3E}">
+        <p14:creationId xmlns:p14="http://schemas.microsoft.com/office/powerpoint/2010/main" val="2536577866"/>
+      </p:ext>
+    </p:extLst>
+  </p:cSld>
+  <p:clrMapOvr>
+    <a:masterClrMapping/>
+  </p:clrMapOvr>
+</p:notes>
+</file>
+
+<file path=ppt/notesSlides/notesSlide32.xml><?xml version="1.0" encoding="utf-8"?>
+<p:notes xmlns:a="http://schemas.openxmlformats.org/drawingml/2006/main" xmlns:r="http://schemas.openxmlformats.org/officeDocument/2006/relationships" xmlns:p="http://schemas.openxmlformats.org/presentationml/2006/main">
+  <p:cSld>
+    <p:spTree>
+      <p:nvGrpSpPr>
+        <p:cNvPr id="1" name=""/>
+        <p:cNvGrpSpPr/>
+        <p:nvPr/>
+      </p:nvGrpSpPr>
+      <p:grpSpPr>
+        <a:xfrm>
+          <a:off x="0" y="0"/>
+          <a:ext cx="0" cy="0"/>
+          <a:chOff x="0" y="0"/>
+          <a:chExt cx="0" cy="0"/>
+        </a:xfrm>
+      </p:grpSpPr>
+      <p:sp>
+        <p:nvSpPr>
+          <p:cNvPr id="2" name="Slide Image Placeholder 1"/>
+          <p:cNvSpPr>
+            <a:spLocks noGrp="1" noRot="1" noChangeAspect="1"/>
+          </p:cNvSpPr>
+          <p:nvPr>
+            <p:ph type="sldImg"/>
+          </p:nvPr>
+        </p:nvSpPr>
+        <p:spPr/>
+      </p:sp>
+      <p:sp>
+        <p:nvSpPr>
+          <p:cNvPr id="3" name="Notes Placeholder 2"/>
+          <p:cNvSpPr>
+            <a:spLocks noGrp="1"/>
+          </p:cNvSpPr>
+          <p:nvPr>
+            <p:ph type="body" idx="1"/>
+          </p:nvPr>
+        </p:nvSpPr>
+        <p:spPr/>
+        <p:txBody>
+          <a:bodyPr/>
+          <a:lstStyle/>
+          <a:p>
+            <a:endParaRPr lang="en-US" dirty="0"/>
+          </a:p>
+        </p:txBody>
+      </p:sp>
+      <p:sp>
+        <p:nvSpPr>
+          <p:cNvPr id="4" name="Slide Number Placeholder 3"/>
+          <p:cNvSpPr>
+            <a:spLocks noGrp="1"/>
+          </p:cNvSpPr>
+          <p:nvPr>
+            <p:ph type="sldNum" sz="quarter" idx="10"/>
+          </p:nvPr>
+        </p:nvSpPr>
+        <p:spPr/>
+        <p:txBody>
+          <a:bodyPr/>
+          <a:lstStyle/>
+          <a:p>
+            <a:fld id="{035DD5C9-B5A2-47F1-BC40-0D7BD2C50D7F}" type="slidenum">
+              <a:rPr lang="en-US" smtClean="0"/>
+              <a:t>33</a:t>
+            </a:fld>
+            <a:endParaRPr lang="en-US"/>
+          </a:p>
+        </p:txBody>
+      </p:sp>
+    </p:spTree>
+    <p:extLst>
+      <p:ext uri="{BB962C8B-B14F-4D97-AF65-F5344CB8AC3E}">
+        <p14:creationId xmlns:p14="http://schemas.microsoft.com/office/powerpoint/2010/main" val="1349376005"/>
       </p:ext>
     </p:extLst>
   </p:cSld>
@@ -10241,7 +10581,7 @@
         </p:blipFill>
         <p:spPr>
           <a:xfrm>
-            <a:off x="289189" y="1288133"/>
+            <a:off x="685207" y="1298518"/>
             <a:ext cx="3267811" cy="2331611"/>
           </a:xfrm>
           <a:prstGeom prst="rect">
@@ -10271,7 +10611,7 @@
         </p:blipFill>
         <p:spPr>
           <a:xfrm>
-            <a:off x="3679750" y="1359521"/>
+            <a:off x="4444378" y="1309524"/>
             <a:ext cx="3305370" cy="2358410"/>
           </a:xfrm>
           <a:prstGeom prst="rect">
@@ -10295,7 +10635,7 @@
         </p:blipFill>
         <p:spPr>
           <a:xfrm>
-            <a:off x="322895" y="4064295"/>
+            <a:off x="685207" y="4064295"/>
             <a:ext cx="3326827" cy="2764291"/>
           </a:xfrm>
           <a:prstGeom prst="rect">
@@ -10425,7 +10765,7 @@
         </p:blipFill>
         <p:spPr>
           <a:xfrm>
-            <a:off x="3780662" y="4093709"/>
+            <a:off x="4434913" y="4062293"/>
             <a:ext cx="3324299" cy="2764291"/>
           </a:xfrm>
           <a:prstGeom prst="rect">
@@ -11719,7 +12059,7 @@
               <a:t> </a:t>
             </a:r>
             <a:r>
-              <a:rPr lang="tr-TR" dirty="0" err="1" smtClean="0">
+              <a:rPr lang="tr-TR" b="1" dirty="0" err="1" smtClean="0">
                 <a:solidFill>
                   <a:srgbClr val="002060"/>
                 </a:solidFill>
@@ -28772,6 +29112,30 @@
           <a:chExt cx="0" cy="0"/>
         </a:xfrm>
       </p:grpSpPr>
+      <p:pic>
+        <p:nvPicPr>
+          <p:cNvPr id="2" name="Picture 1"/>
+          <p:cNvPicPr>
+            <a:picLocks noChangeAspect="1"/>
+          </p:cNvPicPr>
+          <p:nvPr/>
+        </p:nvPicPr>
+        <p:blipFill>
+          <a:blip r:embed="rId3"/>
+          <a:stretch>
+            <a:fillRect/>
+          </a:stretch>
+        </p:blipFill>
+        <p:spPr>
+          <a:xfrm>
+            <a:off x="778515" y="923405"/>
+            <a:ext cx="7041182" cy="5625825"/>
+          </a:xfrm>
+          <a:prstGeom prst="rect">
+            <a:avLst/>
+          </a:prstGeom>
+        </p:spPr>
+      </p:pic>
       <p:sp>
         <p:nvSpPr>
           <p:cNvPr id="8" name="Rectangle 7"/>
@@ -28795,7 +29159,7 @@
           <a:p>
             <a:pPr algn="ctr"/>
             <a:r>
-              <a:rPr lang="tr-TR" sz="2800" b="1" dirty="0" err="1" smtClean="0">
+              <a:rPr lang="en-US" sz="2800" b="1" dirty="0" smtClean="0">
                 <a:solidFill>
                   <a:schemeClr val="accent1">
                     <a:lumMod val="50000"/>
@@ -28803,10 +29167,10 @@
                 </a:solidFill>
                 <a:cs typeface="Arial" panose="020B0604020202020204" pitchFamily="34" charset="0"/>
               </a:rPr>
-              <a:t>Unbalance</a:t>
-            </a:r>
-            <a:r>
-              <a:rPr lang="tr-TR" sz="2800" b="1" dirty="0" smtClean="0">
+              <a:t>2-parallel </a:t>
+            </a:r>
+            <a:r>
+              <a:rPr lang="en-US" sz="2800" b="1" dirty="0">
                 <a:solidFill>
                   <a:schemeClr val="accent1">
                     <a:lumMod val="50000"/>
@@ -28814,10 +29178,10 @@
                 </a:solidFill>
                 <a:cs typeface="Arial" panose="020B0604020202020204" pitchFamily="34" charset="0"/>
               </a:rPr>
-              <a:t> on </a:t>
-            </a:r>
-            <a:r>
-              <a:rPr lang="tr-TR" sz="2800" b="1" dirty="0" err="1" smtClean="0">
+              <a:t>with and without </a:t>
+            </a:r>
+            <a:r>
+              <a:rPr lang="en-US" sz="2800" b="1" dirty="0" smtClean="0">
                 <a:solidFill>
                   <a:schemeClr val="accent1">
                     <a:lumMod val="50000"/>
@@ -28825,13 +29189,549 @@
                 </a:solidFill>
                 <a:cs typeface="Arial" panose="020B0604020202020204" pitchFamily="34" charset="0"/>
               </a:rPr>
-              <a:t>Load</a:t>
+              <a:t>interleaving</a:t>
+            </a:r>
+            <a:r>
+              <a:rPr lang="tr-TR" sz="2800" b="1" dirty="0" smtClean="0">
+                <a:solidFill>
+                  <a:schemeClr val="accent1">
+                    <a:lumMod val="50000"/>
+                  </a:schemeClr>
+                </a:solidFill>
+                <a:cs typeface="Arial" panose="020B0604020202020204" pitchFamily="34" charset="0"/>
+              </a:rPr>
+              <a:t> </a:t>
             </a:r>
             <a:endParaRPr lang="en-US" sz="2800" dirty="0">
               <a:solidFill>
                 <a:schemeClr val="accent1">
                   <a:lumMod val="50000"/>
                 </a:schemeClr>
+              </a:solidFill>
+              <a:cs typeface="Arial" panose="020B0604020202020204" pitchFamily="34" charset="0"/>
+            </a:endParaRPr>
+          </a:p>
+        </p:txBody>
+      </p:sp>
+      <p:cxnSp>
+        <p:nvCxnSpPr>
+          <p:cNvPr id="9" name="Straight Arrow Connector 8"/>
+          <p:cNvCxnSpPr/>
+          <p:nvPr/>
+        </p:nvCxnSpPr>
+        <p:spPr>
+          <a:xfrm>
+            <a:off x="3591128" y="2222573"/>
+            <a:ext cx="163104" cy="0"/>
+          </a:xfrm>
+          <a:prstGeom prst="straightConnector1">
+            <a:avLst/>
+          </a:prstGeom>
+          <a:ln w="19050">
+            <a:solidFill>
+              <a:srgbClr val="FF0000"/>
+            </a:solidFill>
+            <a:tailEnd type="triangle"/>
+          </a:ln>
+        </p:spPr>
+        <p:style>
+          <a:lnRef idx="1">
+            <a:schemeClr val="accent1"/>
+          </a:lnRef>
+          <a:fillRef idx="0">
+            <a:schemeClr val="accent1"/>
+          </a:fillRef>
+          <a:effectRef idx="0">
+            <a:schemeClr val="accent1"/>
+          </a:effectRef>
+          <a:fontRef idx="minor">
+            <a:schemeClr val="tx1"/>
+          </a:fontRef>
+        </p:style>
+      </p:cxnSp>
+      <p:sp>
+        <p:nvSpPr>
+          <p:cNvPr id="10" name="Rectangle 9"/>
+          <p:cNvSpPr/>
+          <p:nvPr/>
+        </p:nvSpPr>
+        <p:spPr>
+          <a:xfrm>
+            <a:off x="3383365" y="1914796"/>
+            <a:ext cx="578629" cy="307777"/>
+          </a:xfrm>
+          <a:prstGeom prst="rect">
+            <a:avLst/>
+          </a:prstGeom>
+        </p:spPr>
+        <p:txBody>
+          <a:bodyPr wrap="square">
+            <a:spAutoFit/>
+          </a:bodyPr>
+          <a:lstStyle/>
+          <a:p>
+            <a:r>
+              <a:rPr lang="tr-TR" sz="1400" dirty="0" smtClean="0">
+                <a:solidFill>
+                  <a:srgbClr val="FF0000"/>
+                </a:solidFill>
+                <a:cs typeface="Arial" panose="020B0604020202020204" pitchFamily="34" charset="0"/>
+              </a:rPr>
+              <a:t>Idc1</a:t>
+            </a:r>
+            <a:endParaRPr lang="tr-TR" sz="1400" dirty="0" smtClean="0">
+              <a:solidFill>
+                <a:srgbClr val="FF0000"/>
+              </a:solidFill>
+              <a:cs typeface="Arial" panose="020B0604020202020204" pitchFamily="34" charset="0"/>
+            </a:endParaRPr>
+          </a:p>
+        </p:txBody>
+      </p:sp>
+      <p:cxnSp>
+        <p:nvCxnSpPr>
+          <p:cNvPr id="11" name="Straight Arrow Connector 10"/>
+          <p:cNvCxnSpPr/>
+          <p:nvPr/>
+        </p:nvCxnSpPr>
+        <p:spPr>
+          <a:xfrm>
+            <a:off x="3591128" y="4881690"/>
+            <a:ext cx="163104" cy="0"/>
+          </a:xfrm>
+          <a:prstGeom prst="straightConnector1">
+            <a:avLst/>
+          </a:prstGeom>
+          <a:ln w="19050">
+            <a:solidFill>
+              <a:srgbClr val="FF0000"/>
+            </a:solidFill>
+            <a:tailEnd type="triangle"/>
+          </a:ln>
+        </p:spPr>
+        <p:style>
+          <a:lnRef idx="1">
+            <a:schemeClr val="accent1"/>
+          </a:lnRef>
+          <a:fillRef idx="0">
+            <a:schemeClr val="accent1"/>
+          </a:fillRef>
+          <a:effectRef idx="0">
+            <a:schemeClr val="accent1"/>
+          </a:effectRef>
+          <a:fontRef idx="minor">
+            <a:schemeClr val="tx1"/>
+          </a:fontRef>
+        </p:style>
+      </p:cxnSp>
+      <p:sp>
+        <p:nvSpPr>
+          <p:cNvPr id="12" name="Rectangle 11"/>
+          <p:cNvSpPr/>
+          <p:nvPr/>
+        </p:nvSpPr>
+        <p:spPr>
+          <a:xfrm>
+            <a:off x="3383365" y="4573913"/>
+            <a:ext cx="578629" cy="307777"/>
+          </a:xfrm>
+          <a:prstGeom prst="rect">
+            <a:avLst/>
+          </a:prstGeom>
+        </p:spPr>
+        <p:txBody>
+          <a:bodyPr wrap="square">
+            <a:spAutoFit/>
+          </a:bodyPr>
+          <a:lstStyle/>
+          <a:p>
+            <a:r>
+              <a:rPr lang="tr-TR" sz="1400" dirty="0" smtClean="0">
+                <a:solidFill>
+                  <a:srgbClr val="FF0000"/>
+                </a:solidFill>
+                <a:cs typeface="Arial" panose="020B0604020202020204" pitchFamily="34" charset="0"/>
+              </a:rPr>
+              <a:t>Idc2</a:t>
+            </a:r>
+            <a:endParaRPr lang="tr-TR" sz="1400" dirty="0" smtClean="0">
+              <a:solidFill>
+                <a:srgbClr val="FF0000"/>
+              </a:solidFill>
+              <a:cs typeface="Arial" panose="020B0604020202020204" pitchFamily="34" charset="0"/>
+            </a:endParaRPr>
+          </a:p>
+        </p:txBody>
+      </p:sp>
+      <p:cxnSp>
+        <p:nvCxnSpPr>
+          <p:cNvPr id="13" name="Straight Arrow Connector 12"/>
+          <p:cNvCxnSpPr/>
+          <p:nvPr/>
+        </p:nvCxnSpPr>
+        <p:spPr>
+          <a:xfrm>
+            <a:off x="2908617" y="2224836"/>
+            <a:ext cx="163104" cy="0"/>
+          </a:xfrm>
+          <a:prstGeom prst="straightConnector1">
+            <a:avLst/>
+          </a:prstGeom>
+          <a:ln w="19050">
+            <a:solidFill>
+              <a:srgbClr val="FF0000"/>
+            </a:solidFill>
+            <a:tailEnd type="triangle"/>
+          </a:ln>
+        </p:spPr>
+        <p:style>
+          <a:lnRef idx="1">
+            <a:schemeClr val="accent1"/>
+          </a:lnRef>
+          <a:fillRef idx="0">
+            <a:schemeClr val="accent1"/>
+          </a:fillRef>
+          <a:effectRef idx="0">
+            <a:schemeClr val="accent1"/>
+          </a:effectRef>
+          <a:fontRef idx="minor">
+            <a:schemeClr val="tx1"/>
+          </a:fontRef>
+        </p:style>
+      </p:cxnSp>
+      <p:sp>
+        <p:nvSpPr>
+          <p:cNvPr id="17" name="Rectangle 16"/>
+          <p:cNvSpPr/>
+          <p:nvPr/>
+        </p:nvSpPr>
+        <p:spPr>
+          <a:xfrm>
+            <a:off x="2700854" y="1917059"/>
+            <a:ext cx="578629" cy="307777"/>
+          </a:xfrm>
+          <a:prstGeom prst="rect">
+            <a:avLst/>
+          </a:prstGeom>
+        </p:spPr>
+        <p:txBody>
+          <a:bodyPr wrap="square">
+            <a:spAutoFit/>
+          </a:bodyPr>
+          <a:lstStyle/>
+          <a:p>
+            <a:r>
+              <a:rPr lang="tr-TR" sz="1400" dirty="0" smtClean="0">
+                <a:solidFill>
+                  <a:srgbClr val="FF0000"/>
+                </a:solidFill>
+                <a:cs typeface="Arial" panose="020B0604020202020204" pitchFamily="34" charset="0"/>
+              </a:rPr>
+              <a:t>Iin1</a:t>
+            </a:r>
+            <a:endParaRPr lang="tr-TR" sz="1400" dirty="0" smtClean="0">
+              <a:solidFill>
+                <a:srgbClr val="FF0000"/>
+              </a:solidFill>
+              <a:cs typeface="Arial" panose="020B0604020202020204" pitchFamily="34" charset="0"/>
+            </a:endParaRPr>
+          </a:p>
+        </p:txBody>
+      </p:sp>
+      <p:cxnSp>
+        <p:nvCxnSpPr>
+          <p:cNvPr id="18" name="Straight Arrow Connector 17"/>
+          <p:cNvCxnSpPr/>
+          <p:nvPr/>
+        </p:nvCxnSpPr>
+        <p:spPr>
+          <a:xfrm>
+            <a:off x="2886448" y="4878333"/>
+            <a:ext cx="163104" cy="0"/>
+          </a:xfrm>
+          <a:prstGeom prst="straightConnector1">
+            <a:avLst/>
+          </a:prstGeom>
+          <a:ln w="19050">
+            <a:solidFill>
+              <a:srgbClr val="FF0000"/>
+            </a:solidFill>
+            <a:tailEnd type="triangle"/>
+          </a:ln>
+        </p:spPr>
+        <p:style>
+          <a:lnRef idx="1">
+            <a:schemeClr val="accent1"/>
+          </a:lnRef>
+          <a:fillRef idx="0">
+            <a:schemeClr val="accent1"/>
+          </a:fillRef>
+          <a:effectRef idx="0">
+            <a:schemeClr val="accent1"/>
+          </a:effectRef>
+          <a:fontRef idx="minor">
+            <a:schemeClr val="tx1"/>
+          </a:fontRef>
+        </p:style>
+      </p:cxnSp>
+      <p:sp>
+        <p:nvSpPr>
+          <p:cNvPr id="19" name="Rectangle 18"/>
+          <p:cNvSpPr/>
+          <p:nvPr/>
+        </p:nvSpPr>
+        <p:spPr>
+          <a:xfrm>
+            <a:off x="2678685" y="4570556"/>
+            <a:ext cx="578629" cy="307777"/>
+          </a:xfrm>
+          <a:prstGeom prst="rect">
+            <a:avLst/>
+          </a:prstGeom>
+        </p:spPr>
+        <p:txBody>
+          <a:bodyPr wrap="square">
+            <a:spAutoFit/>
+          </a:bodyPr>
+          <a:lstStyle/>
+          <a:p>
+            <a:r>
+              <a:rPr lang="tr-TR" sz="1400" dirty="0" smtClean="0">
+                <a:solidFill>
+                  <a:srgbClr val="FF0000"/>
+                </a:solidFill>
+                <a:cs typeface="Arial" panose="020B0604020202020204" pitchFamily="34" charset="0"/>
+              </a:rPr>
+              <a:t>Iin2</a:t>
+            </a:r>
+            <a:endParaRPr lang="tr-TR" sz="1400" dirty="0" smtClean="0">
+              <a:solidFill>
+                <a:srgbClr val="FF0000"/>
+              </a:solidFill>
+              <a:cs typeface="Arial" panose="020B0604020202020204" pitchFamily="34" charset="0"/>
+            </a:endParaRPr>
+          </a:p>
+        </p:txBody>
+      </p:sp>
+      <p:cxnSp>
+        <p:nvCxnSpPr>
+          <p:cNvPr id="20" name="Straight Arrow Connector 19"/>
+          <p:cNvCxnSpPr/>
+          <p:nvPr/>
+        </p:nvCxnSpPr>
+        <p:spPr>
+          <a:xfrm>
+            <a:off x="2463480" y="2227099"/>
+            <a:ext cx="163104" cy="0"/>
+          </a:xfrm>
+          <a:prstGeom prst="straightConnector1">
+            <a:avLst/>
+          </a:prstGeom>
+          <a:ln w="19050">
+            <a:solidFill>
+              <a:srgbClr val="FF0000"/>
+            </a:solidFill>
+            <a:tailEnd type="triangle"/>
+          </a:ln>
+        </p:spPr>
+        <p:style>
+          <a:lnRef idx="1">
+            <a:schemeClr val="accent1"/>
+          </a:lnRef>
+          <a:fillRef idx="0">
+            <a:schemeClr val="accent1"/>
+          </a:fillRef>
+          <a:effectRef idx="0">
+            <a:schemeClr val="accent1"/>
+          </a:effectRef>
+          <a:fontRef idx="minor">
+            <a:schemeClr val="tx1"/>
+          </a:fontRef>
+        </p:style>
+      </p:cxnSp>
+      <p:sp>
+        <p:nvSpPr>
+          <p:cNvPr id="21" name="Rectangle 20"/>
+          <p:cNvSpPr/>
+          <p:nvPr/>
+        </p:nvSpPr>
+        <p:spPr>
+          <a:xfrm>
+            <a:off x="2255717" y="1919322"/>
+            <a:ext cx="578629" cy="307777"/>
+          </a:xfrm>
+          <a:prstGeom prst="rect">
+            <a:avLst/>
+          </a:prstGeom>
+        </p:spPr>
+        <p:txBody>
+          <a:bodyPr wrap="square">
+            <a:spAutoFit/>
+          </a:bodyPr>
+          <a:lstStyle/>
+          <a:p>
+            <a:r>
+              <a:rPr lang="tr-TR" sz="1400" dirty="0" err="1" smtClean="0">
+                <a:solidFill>
+                  <a:srgbClr val="FF0000"/>
+                </a:solidFill>
+                <a:cs typeface="Arial" panose="020B0604020202020204" pitchFamily="34" charset="0"/>
+              </a:rPr>
+              <a:t>Iin</a:t>
+            </a:r>
+            <a:endParaRPr lang="tr-TR" sz="1400" dirty="0" smtClean="0">
+              <a:solidFill>
+                <a:srgbClr val="FF0000"/>
+              </a:solidFill>
+              <a:cs typeface="Arial" panose="020B0604020202020204" pitchFamily="34" charset="0"/>
+            </a:endParaRPr>
+          </a:p>
+        </p:txBody>
+      </p:sp>
+      <p:cxnSp>
+        <p:nvCxnSpPr>
+          <p:cNvPr id="22" name="Straight Arrow Connector 21"/>
+          <p:cNvCxnSpPr/>
+          <p:nvPr/>
+        </p:nvCxnSpPr>
+        <p:spPr>
+          <a:xfrm flipV="1">
+            <a:off x="3392910" y="2530365"/>
+            <a:ext cx="0" cy="428343"/>
+          </a:xfrm>
+          <a:prstGeom prst="straightConnector1">
+            <a:avLst/>
+          </a:prstGeom>
+          <a:ln w="19050">
+            <a:solidFill>
+              <a:srgbClr val="FF0000"/>
+            </a:solidFill>
+            <a:tailEnd type="triangle"/>
+          </a:ln>
+        </p:spPr>
+        <p:style>
+          <a:lnRef idx="1">
+            <a:schemeClr val="accent1"/>
+          </a:lnRef>
+          <a:fillRef idx="0">
+            <a:schemeClr val="accent1"/>
+          </a:fillRef>
+          <a:effectRef idx="0">
+            <a:schemeClr val="accent1"/>
+          </a:effectRef>
+          <a:fontRef idx="minor">
+            <a:schemeClr val="tx1"/>
+          </a:fontRef>
+        </p:style>
+      </p:cxnSp>
+      <p:sp>
+        <p:nvSpPr>
+          <p:cNvPr id="23" name="Rectangle 22"/>
+          <p:cNvSpPr/>
+          <p:nvPr/>
+        </p:nvSpPr>
+        <p:spPr>
+          <a:xfrm>
+            <a:off x="2883038" y="2745770"/>
+            <a:ext cx="578629" cy="307777"/>
+          </a:xfrm>
+          <a:prstGeom prst="rect">
+            <a:avLst/>
+          </a:prstGeom>
+        </p:spPr>
+        <p:txBody>
+          <a:bodyPr wrap="square">
+            <a:spAutoFit/>
+          </a:bodyPr>
+          <a:lstStyle/>
+          <a:p>
+            <a:r>
+              <a:rPr lang="tr-TR" sz="1400" dirty="0" smtClean="0">
+                <a:solidFill>
+                  <a:srgbClr val="FF0000"/>
+                </a:solidFill>
+                <a:cs typeface="Arial" panose="020B0604020202020204" pitchFamily="34" charset="0"/>
+              </a:rPr>
+              <a:t>Vdc1</a:t>
+            </a:r>
+            <a:endParaRPr lang="tr-TR" sz="1400" dirty="0" smtClean="0">
+              <a:solidFill>
+                <a:srgbClr val="FF0000"/>
+              </a:solidFill>
+              <a:cs typeface="Arial" panose="020B0604020202020204" pitchFamily="34" charset="0"/>
+            </a:endParaRPr>
+          </a:p>
+        </p:txBody>
+      </p:sp>
+      <p:cxnSp>
+        <p:nvCxnSpPr>
+          <p:cNvPr id="24" name="Straight Arrow Connector 23"/>
+          <p:cNvCxnSpPr/>
+          <p:nvPr/>
+        </p:nvCxnSpPr>
+        <p:spPr>
+          <a:xfrm flipV="1">
+            <a:off x="3369002" y="5100189"/>
+            <a:ext cx="0" cy="428343"/>
+          </a:xfrm>
+          <a:prstGeom prst="straightConnector1">
+            <a:avLst/>
+          </a:prstGeom>
+          <a:ln w="19050">
+            <a:solidFill>
+              <a:srgbClr val="FF0000"/>
+            </a:solidFill>
+            <a:tailEnd type="triangle"/>
+          </a:ln>
+        </p:spPr>
+        <p:style>
+          <a:lnRef idx="1">
+            <a:schemeClr val="accent1"/>
+          </a:lnRef>
+          <a:fillRef idx="0">
+            <a:schemeClr val="accent1"/>
+          </a:fillRef>
+          <a:effectRef idx="0">
+            <a:schemeClr val="accent1"/>
+          </a:effectRef>
+          <a:fontRef idx="minor">
+            <a:schemeClr val="tx1"/>
+          </a:fontRef>
+        </p:style>
+      </p:cxnSp>
+      <p:sp>
+        <p:nvSpPr>
+          <p:cNvPr id="25" name="Rectangle 24"/>
+          <p:cNvSpPr/>
+          <p:nvPr/>
+        </p:nvSpPr>
+        <p:spPr>
+          <a:xfrm>
+            <a:off x="2859130" y="5315594"/>
+            <a:ext cx="578629" cy="307777"/>
+          </a:xfrm>
+          <a:prstGeom prst="rect">
+            <a:avLst/>
+          </a:prstGeom>
+        </p:spPr>
+        <p:txBody>
+          <a:bodyPr wrap="square">
+            <a:spAutoFit/>
+          </a:bodyPr>
+          <a:lstStyle/>
+          <a:p>
+            <a:r>
+              <a:rPr lang="tr-TR" sz="1400" dirty="0" smtClean="0">
+                <a:solidFill>
+                  <a:srgbClr val="FF0000"/>
+                </a:solidFill>
+                <a:cs typeface="Arial" panose="020B0604020202020204" pitchFamily="34" charset="0"/>
+              </a:rPr>
+              <a:t>Vdc2</a:t>
+            </a:r>
+            <a:endParaRPr lang="tr-TR" sz="1400" dirty="0" smtClean="0">
+              <a:solidFill>
+                <a:srgbClr val="FF0000"/>
               </a:solidFill>
               <a:cs typeface="Arial" panose="020B0604020202020204" pitchFamily="34" charset="0"/>
             </a:endParaRPr>
@@ -28875,39 +29775,1255 @@
           <a:chExt cx="0" cy="0"/>
         </a:xfrm>
       </p:grpSpPr>
+      <p:sp>
+        <p:nvSpPr>
+          <p:cNvPr id="8" name="Rectangle 7"/>
+          <p:cNvSpPr/>
+          <p:nvPr/>
+        </p:nvSpPr>
+        <p:spPr>
+          <a:xfrm>
+            <a:off x="478970" y="150669"/>
+            <a:ext cx="8207829" cy="523220"/>
+          </a:xfrm>
+          <a:prstGeom prst="rect">
+            <a:avLst/>
+          </a:prstGeom>
+        </p:spPr>
+        <p:txBody>
+          <a:bodyPr wrap="square">
+            <a:spAutoFit/>
+          </a:bodyPr>
+          <a:lstStyle/>
+          <a:p>
+            <a:pPr algn="ctr"/>
+            <a:r>
+              <a:rPr lang="en-US" sz="2800" b="1" dirty="0" smtClean="0">
+                <a:solidFill>
+                  <a:schemeClr val="accent1">
+                    <a:lumMod val="50000"/>
+                  </a:schemeClr>
+                </a:solidFill>
+                <a:cs typeface="Arial" panose="020B0604020202020204" pitchFamily="34" charset="0"/>
+              </a:rPr>
+              <a:t>2-parallel </a:t>
+            </a:r>
+            <a:r>
+              <a:rPr lang="en-US" sz="2800" b="1" dirty="0">
+                <a:solidFill>
+                  <a:schemeClr val="accent1">
+                    <a:lumMod val="50000"/>
+                  </a:schemeClr>
+                </a:solidFill>
+                <a:cs typeface="Arial" panose="020B0604020202020204" pitchFamily="34" charset="0"/>
+              </a:rPr>
+              <a:t>with and without </a:t>
+            </a:r>
+            <a:r>
+              <a:rPr lang="en-US" sz="2800" b="1" dirty="0" smtClean="0">
+                <a:solidFill>
+                  <a:schemeClr val="accent1">
+                    <a:lumMod val="50000"/>
+                  </a:schemeClr>
+                </a:solidFill>
+                <a:cs typeface="Arial" panose="020B0604020202020204" pitchFamily="34" charset="0"/>
+              </a:rPr>
+              <a:t>interleaving</a:t>
+            </a:r>
+            <a:r>
+              <a:rPr lang="tr-TR" sz="2800" b="1" dirty="0" smtClean="0">
+                <a:solidFill>
+                  <a:schemeClr val="accent1">
+                    <a:lumMod val="50000"/>
+                  </a:schemeClr>
+                </a:solidFill>
+                <a:cs typeface="Arial" panose="020B0604020202020204" pitchFamily="34" charset="0"/>
+              </a:rPr>
+              <a:t> </a:t>
+            </a:r>
+            <a:endParaRPr lang="en-US" sz="2800" dirty="0">
+              <a:solidFill>
+                <a:schemeClr val="accent1">
+                  <a:lumMod val="50000"/>
+                </a:schemeClr>
+              </a:solidFill>
+              <a:cs typeface="Arial" panose="020B0604020202020204" pitchFamily="34" charset="0"/>
+            </a:endParaRPr>
+          </a:p>
+        </p:txBody>
+      </p:sp>
+      <p:sp>
+        <p:nvSpPr>
+          <p:cNvPr id="26" name="Rectangle 25"/>
+          <p:cNvSpPr/>
+          <p:nvPr/>
+        </p:nvSpPr>
+        <p:spPr>
+          <a:xfrm>
+            <a:off x="193846" y="706938"/>
+            <a:ext cx="8950154" cy="1477328"/>
+          </a:xfrm>
+          <a:prstGeom prst="rect">
+            <a:avLst/>
+          </a:prstGeom>
+        </p:spPr>
+        <p:txBody>
+          <a:bodyPr wrap="square">
+            <a:spAutoFit/>
+          </a:bodyPr>
+          <a:lstStyle/>
+          <a:p>
+            <a:pPr marL="285750" indent="-285750">
+              <a:buFont typeface="Arial" panose="020B0604020202020204" pitchFamily="34" charset="0"/>
+              <a:buChar char="•"/>
+            </a:pPr>
+            <a:r>
+              <a:rPr lang="tr-TR" dirty="0" err="1" smtClean="0">
+                <a:solidFill>
+                  <a:srgbClr val="002060"/>
+                </a:solidFill>
+                <a:cs typeface="Arial" panose="020B0604020202020204" pitchFamily="34" charset="0"/>
+              </a:rPr>
+              <a:t>In</a:t>
+            </a:r>
+            <a:r>
+              <a:rPr lang="tr-TR" dirty="0" smtClean="0">
+                <a:solidFill>
+                  <a:srgbClr val="002060"/>
+                </a:solidFill>
+                <a:cs typeface="Arial" panose="020B0604020202020204" pitchFamily="34" charset="0"/>
+              </a:rPr>
+              <a:t> </a:t>
+            </a:r>
+            <a:r>
+              <a:rPr lang="tr-TR" dirty="0" err="1" smtClean="0">
+                <a:solidFill>
+                  <a:srgbClr val="002060"/>
+                </a:solidFill>
+                <a:cs typeface="Arial" panose="020B0604020202020204" pitchFamily="34" charset="0"/>
+              </a:rPr>
+              <a:t>the</a:t>
+            </a:r>
+            <a:r>
+              <a:rPr lang="tr-TR" dirty="0" smtClean="0">
+                <a:solidFill>
+                  <a:srgbClr val="002060"/>
+                </a:solidFill>
+                <a:cs typeface="Arial" panose="020B0604020202020204" pitchFamily="34" charset="0"/>
+              </a:rPr>
+              <a:t> </a:t>
+            </a:r>
+            <a:r>
+              <a:rPr lang="tr-TR" b="1" dirty="0" err="1" smtClean="0">
+                <a:solidFill>
+                  <a:srgbClr val="002060"/>
+                </a:solidFill>
+                <a:cs typeface="Arial" panose="020B0604020202020204" pitchFamily="34" charset="0"/>
+              </a:rPr>
+              <a:t>simplest</a:t>
+            </a:r>
+            <a:r>
+              <a:rPr lang="tr-TR" b="1" dirty="0" smtClean="0">
+                <a:solidFill>
+                  <a:srgbClr val="002060"/>
+                </a:solidFill>
+                <a:cs typeface="Arial" panose="020B0604020202020204" pitchFamily="34" charset="0"/>
+              </a:rPr>
+              <a:t> model </a:t>
+            </a:r>
+            <a:r>
+              <a:rPr lang="tr-TR" dirty="0" err="1" smtClean="0">
+                <a:solidFill>
+                  <a:srgbClr val="002060"/>
+                </a:solidFill>
+                <a:cs typeface="Arial" panose="020B0604020202020204" pitchFamily="34" charset="0"/>
+              </a:rPr>
+              <a:t>with</a:t>
+            </a:r>
+            <a:r>
+              <a:rPr lang="tr-TR" dirty="0" smtClean="0">
+                <a:solidFill>
+                  <a:srgbClr val="002060"/>
+                </a:solidFill>
+                <a:cs typeface="Arial" panose="020B0604020202020204" pitchFamily="34" charset="0"/>
+              </a:rPr>
+              <a:t> </a:t>
+            </a:r>
+            <a:r>
+              <a:rPr lang="tr-TR" b="1" dirty="0" smtClean="0">
+                <a:solidFill>
+                  <a:srgbClr val="002060"/>
+                </a:solidFill>
+                <a:cs typeface="Arial" panose="020B0604020202020204" pitchFamily="34" charset="0"/>
+              </a:rPr>
+              <a:t>2-parallel</a:t>
+            </a:r>
+            <a:r>
+              <a:rPr lang="tr-TR" dirty="0" smtClean="0">
+                <a:solidFill>
+                  <a:srgbClr val="002060"/>
+                </a:solidFill>
+                <a:cs typeface="Arial" panose="020B0604020202020204" pitchFamily="34" charset="0"/>
+              </a:rPr>
+              <a:t> </a:t>
+            </a:r>
+            <a:r>
+              <a:rPr lang="tr-TR" dirty="0" err="1" smtClean="0">
+                <a:solidFill>
+                  <a:srgbClr val="002060"/>
+                </a:solidFill>
+                <a:cs typeface="Arial" panose="020B0604020202020204" pitchFamily="34" charset="0"/>
+              </a:rPr>
+              <a:t>inverters</a:t>
+            </a:r>
+            <a:r>
+              <a:rPr lang="tr-TR" dirty="0" smtClean="0">
+                <a:solidFill>
+                  <a:srgbClr val="002060"/>
+                </a:solidFill>
+                <a:cs typeface="Arial" panose="020B0604020202020204" pitchFamily="34" charset="0"/>
+              </a:rPr>
+              <a:t>, </a:t>
+            </a:r>
+            <a:r>
+              <a:rPr lang="tr-TR" b="1" dirty="0" smtClean="0">
+                <a:solidFill>
+                  <a:srgbClr val="002060"/>
+                </a:solidFill>
+                <a:cs typeface="Arial" panose="020B0604020202020204" pitchFamily="34" charset="0"/>
+              </a:rPr>
+              <a:t>Vdc1</a:t>
+            </a:r>
+            <a:r>
+              <a:rPr lang="tr-TR" dirty="0" smtClean="0">
+                <a:solidFill>
+                  <a:srgbClr val="002060"/>
+                </a:solidFill>
+                <a:cs typeface="Arial" panose="020B0604020202020204" pitchFamily="34" charset="0"/>
+              </a:rPr>
+              <a:t> </a:t>
+            </a:r>
+            <a:r>
+              <a:rPr lang="tr-TR" dirty="0" err="1" smtClean="0">
+                <a:solidFill>
+                  <a:srgbClr val="002060"/>
+                </a:solidFill>
+                <a:cs typeface="Arial" panose="020B0604020202020204" pitchFamily="34" charset="0"/>
+              </a:rPr>
+              <a:t>and</a:t>
+            </a:r>
+            <a:r>
+              <a:rPr lang="tr-TR" dirty="0" smtClean="0">
+                <a:solidFill>
+                  <a:srgbClr val="002060"/>
+                </a:solidFill>
+                <a:cs typeface="Arial" panose="020B0604020202020204" pitchFamily="34" charset="0"/>
+              </a:rPr>
+              <a:t> </a:t>
+            </a:r>
+            <a:r>
+              <a:rPr lang="tr-TR" b="1" dirty="0" smtClean="0">
+                <a:solidFill>
+                  <a:srgbClr val="002060"/>
+                </a:solidFill>
+                <a:cs typeface="Arial" panose="020B0604020202020204" pitchFamily="34" charset="0"/>
+              </a:rPr>
+              <a:t>Vdc2</a:t>
+            </a:r>
+            <a:r>
+              <a:rPr lang="tr-TR" dirty="0" smtClean="0">
+                <a:solidFill>
+                  <a:srgbClr val="002060"/>
+                </a:solidFill>
+                <a:cs typeface="Arial" panose="020B0604020202020204" pitchFamily="34" charset="0"/>
+              </a:rPr>
+              <a:t> </a:t>
+            </a:r>
+            <a:r>
+              <a:rPr lang="tr-TR" dirty="0" err="1" smtClean="0">
+                <a:solidFill>
+                  <a:srgbClr val="002060"/>
+                </a:solidFill>
+                <a:cs typeface="Arial" panose="020B0604020202020204" pitchFamily="34" charset="0"/>
+              </a:rPr>
+              <a:t>are</a:t>
+            </a:r>
+            <a:r>
+              <a:rPr lang="tr-TR" dirty="0" smtClean="0">
+                <a:solidFill>
+                  <a:srgbClr val="002060"/>
+                </a:solidFill>
+                <a:cs typeface="Arial" panose="020B0604020202020204" pitchFamily="34" charset="0"/>
+              </a:rPr>
+              <a:t> </a:t>
+            </a:r>
+            <a:r>
+              <a:rPr lang="tr-TR" dirty="0" err="1" smtClean="0">
+                <a:solidFill>
+                  <a:srgbClr val="002060"/>
+                </a:solidFill>
+                <a:cs typeface="Arial" panose="020B0604020202020204" pitchFamily="34" charset="0"/>
+              </a:rPr>
+              <a:t>the</a:t>
+            </a:r>
+            <a:r>
+              <a:rPr lang="tr-TR" dirty="0" smtClean="0">
+                <a:solidFill>
+                  <a:srgbClr val="002060"/>
+                </a:solidFill>
+                <a:cs typeface="Arial" panose="020B0604020202020204" pitchFamily="34" charset="0"/>
+              </a:rPr>
+              <a:t> </a:t>
+            </a:r>
+            <a:r>
+              <a:rPr lang="tr-TR" dirty="0" err="1" smtClean="0">
+                <a:solidFill>
+                  <a:srgbClr val="002060"/>
+                </a:solidFill>
+                <a:cs typeface="Arial" panose="020B0604020202020204" pitchFamily="34" charset="0"/>
+              </a:rPr>
+              <a:t>same</a:t>
+            </a:r>
+            <a:r>
+              <a:rPr lang="tr-TR" dirty="0" smtClean="0">
+                <a:solidFill>
+                  <a:srgbClr val="002060"/>
+                </a:solidFill>
+                <a:cs typeface="Arial" panose="020B0604020202020204" pitchFamily="34" charset="0"/>
+              </a:rPr>
+              <a:t>. </a:t>
+            </a:r>
+            <a:r>
+              <a:rPr lang="tr-TR" dirty="0" err="1" smtClean="0">
+                <a:solidFill>
+                  <a:srgbClr val="002060"/>
+                </a:solidFill>
+                <a:cs typeface="Arial" panose="020B0604020202020204" pitchFamily="34" charset="0"/>
+              </a:rPr>
+              <a:t>Therefore</a:t>
+            </a:r>
+            <a:r>
+              <a:rPr lang="tr-TR" dirty="0" smtClean="0">
+                <a:solidFill>
+                  <a:srgbClr val="002060"/>
+                </a:solidFill>
+                <a:cs typeface="Arial" panose="020B0604020202020204" pitchFamily="34" charset="0"/>
+              </a:rPr>
+              <a:t>, </a:t>
+            </a:r>
+            <a:r>
+              <a:rPr lang="tr-TR" dirty="0" err="1" smtClean="0">
+                <a:solidFill>
+                  <a:srgbClr val="002060"/>
+                </a:solidFill>
+                <a:cs typeface="Arial" panose="020B0604020202020204" pitchFamily="34" charset="0"/>
+              </a:rPr>
+              <a:t>the</a:t>
+            </a:r>
+            <a:r>
+              <a:rPr lang="tr-TR" dirty="0" smtClean="0">
+                <a:solidFill>
+                  <a:srgbClr val="002060"/>
+                </a:solidFill>
+                <a:cs typeface="Arial" panose="020B0604020202020204" pitchFamily="34" charset="0"/>
+              </a:rPr>
+              <a:t> </a:t>
+            </a:r>
+            <a:r>
+              <a:rPr lang="tr-TR" dirty="0" err="1" smtClean="0">
+                <a:solidFill>
+                  <a:srgbClr val="002060"/>
+                </a:solidFill>
+                <a:cs typeface="Arial" panose="020B0604020202020204" pitchFamily="34" charset="0"/>
+              </a:rPr>
+              <a:t>system</a:t>
+            </a:r>
+            <a:r>
+              <a:rPr lang="tr-TR" dirty="0" smtClean="0">
+                <a:solidFill>
+                  <a:srgbClr val="002060"/>
+                </a:solidFill>
+                <a:cs typeface="Arial" panose="020B0604020202020204" pitchFamily="34" charset="0"/>
+              </a:rPr>
+              <a:t> is </a:t>
+            </a:r>
+            <a:r>
+              <a:rPr lang="tr-TR" dirty="0" err="1" smtClean="0">
+                <a:solidFill>
+                  <a:srgbClr val="002060"/>
+                </a:solidFill>
+                <a:cs typeface="Arial" panose="020B0604020202020204" pitchFamily="34" charset="0"/>
+              </a:rPr>
+              <a:t>like</a:t>
+            </a:r>
+            <a:r>
+              <a:rPr lang="tr-TR" dirty="0" smtClean="0">
+                <a:solidFill>
+                  <a:srgbClr val="002060"/>
+                </a:solidFill>
+                <a:cs typeface="Arial" panose="020B0604020202020204" pitchFamily="34" charset="0"/>
+              </a:rPr>
+              <a:t> </a:t>
+            </a:r>
+            <a:r>
+              <a:rPr lang="tr-TR" dirty="0" err="1" smtClean="0">
+                <a:solidFill>
+                  <a:srgbClr val="002060"/>
+                </a:solidFill>
+                <a:cs typeface="Arial" panose="020B0604020202020204" pitchFamily="34" charset="0"/>
+              </a:rPr>
+              <a:t>there</a:t>
+            </a:r>
+            <a:r>
+              <a:rPr lang="tr-TR" dirty="0" smtClean="0">
+                <a:solidFill>
+                  <a:srgbClr val="002060"/>
+                </a:solidFill>
+                <a:cs typeface="Arial" panose="020B0604020202020204" pitchFamily="34" charset="0"/>
+              </a:rPr>
+              <a:t> is a </a:t>
+            </a:r>
+            <a:r>
+              <a:rPr lang="tr-TR" b="1" dirty="0" err="1" smtClean="0">
+                <a:solidFill>
+                  <a:srgbClr val="002060"/>
+                </a:solidFill>
+                <a:cs typeface="Arial" panose="020B0604020202020204" pitchFamily="34" charset="0"/>
+              </a:rPr>
+              <a:t>common</a:t>
+            </a:r>
+            <a:r>
+              <a:rPr lang="tr-TR" b="1" dirty="0" smtClean="0">
+                <a:solidFill>
+                  <a:srgbClr val="002060"/>
+                </a:solidFill>
+                <a:cs typeface="Arial" panose="020B0604020202020204" pitchFamily="34" charset="0"/>
+              </a:rPr>
+              <a:t> DC </a:t>
+            </a:r>
+            <a:r>
+              <a:rPr lang="tr-TR" b="1" dirty="0" err="1" smtClean="0">
+                <a:solidFill>
+                  <a:srgbClr val="002060"/>
+                </a:solidFill>
+                <a:cs typeface="Arial" panose="020B0604020202020204" pitchFamily="34" charset="0"/>
+              </a:rPr>
+              <a:t>bus</a:t>
+            </a:r>
+            <a:r>
+              <a:rPr lang="tr-TR" b="1" dirty="0" smtClean="0">
+                <a:solidFill>
+                  <a:srgbClr val="002060"/>
+                </a:solidFill>
+                <a:cs typeface="Arial" panose="020B0604020202020204" pitchFamily="34" charset="0"/>
+              </a:rPr>
+              <a:t> </a:t>
+            </a:r>
+            <a:r>
+              <a:rPr lang="tr-TR" b="1" dirty="0" err="1" smtClean="0">
+                <a:solidFill>
+                  <a:srgbClr val="002060"/>
+                </a:solidFill>
+                <a:cs typeface="Arial" panose="020B0604020202020204" pitchFamily="34" charset="0"/>
+              </a:rPr>
+              <a:t>capacitor</a:t>
+            </a:r>
+            <a:r>
+              <a:rPr lang="tr-TR" b="1" dirty="0" smtClean="0">
+                <a:solidFill>
+                  <a:srgbClr val="002060"/>
+                </a:solidFill>
+                <a:cs typeface="Arial" panose="020B0604020202020204" pitchFamily="34" charset="0"/>
+              </a:rPr>
+              <a:t> </a:t>
+            </a:r>
+            <a:r>
+              <a:rPr lang="tr-TR" dirty="0" err="1" smtClean="0">
+                <a:solidFill>
+                  <a:srgbClr val="002060"/>
+                </a:solidFill>
+                <a:cs typeface="Arial" panose="020B0604020202020204" pitchFamily="34" charset="0"/>
+              </a:rPr>
+              <a:t>with</a:t>
+            </a:r>
+            <a:r>
+              <a:rPr lang="tr-TR" dirty="0" smtClean="0">
+                <a:solidFill>
+                  <a:srgbClr val="002060"/>
+                </a:solidFill>
+                <a:cs typeface="Arial" panose="020B0604020202020204" pitchFamily="34" charset="0"/>
+              </a:rPr>
+              <a:t> 30 </a:t>
+            </a:r>
+            <a:r>
+              <a:rPr lang="tr-TR" dirty="0" err="1" smtClean="0">
+                <a:solidFill>
+                  <a:srgbClr val="002060"/>
+                </a:solidFill>
+                <a:cs typeface="Arial" panose="020B0604020202020204" pitchFamily="34" charset="0"/>
+              </a:rPr>
+              <a:t>uF</a:t>
+            </a:r>
+            <a:r>
+              <a:rPr lang="tr-TR" dirty="0" smtClean="0">
+                <a:solidFill>
+                  <a:srgbClr val="002060"/>
+                </a:solidFill>
+                <a:cs typeface="Arial" panose="020B0604020202020204" pitchFamily="34" charset="0"/>
+              </a:rPr>
+              <a:t> </a:t>
+            </a:r>
+            <a:r>
+              <a:rPr lang="tr-TR" dirty="0" err="1" smtClean="0">
+                <a:solidFill>
+                  <a:srgbClr val="002060"/>
+                </a:solidFill>
+                <a:cs typeface="Arial" panose="020B0604020202020204" pitchFamily="34" charset="0"/>
+              </a:rPr>
+              <a:t>capacitance</a:t>
+            </a:r>
+            <a:r>
+              <a:rPr lang="tr-TR" dirty="0" smtClean="0">
+                <a:solidFill>
+                  <a:srgbClr val="002060"/>
+                </a:solidFill>
+                <a:cs typeface="Arial" panose="020B0604020202020204" pitchFamily="34" charset="0"/>
+              </a:rPr>
+              <a:t>.</a:t>
+            </a:r>
+          </a:p>
+          <a:p>
+            <a:pPr marL="285750" indent="-285750">
+              <a:buFont typeface="Arial" panose="020B0604020202020204" pitchFamily="34" charset="0"/>
+              <a:buChar char="•"/>
+            </a:pPr>
+            <a:r>
+              <a:rPr lang="tr-TR" dirty="0" err="1" smtClean="0">
+                <a:solidFill>
+                  <a:srgbClr val="002060"/>
+                </a:solidFill>
+                <a:cs typeface="Arial" panose="020B0604020202020204" pitchFamily="34" charset="0"/>
+              </a:rPr>
+              <a:t>In</a:t>
+            </a:r>
+            <a:r>
+              <a:rPr lang="tr-TR" dirty="0" smtClean="0">
+                <a:solidFill>
+                  <a:srgbClr val="002060"/>
+                </a:solidFill>
+                <a:cs typeface="Arial" panose="020B0604020202020204" pitchFamily="34" charset="0"/>
+              </a:rPr>
+              <a:t> </a:t>
+            </a:r>
+            <a:r>
+              <a:rPr lang="tr-TR" dirty="0" err="1" smtClean="0">
+                <a:solidFill>
+                  <a:srgbClr val="002060"/>
+                </a:solidFill>
+                <a:cs typeface="Arial" panose="020B0604020202020204" pitchFamily="34" charset="0"/>
+              </a:rPr>
+              <a:t>practice</a:t>
+            </a:r>
+            <a:r>
+              <a:rPr lang="tr-TR" dirty="0" smtClean="0">
+                <a:solidFill>
+                  <a:srgbClr val="002060"/>
+                </a:solidFill>
+                <a:cs typeface="Arial" panose="020B0604020202020204" pitchFamily="34" charset="0"/>
+              </a:rPr>
+              <a:t>, </a:t>
+            </a:r>
+            <a:r>
+              <a:rPr lang="tr-TR" dirty="0" err="1" smtClean="0">
+                <a:solidFill>
+                  <a:srgbClr val="002060"/>
+                </a:solidFill>
+                <a:cs typeface="Arial" panose="020B0604020202020204" pitchFamily="34" charset="0"/>
+              </a:rPr>
+              <a:t>this</a:t>
+            </a:r>
+            <a:r>
+              <a:rPr lang="tr-TR" dirty="0" smtClean="0">
+                <a:solidFill>
+                  <a:srgbClr val="002060"/>
+                </a:solidFill>
+                <a:cs typeface="Arial" panose="020B0604020202020204" pitchFamily="34" charset="0"/>
+              </a:rPr>
+              <a:t> is not </a:t>
+            </a:r>
+            <a:r>
+              <a:rPr lang="tr-TR" dirty="0" err="1" smtClean="0">
+                <a:solidFill>
+                  <a:srgbClr val="002060"/>
+                </a:solidFill>
+                <a:cs typeface="Arial" panose="020B0604020202020204" pitchFamily="34" charset="0"/>
+              </a:rPr>
+              <a:t>the</a:t>
+            </a:r>
+            <a:r>
+              <a:rPr lang="tr-TR" dirty="0" smtClean="0">
+                <a:solidFill>
+                  <a:srgbClr val="002060"/>
+                </a:solidFill>
+                <a:cs typeface="Arial" panose="020B0604020202020204" pitchFamily="34" charset="0"/>
+              </a:rPr>
+              <a:t> </a:t>
+            </a:r>
+            <a:r>
+              <a:rPr lang="tr-TR" dirty="0" err="1" smtClean="0">
+                <a:solidFill>
+                  <a:srgbClr val="002060"/>
+                </a:solidFill>
+                <a:cs typeface="Arial" panose="020B0604020202020204" pitchFamily="34" charset="0"/>
+              </a:rPr>
+              <a:t>case</a:t>
+            </a:r>
+            <a:r>
+              <a:rPr lang="tr-TR" dirty="0" smtClean="0">
+                <a:solidFill>
+                  <a:srgbClr val="002060"/>
+                </a:solidFill>
+                <a:cs typeface="Arial" panose="020B0604020202020204" pitchFamily="34" charset="0"/>
+              </a:rPr>
+              <a:t> </a:t>
+            </a:r>
+            <a:r>
+              <a:rPr lang="tr-TR" dirty="0" err="1" smtClean="0">
+                <a:solidFill>
+                  <a:srgbClr val="002060"/>
+                </a:solidFill>
+                <a:cs typeface="Arial" panose="020B0604020202020204" pitchFamily="34" charset="0"/>
+              </a:rPr>
+              <a:t>due</a:t>
+            </a:r>
+            <a:r>
+              <a:rPr lang="tr-TR" dirty="0" smtClean="0">
+                <a:solidFill>
+                  <a:srgbClr val="002060"/>
+                </a:solidFill>
+                <a:cs typeface="Arial" panose="020B0604020202020204" pitchFamily="34" charset="0"/>
+              </a:rPr>
+              <a:t> </a:t>
+            </a:r>
+            <a:r>
+              <a:rPr lang="tr-TR" dirty="0" err="1" smtClean="0">
+                <a:solidFill>
+                  <a:srgbClr val="002060"/>
+                </a:solidFill>
+                <a:cs typeface="Arial" panose="020B0604020202020204" pitchFamily="34" charset="0"/>
+              </a:rPr>
+              <a:t>to</a:t>
+            </a:r>
+            <a:r>
+              <a:rPr lang="tr-TR" dirty="0" smtClean="0">
+                <a:solidFill>
+                  <a:srgbClr val="002060"/>
+                </a:solidFill>
+                <a:cs typeface="Arial" panose="020B0604020202020204" pitchFamily="34" charset="0"/>
+              </a:rPr>
+              <a:t> </a:t>
+            </a:r>
+            <a:r>
+              <a:rPr lang="tr-TR" b="1" dirty="0" smtClean="0">
+                <a:solidFill>
+                  <a:srgbClr val="002060"/>
+                </a:solidFill>
+                <a:cs typeface="Arial" panose="020B0604020202020204" pitchFamily="34" charset="0"/>
+              </a:rPr>
+              <a:t>parasitics</a:t>
+            </a:r>
+            <a:r>
+              <a:rPr lang="tr-TR" dirty="0" smtClean="0">
+                <a:solidFill>
+                  <a:srgbClr val="002060"/>
+                </a:solidFill>
+                <a:cs typeface="Arial" panose="020B0604020202020204" pitchFamily="34" charset="0"/>
+              </a:rPr>
+              <a:t>.</a:t>
+            </a:r>
+            <a:r>
+              <a:rPr lang="tr-TR" dirty="0" smtClean="0">
+                <a:solidFill>
+                  <a:srgbClr val="002060"/>
+                </a:solidFill>
+                <a:cs typeface="Arial" panose="020B0604020202020204" pitchFamily="34" charset="0"/>
+              </a:rPr>
+              <a:t> </a:t>
+            </a:r>
+          </a:p>
+          <a:p>
+            <a:pPr marL="285750" indent="-285750">
+              <a:buFont typeface="Arial" panose="020B0604020202020204" pitchFamily="34" charset="0"/>
+              <a:buChar char="•"/>
+            </a:pPr>
+            <a:endParaRPr lang="tr-TR" dirty="0" smtClean="0">
+              <a:solidFill>
+                <a:srgbClr val="002060"/>
+              </a:solidFill>
+              <a:cs typeface="Arial" panose="020B0604020202020204" pitchFamily="34" charset="0"/>
+            </a:endParaRPr>
+          </a:p>
+          <a:p>
+            <a:pPr algn="ctr"/>
+            <a:r>
+              <a:rPr lang="tr-TR" b="1" dirty="0" err="1" smtClean="0">
+                <a:solidFill>
+                  <a:srgbClr val="002060"/>
+                </a:solidFill>
+                <a:cs typeface="Arial" panose="020B0604020202020204" pitchFamily="34" charset="0"/>
+              </a:rPr>
+              <a:t>Results</a:t>
+            </a:r>
+            <a:r>
+              <a:rPr lang="tr-TR" b="1" dirty="0" smtClean="0">
+                <a:solidFill>
+                  <a:srgbClr val="002060"/>
+                </a:solidFill>
+                <a:cs typeface="Arial" panose="020B0604020202020204" pitchFamily="34" charset="0"/>
+              </a:rPr>
+              <a:t> of </a:t>
+            </a:r>
+            <a:r>
+              <a:rPr lang="tr-TR" b="1" dirty="0" err="1" smtClean="0">
+                <a:solidFill>
+                  <a:srgbClr val="002060"/>
+                </a:solidFill>
+                <a:cs typeface="Arial" panose="020B0604020202020204" pitchFamily="34" charset="0"/>
+              </a:rPr>
+              <a:t>simplest</a:t>
+            </a:r>
+            <a:r>
+              <a:rPr lang="tr-TR" b="1" dirty="0" smtClean="0">
+                <a:solidFill>
+                  <a:srgbClr val="002060"/>
+                </a:solidFill>
+                <a:cs typeface="Arial" panose="020B0604020202020204" pitchFamily="34" charset="0"/>
+              </a:rPr>
+              <a:t> model </a:t>
+            </a:r>
+            <a:r>
+              <a:rPr lang="tr-TR" b="1" dirty="0" err="1" smtClean="0">
+                <a:solidFill>
+                  <a:srgbClr val="002060"/>
+                </a:solidFill>
+                <a:cs typeface="Arial" panose="020B0604020202020204" pitchFamily="34" charset="0"/>
+              </a:rPr>
+              <a:t>without</a:t>
+            </a:r>
+            <a:r>
+              <a:rPr lang="tr-TR" b="1" dirty="0" smtClean="0">
+                <a:solidFill>
+                  <a:srgbClr val="002060"/>
+                </a:solidFill>
+                <a:cs typeface="Arial" panose="020B0604020202020204" pitchFamily="34" charset="0"/>
+              </a:rPr>
+              <a:t> interleaving:</a:t>
+            </a:r>
+            <a:endParaRPr lang="tr-TR" b="1" dirty="0" smtClean="0">
+              <a:solidFill>
+                <a:srgbClr val="002060"/>
+              </a:solidFill>
+              <a:cs typeface="Arial" panose="020B0604020202020204" pitchFamily="34" charset="0"/>
+            </a:endParaRPr>
+          </a:p>
+        </p:txBody>
+      </p:sp>
       <p:pic>
         <p:nvPicPr>
-          <p:cNvPr id="7" name="Picture 6"/>
+          <p:cNvPr id="3" name="Picture 2"/>
           <p:cNvPicPr>
             <a:picLocks noChangeAspect="1"/>
           </p:cNvPicPr>
           <p:nvPr/>
         </p:nvPicPr>
-        <p:blipFill rotWithShape="1">
-          <a:blip r:embed="rId3">
-            <a:extLst>
-              <a:ext uri="{28A0092B-C50C-407E-A947-70E740481C1C}">
-                <a14:useLocalDpi xmlns:a14="http://schemas.microsoft.com/office/drawing/2010/main" val="0"/>
-              </a:ext>
-            </a:extLst>
-          </a:blip>
-          <a:srcRect l="29334" t="40357" r="29333" b="42024"/>
-          <a:stretch/>
+        <p:blipFill>
+          <a:blip r:embed="rId3"/>
+          <a:stretch>
+            <a:fillRect/>
+          </a:stretch>
         </p:blipFill>
         <p:spPr>
           <a:xfrm>
-            <a:off x="1673677" y="3053443"/>
-            <a:ext cx="5937419" cy="2024743"/>
+            <a:off x="49011" y="2787846"/>
+            <a:ext cx="4229781" cy="2876010"/>
           </a:xfrm>
           <a:prstGeom prst="rect">
             <a:avLst/>
           </a:prstGeom>
         </p:spPr>
       </p:pic>
+      <p:sp>
+        <p:nvSpPr>
+          <p:cNvPr id="27" name="Rectangle 26"/>
+          <p:cNvSpPr/>
+          <p:nvPr/>
+        </p:nvSpPr>
+        <p:spPr>
+          <a:xfrm>
+            <a:off x="145567" y="2184266"/>
+            <a:ext cx="4133225" cy="646331"/>
+          </a:xfrm>
+          <a:prstGeom prst="rect">
+            <a:avLst/>
+          </a:prstGeom>
+        </p:spPr>
+        <p:txBody>
+          <a:bodyPr wrap="square">
+            <a:spAutoFit/>
+          </a:bodyPr>
+          <a:lstStyle/>
+          <a:p>
+            <a:pPr algn="ctr"/>
+            <a:r>
+              <a:rPr lang="tr-TR" dirty="0" smtClean="0">
+                <a:solidFill>
+                  <a:srgbClr val="002060"/>
+                </a:solidFill>
+                <a:cs typeface="Arial" panose="020B0604020202020204" pitchFamily="34" charset="0"/>
+              </a:rPr>
+              <a:t>Idc1 (</a:t>
+            </a:r>
+            <a:r>
+              <a:rPr lang="tr-TR" dirty="0" err="1" smtClean="0">
+                <a:solidFill>
+                  <a:srgbClr val="002060"/>
+                </a:solidFill>
+                <a:cs typeface="Arial" panose="020B0604020202020204" pitchFamily="34" charset="0"/>
+              </a:rPr>
+              <a:t>blue</a:t>
+            </a:r>
+            <a:r>
+              <a:rPr lang="tr-TR" dirty="0" smtClean="0">
+                <a:solidFill>
+                  <a:srgbClr val="002060"/>
+                </a:solidFill>
+                <a:cs typeface="Arial" panose="020B0604020202020204" pitchFamily="34" charset="0"/>
+              </a:rPr>
+              <a:t>), Idc2 (</a:t>
+            </a:r>
+            <a:r>
+              <a:rPr lang="tr-TR" dirty="0" err="1" smtClean="0">
+                <a:solidFill>
+                  <a:srgbClr val="002060"/>
+                </a:solidFill>
+                <a:cs typeface="Arial" panose="020B0604020202020204" pitchFamily="34" charset="0"/>
+              </a:rPr>
+              <a:t>yellow</a:t>
+            </a:r>
+            <a:r>
+              <a:rPr lang="tr-TR" dirty="0" smtClean="0">
+                <a:solidFill>
+                  <a:srgbClr val="002060"/>
+                </a:solidFill>
+                <a:cs typeface="Arial" panose="020B0604020202020204" pitchFamily="34" charset="0"/>
+              </a:rPr>
+              <a:t>) </a:t>
+            </a:r>
+            <a:r>
+              <a:rPr lang="tr-TR" dirty="0" err="1" smtClean="0">
+                <a:solidFill>
+                  <a:srgbClr val="002060"/>
+                </a:solidFill>
+                <a:cs typeface="Arial" panose="020B0604020202020204" pitchFamily="34" charset="0"/>
+              </a:rPr>
+              <a:t>and</a:t>
+            </a:r>
+            <a:r>
+              <a:rPr lang="tr-TR" dirty="0" smtClean="0">
+                <a:solidFill>
+                  <a:srgbClr val="002060"/>
+                </a:solidFill>
+                <a:cs typeface="Arial" panose="020B0604020202020204" pitchFamily="34" charset="0"/>
+              </a:rPr>
+              <a:t> </a:t>
+            </a:r>
+            <a:r>
+              <a:rPr lang="tr-TR" dirty="0" err="1" smtClean="0">
+                <a:solidFill>
+                  <a:srgbClr val="002060"/>
+                </a:solidFill>
+                <a:cs typeface="Arial" panose="020B0604020202020204" pitchFamily="34" charset="0"/>
+              </a:rPr>
+              <a:t>Iin</a:t>
+            </a:r>
+            <a:r>
+              <a:rPr lang="tr-TR" dirty="0" smtClean="0">
+                <a:solidFill>
+                  <a:srgbClr val="002060"/>
+                </a:solidFill>
+                <a:cs typeface="Arial" panose="020B0604020202020204" pitchFamily="34" charset="0"/>
+              </a:rPr>
+              <a:t> (</a:t>
+            </a:r>
+            <a:r>
+              <a:rPr lang="tr-TR" dirty="0" err="1" smtClean="0">
+                <a:solidFill>
+                  <a:srgbClr val="002060"/>
+                </a:solidFill>
+                <a:cs typeface="Arial" panose="020B0604020202020204" pitchFamily="34" charset="0"/>
+              </a:rPr>
+              <a:t>orange</a:t>
+            </a:r>
+            <a:r>
+              <a:rPr lang="tr-TR" dirty="0" smtClean="0">
+                <a:solidFill>
+                  <a:srgbClr val="002060"/>
+                </a:solidFill>
+                <a:cs typeface="Arial" panose="020B0604020202020204" pitchFamily="34" charset="0"/>
+              </a:rPr>
+              <a:t>)</a:t>
+            </a:r>
+          </a:p>
+          <a:p>
+            <a:pPr algn="ctr"/>
+            <a:r>
+              <a:rPr lang="tr-TR" dirty="0" smtClean="0">
+                <a:solidFill>
+                  <a:srgbClr val="002060"/>
+                </a:solidFill>
+                <a:cs typeface="Arial" panose="020B0604020202020204" pitchFamily="34" charset="0"/>
+              </a:rPr>
+              <a:t>Idc1 = Idc2 </a:t>
+            </a:r>
+            <a:r>
+              <a:rPr lang="tr-TR" dirty="0" err="1" smtClean="0">
+                <a:solidFill>
+                  <a:srgbClr val="002060"/>
+                </a:solidFill>
+                <a:cs typeface="Arial" panose="020B0604020202020204" pitchFamily="34" charset="0"/>
+              </a:rPr>
+              <a:t>for</a:t>
+            </a:r>
+            <a:r>
+              <a:rPr lang="tr-TR" dirty="0" smtClean="0">
+                <a:solidFill>
+                  <a:srgbClr val="002060"/>
+                </a:solidFill>
+                <a:cs typeface="Arial" panose="020B0604020202020204" pitchFamily="34" charset="0"/>
+              </a:rPr>
+              <a:t> </a:t>
+            </a:r>
+            <a:r>
+              <a:rPr lang="tr-TR" dirty="0" err="1" smtClean="0">
+                <a:solidFill>
+                  <a:srgbClr val="002060"/>
+                </a:solidFill>
+                <a:cs typeface="Arial" panose="020B0604020202020204" pitchFamily="34" charset="0"/>
+              </a:rPr>
+              <a:t>no</a:t>
+            </a:r>
+            <a:r>
+              <a:rPr lang="tr-TR" dirty="0" smtClean="0">
+                <a:solidFill>
+                  <a:srgbClr val="002060"/>
+                </a:solidFill>
+                <a:cs typeface="Arial" panose="020B0604020202020204" pitchFamily="34" charset="0"/>
+              </a:rPr>
+              <a:t> interleaving</a:t>
+            </a:r>
+            <a:endParaRPr lang="tr-TR" dirty="0" smtClean="0">
+              <a:solidFill>
+                <a:srgbClr val="002060"/>
+              </a:solidFill>
+              <a:cs typeface="Arial" panose="020B0604020202020204" pitchFamily="34" charset="0"/>
+            </a:endParaRPr>
+          </a:p>
+        </p:txBody>
+      </p:sp>
+      <p:pic>
+        <p:nvPicPr>
+          <p:cNvPr id="4" name="Picture 3"/>
+          <p:cNvPicPr>
+            <a:picLocks noChangeAspect="1"/>
+          </p:cNvPicPr>
+          <p:nvPr/>
+        </p:nvPicPr>
+        <p:blipFill>
+          <a:blip r:embed="rId4"/>
+          <a:stretch>
+            <a:fillRect/>
+          </a:stretch>
+        </p:blipFill>
+        <p:spPr>
+          <a:xfrm>
+            <a:off x="4390787" y="2830597"/>
+            <a:ext cx="4641217" cy="2606817"/>
+          </a:xfrm>
+          <a:prstGeom prst="rect">
+            <a:avLst/>
+          </a:prstGeom>
+        </p:spPr>
+      </p:pic>
+      <p:sp>
+        <p:nvSpPr>
+          <p:cNvPr id="28" name="Rectangle 27"/>
+          <p:cNvSpPr/>
+          <p:nvPr/>
+        </p:nvSpPr>
+        <p:spPr>
+          <a:xfrm>
+            <a:off x="4553574" y="2418514"/>
+            <a:ext cx="4133225" cy="369332"/>
+          </a:xfrm>
+          <a:prstGeom prst="rect">
+            <a:avLst/>
+          </a:prstGeom>
+        </p:spPr>
+        <p:txBody>
+          <a:bodyPr wrap="square">
+            <a:spAutoFit/>
+          </a:bodyPr>
+          <a:lstStyle/>
+          <a:p>
+            <a:pPr algn="ctr"/>
+            <a:r>
+              <a:rPr lang="tr-TR" dirty="0" smtClean="0">
+                <a:solidFill>
+                  <a:srgbClr val="002060"/>
+                </a:solidFill>
+                <a:cs typeface="Arial" panose="020B0604020202020204" pitchFamily="34" charset="0"/>
+              </a:rPr>
+              <a:t>Vdc</a:t>
+            </a:r>
+          </a:p>
+        </p:txBody>
+      </p:sp>
+      <p:sp>
+        <p:nvSpPr>
+          <p:cNvPr id="29" name="Rectangle 28"/>
+          <p:cNvSpPr/>
+          <p:nvPr/>
+        </p:nvSpPr>
+        <p:spPr>
+          <a:xfrm>
+            <a:off x="145567" y="5944270"/>
+            <a:ext cx="8950154" cy="646331"/>
+          </a:xfrm>
+          <a:prstGeom prst="rect">
+            <a:avLst/>
+          </a:prstGeom>
+        </p:spPr>
+        <p:txBody>
+          <a:bodyPr wrap="square">
+            <a:spAutoFit/>
+          </a:bodyPr>
+          <a:lstStyle/>
+          <a:p>
+            <a:pPr marL="285750" indent="-285750">
+              <a:buFont typeface="Arial" panose="020B0604020202020204" pitchFamily="34" charset="0"/>
+              <a:buChar char="•"/>
+            </a:pPr>
+            <a:r>
+              <a:rPr lang="tr-TR" dirty="0" err="1" smtClean="0">
+                <a:solidFill>
+                  <a:srgbClr val="002060"/>
+                </a:solidFill>
+                <a:cs typeface="Arial" panose="020B0604020202020204" pitchFamily="34" charset="0"/>
+              </a:rPr>
+              <a:t>Nothing</a:t>
+            </a:r>
+            <a:r>
+              <a:rPr lang="tr-TR" dirty="0" smtClean="0">
+                <a:solidFill>
+                  <a:srgbClr val="002060"/>
+                </a:solidFill>
+                <a:cs typeface="Arial" panose="020B0604020202020204" pitchFamily="34" charset="0"/>
+              </a:rPr>
+              <a:t> </a:t>
+            </a:r>
+            <a:r>
+              <a:rPr lang="tr-TR" dirty="0" err="1" smtClean="0">
+                <a:solidFill>
+                  <a:srgbClr val="002060"/>
+                </a:solidFill>
+                <a:cs typeface="Arial" panose="020B0604020202020204" pitchFamily="34" charset="0"/>
+              </a:rPr>
+              <a:t>really</a:t>
+            </a:r>
+            <a:r>
+              <a:rPr lang="tr-TR" dirty="0" smtClean="0">
+                <a:solidFill>
+                  <a:srgbClr val="002060"/>
+                </a:solidFill>
+                <a:cs typeface="Arial" panose="020B0604020202020204" pitchFamily="34" charset="0"/>
+              </a:rPr>
+              <a:t> </a:t>
+            </a:r>
+            <a:r>
+              <a:rPr lang="tr-TR" dirty="0" err="1" smtClean="0">
+                <a:solidFill>
+                  <a:srgbClr val="002060"/>
+                </a:solidFill>
+                <a:cs typeface="Arial" panose="020B0604020202020204" pitchFamily="34" charset="0"/>
+              </a:rPr>
+              <a:t>new</a:t>
+            </a:r>
+            <a:r>
+              <a:rPr lang="tr-TR" dirty="0" smtClean="0">
+                <a:solidFill>
+                  <a:srgbClr val="002060"/>
+                </a:solidFill>
+                <a:cs typeface="Arial" panose="020B0604020202020204" pitchFamily="34" charset="0"/>
+              </a:rPr>
+              <a:t> here. </a:t>
+            </a:r>
+            <a:r>
+              <a:rPr lang="tr-TR" dirty="0" err="1" smtClean="0">
+                <a:solidFill>
+                  <a:srgbClr val="002060"/>
+                </a:solidFill>
+                <a:cs typeface="Arial" panose="020B0604020202020204" pitchFamily="34" charset="0"/>
+              </a:rPr>
+              <a:t>All</a:t>
+            </a:r>
+            <a:r>
+              <a:rPr lang="tr-TR" dirty="0" smtClean="0">
+                <a:solidFill>
+                  <a:srgbClr val="002060"/>
+                </a:solidFill>
+                <a:cs typeface="Arial" panose="020B0604020202020204" pitchFamily="34" charset="0"/>
+              </a:rPr>
+              <a:t> DC </a:t>
+            </a:r>
+            <a:r>
+              <a:rPr lang="tr-TR" dirty="0" err="1" smtClean="0">
+                <a:solidFill>
+                  <a:srgbClr val="002060"/>
+                </a:solidFill>
+                <a:cs typeface="Arial" panose="020B0604020202020204" pitchFamily="34" charset="0"/>
+              </a:rPr>
+              <a:t>components</a:t>
+            </a:r>
+            <a:r>
+              <a:rPr lang="tr-TR" dirty="0" smtClean="0">
+                <a:solidFill>
+                  <a:srgbClr val="002060"/>
+                </a:solidFill>
+                <a:cs typeface="Arial" panose="020B0604020202020204" pitchFamily="34" charset="0"/>
+              </a:rPr>
+              <a:t> </a:t>
+            </a:r>
+            <a:r>
+              <a:rPr lang="tr-TR" dirty="0" err="1" smtClean="0">
+                <a:solidFill>
+                  <a:srgbClr val="002060"/>
+                </a:solidFill>
+                <a:cs typeface="Arial" panose="020B0604020202020204" pitchFamily="34" charset="0"/>
+              </a:rPr>
+              <a:t>have</a:t>
+            </a:r>
+            <a:r>
+              <a:rPr lang="tr-TR" dirty="0" smtClean="0">
+                <a:solidFill>
+                  <a:srgbClr val="002060"/>
+                </a:solidFill>
+                <a:cs typeface="Arial" panose="020B0604020202020204" pitchFamily="34" charset="0"/>
+              </a:rPr>
+              <a:t> 2xoriginal </a:t>
+            </a:r>
+            <a:r>
+              <a:rPr lang="tr-TR" dirty="0" err="1" smtClean="0">
+                <a:solidFill>
+                  <a:srgbClr val="002060"/>
+                </a:solidFill>
+                <a:cs typeface="Arial" panose="020B0604020202020204" pitchFamily="34" charset="0"/>
+              </a:rPr>
+              <a:t>magnitude</a:t>
+            </a:r>
+            <a:r>
+              <a:rPr lang="tr-TR" dirty="0" smtClean="0">
+                <a:solidFill>
+                  <a:srgbClr val="002060"/>
+                </a:solidFill>
+                <a:cs typeface="Arial" panose="020B0604020202020204" pitchFamily="34" charset="0"/>
+              </a:rPr>
+              <a:t>. </a:t>
+            </a:r>
+            <a:r>
+              <a:rPr lang="tr-TR" dirty="0" smtClean="0">
+                <a:solidFill>
+                  <a:srgbClr val="002060"/>
+                </a:solidFill>
+                <a:cs typeface="Arial" panose="020B0604020202020204" pitchFamily="34" charset="0"/>
+              </a:rPr>
+              <a:t>Total </a:t>
+            </a:r>
+            <a:r>
+              <a:rPr lang="tr-TR" dirty="0" err="1" smtClean="0">
+                <a:solidFill>
+                  <a:srgbClr val="002060"/>
+                </a:solidFill>
+                <a:cs typeface="Arial" panose="020B0604020202020204" pitchFamily="34" charset="0"/>
+              </a:rPr>
+              <a:t>o</a:t>
+            </a:r>
+            <a:r>
+              <a:rPr lang="tr-TR" dirty="0" err="1" smtClean="0">
+                <a:solidFill>
+                  <a:srgbClr val="002060"/>
+                </a:solidFill>
+                <a:cs typeface="Arial" panose="020B0604020202020204" pitchFamily="34" charset="0"/>
+              </a:rPr>
+              <a:t>utput</a:t>
+            </a:r>
+            <a:r>
+              <a:rPr lang="tr-TR" dirty="0" smtClean="0">
+                <a:solidFill>
+                  <a:srgbClr val="002060"/>
+                </a:solidFill>
+                <a:cs typeface="Arial" panose="020B0604020202020204" pitchFamily="34" charset="0"/>
+              </a:rPr>
+              <a:t> </a:t>
+            </a:r>
+            <a:r>
+              <a:rPr lang="tr-TR" dirty="0" err="1" smtClean="0">
+                <a:solidFill>
+                  <a:srgbClr val="002060"/>
+                </a:solidFill>
+                <a:cs typeface="Arial" panose="020B0604020202020204" pitchFamily="34" charset="0"/>
+              </a:rPr>
+              <a:t>power</a:t>
+            </a:r>
+            <a:r>
+              <a:rPr lang="tr-TR" dirty="0" smtClean="0">
+                <a:solidFill>
+                  <a:srgbClr val="002060"/>
+                </a:solidFill>
+                <a:cs typeface="Arial" panose="020B0604020202020204" pitchFamily="34" charset="0"/>
+              </a:rPr>
+              <a:t> is </a:t>
+            </a:r>
+            <a:r>
+              <a:rPr lang="tr-TR" dirty="0" err="1" smtClean="0">
+                <a:solidFill>
+                  <a:srgbClr val="002060"/>
+                </a:solidFill>
+                <a:cs typeface="Arial" panose="020B0604020202020204" pitchFamily="34" charset="0"/>
+              </a:rPr>
+              <a:t>now</a:t>
+            </a:r>
+            <a:r>
+              <a:rPr lang="tr-TR" dirty="0" smtClean="0">
+                <a:solidFill>
+                  <a:srgbClr val="002060"/>
+                </a:solidFill>
+                <a:cs typeface="Arial" panose="020B0604020202020204" pitchFamily="34" charset="0"/>
+              </a:rPr>
+              <a:t> 4 kW.</a:t>
+            </a:r>
+            <a:endParaRPr lang="tr-TR" b="1" dirty="0" smtClean="0">
+              <a:solidFill>
+                <a:srgbClr val="002060"/>
+              </a:solidFill>
+              <a:cs typeface="Arial" panose="020B0604020202020204" pitchFamily="34" charset="0"/>
+            </a:endParaRPr>
+          </a:p>
+        </p:txBody>
+      </p:sp>
     </p:spTree>
     <p:extLst>
       <p:ext uri="{BB962C8B-B14F-4D97-AF65-F5344CB8AC3E}">
-        <p14:creationId xmlns:p14="http://schemas.microsoft.com/office/powerpoint/2010/main" val="202850587"/>
+        <p14:creationId xmlns:p14="http://schemas.microsoft.com/office/powerpoint/2010/main" val="674926871"/>
       </p:ext>
     </p:extLst>
   </p:cSld>
@@ -28943,14 +31059,14 @@
       </p:grpSpPr>
       <p:sp>
         <p:nvSpPr>
-          <p:cNvPr id="6" name="Rectangle 5"/>
+          <p:cNvPr id="8" name="Rectangle 7"/>
           <p:cNvSpPr/>
           <p:nvPr/>
         </p:nvSpPr>
         <p:spPr>
           <a:xfrm>
-            <a:off x="210392" y="3123175"/>
-            <a:ext cx="8744983" cy="707886"/>
+            <a:off x="478970" y="150669"/>
+            <a:ext cx="8207829" cy="523220"/>
           </a:xfrm>
           <a:prstGeom prst="rect">
             <a:avLst/>
@@ -28964,95 +31080,70 @@
           <a:p>
             <a:pPr algn="ctr"/>
             <a:r>
-              <a:rPr lang="tr-TR" sz="4000" b="1" dirty="0" err="1" smtClean="0">
-                <a:solidFill>
-                  <a:srgbClr val="002060"/>
-                </a:solidFill>
-                <a:cs typeface="Arial" panose="020B0604020202020204" pitchFamily="34" charset="0"/>
-              </a:rPr>
-              <a:t>Thank</a:t>
-            </a:r>
-            <a:r>
-              <a:rPr lang="tr-TR" sz="4000" b="1" dirty="0" smtClean="0">
-                <a:solidFill>
-                  <a:srgbClr val="002060"/>
-                </a:solidFill>
-                <a:cs typeface="Arial" panose="020B0604020202020204" pitchFamily="34" charset="0"/>
-              </a:rPr>
-              <a:t> </a:t>
-            </a:r>
-            <a:r>
-              <a:rPr lang="tr-TR" sz="4000" b="1" dirty="0" err="1" smtClean="0">
-                <a:solidFill>
-                  <a:srgbClr val="002060"/>
-                </a:solidFill>
-                <a:cs typeface="Arial" panose="020B0604020202020204" pitchFamily="34" charset="0"/>
-              </a:rPr>
-              <a:t>you</a:t>
-            </a:r>
-            <a:r>
-              <a:rPr lang="tr-TR" sz="4000" b="1" dirty="0" smtClean="0">
-                <a:solidFill>
-                  <a:srgbClr val="002060"/>
-                </a:solidFill>
-                <a:cs typeface="Arial" panose="020B0604020202020204" pitchFamily="34" charset="0"/>
-              </a:rPr>
-              <a:t> !</a:t>
-            </a:r>
-            <a:endParaRPr lang="tr-TR" sz="4000" b="1" dirty="0">
+              <a:rPr lang="en-US" sz="2800" b="1" dirty="0" smtClean="0">
+                <a:solidFill>
+                  <a:schemeClr val="accent1">
+                    <a:lumMod val="50000"/>
+                  </a:schemeClr>
+                </a:solidFill>
+                <a:cs typeface="Arial" panose="020B0604020202020204" pitchFamily="34" charset="0"/>
+              </a:rPr>
+              <a:t>2-parallel </a:t>
+            </a:r>
+            <a:r>
+              <a:rPr lang="en-US" sz="2800" b="1" dirty="0">
+                <a:solidFill>
+                  <a:schemeClr val="accent1">
+                    <a:lumMod val="50000"/>
+                  </a:schemeClr>
+                </a:solidFill>
+                <a:cs typeface="Arial" panose="020B0604020202020204" pitchFamily="34" charset="0"/>
+              </a:rPr>
+              <a:t>with and without </a:t>
+            </a:r>
+            <a:r>
+              <a:rPr lang="en-US" sz="2800" b="1" dirty="0" smtClean="0">
+                <a:solidFill>
+                  <a:schemeClr val="accent1">
+                    <a:lumMod val="50000"/>
+                  </a:schemeClr>
+                </a:solidFill>
+                <a:cs typeface="Arial" panose="020B0604020202020204" pitchFamily="34" charset="0"/>
+              </a:rPr>
+              <a:t>interleaving</a:t>
+            </a:r>
+            <a:r>
+              <a:rPr lang="tr-TR" sz="2800" b="1" dirty="0" smtClean="0">
+                <a:solidFill>
+                  <a:schemeClr val="accent1">
+                    <a:lumMod val="50000"/>
+                  </a:schemeClr>
+                </a:solidFill>
+                <a:cs typeface="Arial" panose="020B0604020202020204" pitchFamily="34" charset="0"/>
+              </a:rPr>
+              <a:t> </a:t>
+            </a:r>
+            <a:endParaRPr lang="en-US" sz="2800" dirty="0">
               <a:solidFill>
-                <a:srgbClr val="FF0000"/>
+                <a:schemeClr val="accent1">
+                  <a:lumMod val="50000"/>
+                </a:schemeClr>
               </a:solidFill>
+              <a:cs typeface="Arial" panose="020B0604020202020204" pitchFamily="34" charset="0"/>
             </a:endParaRPr>
           </a:p>
         </p:txBody>
       </p:sp>
-      <p:pic>
-        <p:nvPicPr>
-          <p:cNvPr id="4" name="Picture 3" descr="C:\Users\ugurm\Desktop\gitthub\IMMD\GRW2017\Metu5.png"/>
-          <p:cNvPicPr/>
-          <p:nvPr/>
-        </p:nvPicPr>
-        <p:blipFill rotWithShape="1">
-          <a:blip r:embed="rId3" cstate="print">
-            <a:extLst>
-              <a:ext uri="{28A0092B-C50C-407E-A947-70E740481C1C}">
-                <a14:useLocalDpi xmlns:a14="http://schemas.microsoft.com/office/drawing/2010/main" val="0"/>
-              </a:ext>
-            </a:extLst>
-          </a:blip>
-          <a:srcRect l="14652" t="39667" r="15041" b="41051"/>
-          <a:stretch/>
-        </p:blipFill>
-        <p:spPr bwMode="auto">
-          <a:xfrm>
-            <a:off x="5716828" y="6097904"/>
-            <a:ext cx="3427172" cy="760096"/>
-          </a:xfrm>
-          <a:prstGeom prst="rect">
-            <a:avLst/>
-          </a:prstGeom>
-          <a:noFill/>
-          <a:ln>
-            <a:noFill/>
-          </a:ln>
-          <a:extLst>
-            <a:ext uri="{53640926-AAD7-44D8-BBD7-CCE9431645EC}">
-              <a14:shadowObscured xmlns:a14="http://schemas.microsoft.com/office/drawing/2010/main"/>
-            </a:ext>
-          </a:extLst>
-        </p:spPr>
-      </p:pic>
       <p:sp>
         <p:nvSpPr>
-          <p:cNvPr id="5" name="Rectangle 4"/>
+          <p:cNvPr id="26" name="Rectangle 25"/>
           <p:cNvSpPr/>
           <p:nvPr/>
         </p:nvSpPr>
         <p:spPr>
           <a:xfrm>
-            <a:off x="1" y="6360480"/>
-            <a:ext cx="3265714" cy="430887"/>
+            <a:off x="193846" y="706938"/>
+            <a:ext cx="8950154" cy="369332"/>
           </a:xfrm>
           <a:prstGeom prst="rect">
             <a:avLst/>
@@ -29064,70 +31155,176 @@
           </a:bodyPr>
           <a:lstStyle/>
           <a:p>
-            <a:pPr algn="ctr"/>
-            <a:r>
-              <a:rPr lang="tr-TR" sz="2200" b="1" i="1" dirty="0" smtClean="0">
-                <a:solidFill>
-                  <a:schemeClr val="bg2">
-                    <a:lumMod val="50000"/>
-                  </a:schemeClr>
-                </a:solidFill>
-                <a:cs typeface="Arial" panose="020B0604020202020204" pitchFamily="34" charset="0"/>
-                <a:hlinkClick r:id="rId4"/>
-              </a:rPr>
-              <a:t>m</a:t>
-            </a:r>
-            <a:r>
-              <a:rPr lang="en-US" sz="2200" b="1" i="1" dirty="0" err="1" smtClean="0">
-                <a:solidFill>
-                  <a:schemeClr val="bg2">
-                    <a:lumMod val="50000"/>
-                  </a:schemeClr>
-                </a:solidFill>
-                <a:cs typeface="Arial" panose="020B0604020202020204" pitchFamily="34" charset="0"/>
-                <a:hlinkClick r:id="rId4"/>
-              </a:rPr>
-              <a:t>esut.ugur</a:t>
-            </a:r>
-            <a:r>
-              <a:rPr lang="tr-TR" sz="2200" b="1" i="1" dirty="0" smtClean="0">
-                <a:solidFill>
-                  <a:schemeClr val="bg2">
-                    <a:lumMod val="50000"/>
-                  </a:schemeClr>
-                </a:solidFill>
-                <a:cs typeface="Arial" panose="020B0604020202020204" pitchFamily="34" charset="0"/>
-                <a:hlinkClick r:id="rId4"/>
-              </a:rPr>
-              <a:t>@</a:t>
-            </a:r>
-            <a:r>
-              <a:rPr lang="en-US" sz="2200" b="1" i="1" dirty="0" smtClean="0">
-                <a:solidFill>
-                  <a:schemeClr val="bg2">
-                    <a:lumMod val="50000"/>
-                  </a:schemeClr>
-                </a:solidFill>
-                <a:cs typeface="Arial" panose="020B0604020202020204" pitchFamily="34" charset="0"/>
-                <a:hlinkClick r:id="rId4"/>
-              </a:rPr>
-              <a:t>metu.edu.tr</a:t>
-            </a:r>
-            <a:endParaRPr lang="en-US" sz="2200" i="1" dirty="0">
+            <a:pPr marL="285750" indent="-285750">
+              <a:buFont typeface="Arial" panose="020B0604020202020204" pitchFamily="34" charset="0"/>
+              <a:buChar char="•"/>
+            </a:pPr>
+            <a:r>
+              <a:rPr lang="tr-TR" dirty="0" smtClean="0">
+                <a:solidFill>
+                  <a:srgbClr val="002060"/>
+                </a:solidFill>
+                <a:cs typeface="Arial" panose="020B0604020202020204" pitchFamily="34" charset="0"/>
+              </a:rPr>
+              <a:t>Interleaving is </a:t>
+            </a:r>
+            <a:r>
+              <a:rPr lang="tr-TR" dirty="0" err="1" smtClean="0">
+                <a:solidFill>
+                  <a:srgbClr val="002060"/>
+                </a:solidFill>
+                <a:cs typeface="Arial" panose="020B0604020202020204" pitchFamily="34" charset="0"/>
+              </a:rPr>
+              <a:t>applied</a:t>
+            </a:r>
+            <a:r>
+              <a:rPr lang="tr-TR" dirty="0" smtClean="0">
+                <a:solidFill>
+                  <a:srgbClr val="002060"/>
+                </a:solidFill>
+                <a:cs typeface="Arial" panose="020B0604020202020204" pitchFamily="34" charset="0"/>
+              </a:rPr>
+              <a:t> </a:t>
+            </a:r>
+            <a:r>
+              <a:rPr lang="tr-TR" dirty="0" err="1" smtClean="0">
+                <a:solidFill>
+                  <a:srgbClr val="002060"/>
+                </a:solidFill>
+                <a:cs typeface="Arial" panose="020B0604020202020204" pitchFamily="34" charset="0"/>
+              </a:rPr>
+              <a:t>now</a:t>
+            </a:r>
+            <a:r>
+              <a:rPr lang="tr-TR" dirty="0" smtClean="0">
+                <a:solidFill>
+                  <a:srgbClr val="002060"/>
+                </a:solidFill>
+                <a:cs typeface="Arial" panose="020B0604020202020204" pitchFamily="34" charset="0"/>
+              </a:rPr>
+              <a:t> </a:t>
+            </a:r>
+            <a:r>
+              <a:rPr lang="tr-TR" dirty="0" err="1" smtClean="0">
+                <a:solidFill>
+                  <a:srgbClr val="002060"/>
+                </a:solidFill>
+                <a:cs typeface="Arial" panose="020B0604020202020204" pitchFamily="34" charset="0"/>
+              </a:rPr>
+              <a:t>with</a:t>
+            </a:r>
+            <a:r>
+              <a:rPr lang="tr-TR" dirty="0" smtClean="0">
+                <a:solidFill>
+                  <a:srgbClr val="002060"/>
+                </a:solidFill>
+                <a:cs typeface="Arial" panose="020B0604020202020204" pitchFamily="34" charset="0"/>
+              </a:rPr>
+              <a:t> 180 </a:t>
+            </a:r>
+            <a:r>
+              <a:rPr lang="tr-TR" dirty="0" err="1" smtClean="0">
+                <a:solidFill>
+                  <a:srgbClr val="002060"/>
+                </a:solidFill>
+                <a:cs typeface="Arial" panose="020B0604020202020204" pitchFamily="34" charset="0"/>
+              </a:rPr>
+              <a:t>degrees</a:t>
+            </a:r>
+            <a:r>
+              <a:rPr lang="tr-TR" dirty="0" smtClean="0">
+                <a:solidFill>
+                  <a:srgbClr val="002060"/>
+                </a:solidFill>
+                <a:cs typeface="Arial" panose="020B0604020202020204" pitchFamily="34" charset="0"/>
+              </a:rPr>
+              <a:t>.</a:t>
+            </a:r>
+            <a:endParaRPr lang="tr-TR" b="1" dirty="0" smtClean="0">
               <a:solidFill>
-                <a:schemeClr val="bg2">
-                  <a:lumMod val="50000"/>
-                </a:schemeClr>
+                <a:srgbClr val="002060"/>
               </a:solidFill>
               <a:cs typeface="Arial" panose="020B0604020202020204" pitchFamily="34" charset="0"/>
             </a:endParaRPr>
           </a:p>
         </p:txBody>
       </p:sp>
+      <p:pic>
+        <p:nvPicPr>
+          <p:cNvPr id="2" name="Picture 1"/>
+          <p:cNvPicPr>
+            <a:picLocks noChangeAspect="1"/>
+          </p:cNvPicPr>
+          <p:nvPr/>
+        </p:nvPicPr>
+        <p:blipFill>
+          <a:blip r:embed="rId3"/>
+          <a:stretch>
+            <a:fillRect/>
+          </a:stretch>
+        </p:blipFill>
+        <p:spPr>
+          <a:xfrm>
+            <a:off x="690459" y="1204579"/>
+            <a:ext cx="3716002" cy="2786407"/>
+          </a:xfrm>
+          <a:prstGeom prst="rect">
+            <a:avLst/>
+          </a:prstGeom>
+        </p:spPr>
+      </p:pic>
+      <p:pic>
+        <p:nvPicPr>
+          <p:cNvPr id="6" name="Picture 5"/>
+          <p:cNvPicPr>
+            <a:picLocks noChangeAspect="1"/>
+          </p:cNvPicPr>
+          <p:nvPr/>
+        </p:nvPicPr>
+        <p:blipFill>
+          <a:blip r:embed="rId4"/>
+          <a:stretch>
+            <a:fillRect/>
+          </a:stretch>
+        </p:blipFill>
+        <p:spPr>
+          <a:xfrm>
+            <a:off x="4668923" y="1204580"/>
+            <a:ext cx="3716002" cy="2786407"/>
+          </a:xfrm>
+          <a:prstGeom prst="rect">
+            <a:avLst/>
+          </a:prstGeom>
+        </p:spPr>
+      </p:pic>
+      <p:pic>
+        <p:nvPicPr>
+          <p:cNvPr id="7" name="Picture 6"/>
+          <p:cNvPicPr>
+            <a:picLocks noChangeAspect="1"/>
+          </p:cNvPicPr>
+          <p:nvPr/>
+        </p:nvPicPr>
+        <p:blipFill>
+          <a:blip r:embed="rId5"/>
+          <a:stretch>
+            <a:fillRect/>
+          </a:stretch>
+        </p:blipFill>
+        <p:spPr>
+          <a:xfrm>
+            <a:off x="690459" y="4119295"/>
+            <a:ext cx="3824286" cy="2867603"/>
+          </a:xfrm>
+          <a:prstGeom prst="rect">
+            <a:avLst/>
+          </a:prstGeom>
+        </p:spPr>
+      </p:pic>
     </p:spTree>
     <p:extLst>
       <p:ext uri="{BB962C8B-B14F-4D97-AF65-F5344CB8AC3E}">
-        <p14:creationId xmlns:p14="http://schemas.microsoft.com/office/powerpoint/2010/main" val="1036085452"/>
+        <p14:creationId xmlns:p14="http://schemas.microsoft.com/office/powerpoint/2010/main" val="3117128030"/>
       </p:ext>
     </p:extLst>
   </p:cSld>
@@ -30909,6 +33106,2020 @@
     <p:extLst>
       <p:ext uri="{BB962C8B-B14F-4D97-AF65-F5344CB8AC3E}">
         <p14:creationId xmlns:p14="http://schemas.microsoft.com/office/powerpoint/2010/main" val="1830381613"/>
+      </p:ext>
+    </p:extLst>
+  </p:cSld>
+  <p:clrMapOvr>
+    <a:masterClrMapping/>
+  </p:clrMapOvr>
+  <p:timing>
+    <p:tnLst>
+      <p:par>
+        <p:cTn id="1" dur="indefinite" restart="never" nodeType="tmRoot"/>
+      </p:par>
+    </p:tnLst>
+  </p:timing>
+</p:sld>
+</file>
+
+<file path=ppt/slides/slide30.xml><?xml version="1.0" encoding="utf-8"?>
+<p:sld xmlns:a="http://schemas.openxmlformats.org/drawingml/2006/main" xmlns:r="http://schemas.openxmlformats.org/officeDocument/2006/relationships" xmlns:p="http://schemas.openxmlformats.org/presentationml/2006/main">
+  <p:cSld>
+    <p:spTree>
+      <p:nvGrpSpPr>
+        <p:cNvPr id="1" name=""/>
+        <p:cNvGrpSpPr/>
+        <p:nvPr/>
+      </p:nvGrpSpPr>
+      <p:grpSpPr>
+        <a:xfrm>
+          <a:off x="0" y="0"/>
+          <a:ext cx="0" cy="0"/>
+          <a:chOff x="0" y="0"/>
+          <a:chExt cx="0" cy="0"/>
+        </a:xfrm>
+      </p:grpSpPr>
+      <p:sp>
+        <p:nvSpPr>
+          <p:cNvPr id="8" name="Rectangle 7"/>
+          <p:cNvSpPr/>
+          <p:nvPr/>
+        </p:nvSpPr>
+        <p:spPr>
+          <a:xfrm>
+            <a:off x="478970" y="150669"/>
+            <a:ext cx="8207829" cy="523220"/>
+          </a:xfrm>
+          <a:prstGeom prst="rect">
+            <a:avLst/>
+          </a:prstGeom>
+        </p:spPr>
+        <p:txBody>
+          <a:bodyPr wrap="square">
+            <a:spAutoFit/>
+          </a:bodyPr>
+          <a:lstStyle/>
+          <a:p>
+            <a:pPr algn="ctr"/>
+            <a:r>
+              <a:rPr lang="en-US" sz="2800" b="1" dirty="0" smtClean="0">
+                <a:solidFill>
+                  <a:schemeClr val="accent1">
+                    <a:lumMod val="50000"/>
+                  </a:schemeClr>
+                </a:solidFill>
+                <a:cs typeface="Arial" panose="020B0604020202020204" pitchFamily="34" charset="0"/>
+              </a:rPr>
+              <a:t>2-parallel </a:t>
+            </a:r>
+            <a:r>
+              <a:rPr lang="en-US" sz="2800" b="1" dirty="0">
+                <a:solidFill>
+                  <a:schemeClr val="accent1">
+                    <a:lumMod val="50000"/>
+                  </a:schemeClr>
+                </a:solidFill>
+                <a:cs typeface="Arial" panose="020B0604020202020204" pitchFamily="34" charset="0"/>
+              </a:rPr>
+              <a:t>with and without </a:t>
+            </a:r>
+            <a:r>
+              <a:rPr lang="en-US" sz="2800" b="1" dirty="0" smtClean="0">
+                <a:solidFill>
+                  <a:schemeClr val="accent1">
+                    <a:lumMod val="50000"/>
+                  </a:schemeClr>
+                </a:solidFill>
+                <a:cs typeface="Arial" panose="020B0604020202020204" pitchFamily="34" charset="0"/>
+              </a:rPr>
+              <a:t>interleaving</a:t>
+            </a:r>
+            <a:r>
+              <a:rPr lang="tr-TR" sz="2800" b="1" dirty="0" smtClean="0">
+                <a:solidFill>
+                  <a:schemeClr val="accent1">
+                    <a:lumMod val="50000"/>
+                  </a:schemeClr>
+                </a:solidFill>
+                <a:cs typeface="Arial" panose="020B0604020202020204" pitchFamily="34" charset="0"/>
+              </a:rPr>
+              <a:t> </a:t>
+            </a:r>
+            <a:endParaRPr lang="en-US" sz="2800" dirty="0">
+              <a:solidFill>
+                <a:schemeClr val="accent1">
+                  <a:lumMod val="50000"/>
+                </a:schemeClr>
+              </a:solidFill>
+              <a:cs typeface="Arial" panose="020B0604020202020204" pitchFamily="34" charset="0"/>
+            </a:endParaRPr>
+          </a:p>
+        </p:txBody>
+      </p:sp>
+      <p:sp>
+        <p:nvSpPr>
+          <p:cNvPr id="26" name="Rectangle 25"/>
+          <p:cNvSpPr/>
+          <p:nvPr/>
+        </p:nvSpPr>
+        <p:spPr>
+          <a:xfrm>
+            <a:off x="193846" y="706938"/>
+            <a:ext cx="8950154" cy="369332"/>
+          </a:xfrm>
+          <a:prstGeom prst="rect">
+            <a:avLst/>
+          </a:prstGeom>
+        </p:spPr>
+        <p:txBody>
+          <a:bodyPr wrap="square">
+            <a:spAutoFit/>
+          </a:bodyPr>
+          <a:lstStyle/>
+          <a:p>
+            <a:pPr marL="285750" indent="-285750">
+              <a:buFont typeface="Arial" panose="020B0604020202020204" pitchFamily="34" charset="0"/>
+              <a:buChar char="•"/>
+            </a:pPr>
+            <a:r>
+              <a:rPr lang="tr-TR" dirty="0" smtClean="0">
+                <a:solidFill>
+                  <a:srgbClr val="002060"/>
+                </a:solidFill>
+                <a:cs typeface="Arial" panose="020B0604020202020204" pitchFamily="34" charset="0"/>
+              </a:rPr>
+              <a:t>Interleaving is </a:t>
+            </a:r>
+            <a:r>
+              <a:rPr lang="tr-TR" dirty="0" err="1" smtClean="0">
+                <a:solidFill>
+                  <a:srgbClr val="002060"/>
+                </a:solidFill>
+                <a:cs typeface="Arial" panose="020B0604020202020204" pitchFamily="34" charset="0"/>
+              </a:rPr>
+              <a:t>applied</a:t>
+            </a:r>
+            <a:r>
+              <a:rPr lang="tr-TR" dirty="0" smtClean="0">
+                <a:solidFill>
+                  <a:srgbClr val="002060"/>
+                </a:solidFill>
+                <a:cs typeface="Arial" panose="020B0604020202020204" pitchFamily="34" charset="0"/>
+              </a:rPr>
+              <a:t> </a:t>
+            </a:r>
+            <a:r>
+              <a:rPr lang="tr-TR" dirty="0" err="1" smtClean="0">
+                <a:solidFill>
+                  <a:srgbClr val="002060"/>
+                </a:solidFill>
+                <a:cs typeface="Arial" panose="020B0604020202020204" pitchFamily="34" charset="0"/>
+              </a:rPr>
+              <a:t>now</a:t>
+            </a:r>
+            <a:r>
+              <a:rPr lang="tr-TR" dirty="0" smtClean="0">
+                <a:solidFill>
+                  <a:srgbClr val="002060"/>
+                </a:solidFill>
+                <a:cs typeface="Arial" panose="020B0604020202020204" pitchFamily="34" charset="0"/>
+              </a:rPr>
+              <a:t> </a:t>
+            </a:r>
+            <a:r>
+              <a:rPr lang="tr-TR" dirty="0" err="1" smtClean="0">
+                <a:solidFill>
+                  <a:srgbClr val="002060"/>
+                </a:solidFill>
+                <a:cs typeface="Arial" panose="020B0604020202020204" pitchFamily="34" charset="0"/>
+              </a:rPr>
+              <a:t>with</a:t>
+            </a:r>
+            <a:r>
+              <a:rPr lang="tr-TR" dirty="0" smtClean="0">
+                <a:solidFill>
+                  <a:srgbClr val="002060"/>
+                </a:solidFill>
+                <a:cs typeface="Arial" panose="020B0604020202020204" pitchFamily="34" charset="0"/>
+              </a:rPr>
+              <a:t> 180 </a:t>
+            </a:r>
+            <a:r>
+              <a:rPr lang="tr-TR" dirty="0" err="1" smtClean="0">
+                <a:solidFill>
+                  <a:srgbClr val="002060"/>
+                </a:solidFill>
+                <a:cs typeface="Arial" panose="020B0604020202020204" pitchFamily="34" charset="0"/>
+              </a:rPr>
+              <a:t>degrees</a:t>
+            </a:r>
+            <a:r>
+              <a:rPr lang="tr-TR" dirty="0" smtClean="0">
+                <a:solidFill>
+                  <a:srgbClr val="002060"/>
+                </a:solidFill>
+                <a:cs typeface="Arial" panose="020B0604020202020204" pitchFamily="34" charset="0"/>
+              </a:rPr>
+              <a:t>.</a:t>
+            </a:r>
+            <a:endParaRPr lang="tr-TR" b="1" dirty="0" smtClean="0">
+              <a:solidFill>
+                <a:srgbClr val="002060"/>
+              </a:solidFill>
+              <a:cs typeface="Arial" panose="020B0604020202020204" pitchFamily="34" charset="0"/>
+            </a:endParaRPr>
+          </a:p>
+        </p:txBody>
+      </p:sp>
+      <p:graphicFrame>
+        <p:nvGraphicFramePr>
+          <p:cNvPr id="9" name="Table 8"/>
+          <p:cNvGraphicFramePr>
+            <a:graphicFrameLocks noGrp="1"/>
+          </p:cNvGraphicFramePr>
+          <p:nvPr>
+            <p:extLst>
+              <p:ext uri="{D42A27DB-BD31-4B8C-83A1-F6EECF244321}">
+                <p14:modId xmlns:p14="http://schemas.microsoft.com/office/powerpoint/2010/main" val="2280641781"/>
+              </p:ext>
+            </p:extLst>
+          </p:nvPr>
+        </p:nvGraphicFramePr>
+        <p:xfrm>
+          <a:off x="112248" y="4158821"/>
+          <a:ext cx="5400000" cy="2533650"/>
+        </p:xfrm>
+        <a:graphic>
+          <a:graphicData uri="http://schemas.openxmlformats.org/drawingml/2006/table">
+            <a:tbl>
+              <a:tblPr>
+                <a:tableStyleId>{5C22544A-7EE6-4342-B048-85BDC9FD1C3A}</a:tableStyleId>
+              </a:tblPr>
+              <a:tblGrid>
+                <a:gridCol w="1800000">
+                  <a:extLst>
+                    <a:ext uri="{9D8B030D-6E8A-4147-A177-3AD203B41FA5}">
+                      <a16:colId xmlns:a16="http://schemas.microsoft.com/office/drawing/2014/main" val="3683365444"/>
+                    </a:ext>
+                  </a:extLst>
+                </a:gridCol>
+                <a:gridCol w="1800000">
+                  <a:extLst>
+                    <a:ext uri="{9D8B030D-6E8A-4147-A177-3AD203B41FA5}">
+                      <a16:colId xmlns:a16="http://schemas.microsoft.com/office/drawing/2014/main" val="1433903315"/>
+                    </a:ext>
+                  </a:extLst>
+                </a:gridCol>
+                <a:gridCol w="1800000">
+                  <a:extLst>
+                    <a:ext uri="{9D8B030D-6E8A-4147-A177-3AD203B41FA5}">
+                      <a16:colId xmlns:a16="http://schemas.microsoft.com/office/drawing/2014/main" val="2834243585"/>
+                    </a:ext>
+                  </a:extLst>
+                </a:gridCol>
+              </a:tblGrid>
+              <a:tr h="238119">
+                <a:tc>
+                  <a:txBody>
+                    <a:bodyPr/>
+                    <a:lstStyle/>
+                    <a:p>
+                      <a:pPr algn="ctr" fontAlgn="b"/>
+                      <a:endParaRPr lang="en-US" sz="1600" b="0" i="0" u="none" strike="noStrike" dirty="0">
+                        <a:solidFill>
+                          <a:srgbClr val="000000"/>
+                        </a:solidFill>
+                        <a:effectLst/>
+                        <a:latin typeface="Calibri" panose="020F0502020204030204" pitchFamily="34" charset="0"/>
+                      </a:endParaRPr>
+                    </a:p>
+                  </a:txBody>
+                  <a:tcPr marL="9525" marR="9525" marT="9525" marB="0" anchor="b">
+                    <a:solidFill>
+                      <a:schemeClr val="bg1">
+                        <a:lumMod val="85000"/>
+                      </a:schemeClr>
+                    </a:solidFill>
+                  </a:tcPr>
+                </a:tc>
+                <a:tc>
+                  <a:txBody>
+                    <a:bodyPr/>
+                    <a:lstStyle/>
+                    <a:p>
+                      <a:pPr algn="ctr" fontAlgn="b"/>
+                      <a:r>
+                        <a:rPr lang="tr-TR" sz="1600" b="1" i="0" u="none" strike="noStrike" dirty="0" err="1" smtClean="0">
+                          <a:solidFill>
+                            <a:srgbClr val="000000"/>
+                          </a:solidFill>
+                          <a:effectLst/>
+                          <a:latin typeface="Calibri" panose="020F0502020204030204" pitchFamily="34" charset="0"/>
+                        </a:rPr>
+                        <a:t>With</a:t>
+                      </a:r>
+                      <a:r>
+                        <a:rPr lang="tr-TR" sz="1600" b="1" i="0" u="none" strike="noStrike" dirty="0" smtClean="0">
+                          <a:solidFill>
+                            <a:srgbClr val="000000"/>
+                          </a:solidFill>
+                          <a:effectLst/>
+                          <a:latin typeface="Calibri" panose="020F0502020204030204" pitchFamily="34" charset="0"/>
+                        </a:rPr>
+                        <a:t> interleaving</a:t>
+                      </a:r>
+                      <a:endParaRPr lang="en-US" sz="1600" b="1" i="0" u="none" strike="noStrike" dirty="0">
+                        <a:solidFill>
+                          <a:srgbClr val="000000"/>
+                        </a:solidFill>
+                        <a:effectLst/>
+                        <a:latin typeface="Calibri" panose="020F0502020204030204" pitchFamily="34" charset="0"/>
+                      </a:endParaRPr>
+                    </a:p>
+                  </a:txBody>
+                  <a:tcPr marL="9525" marR="9525" marT="9525" marB="0" anchor="b">
+                    <a:solidFill>
+                      <a:schemeClr val="bg1">
+                        <a:lumMod val="85000"/>
+                      </a:schemeClr>
+                    </a:solidFill>
+                  </a:tcPr>
+                </a:tc>
+                <a:tc>
+                  <a:txBody>
+                    <a:bodyPr/>
+                    <a:lstStyle/>
+                    <a:p>
+                      <a:pPr algn="ctr" fontAlgn="b"/>
+                      <a:r>
+                        <a:rPr lang="tr-TR" sz="1600" b="1" i="0" u="none" strike="noStrike" dirty="0" err="1" smtClean="0">
+                          <a:solidFill>
+                            <a:srgbClr val="000000"/>
+                          </a:solidFill>
+                          <a:effectLst/>
+                          <a:latin typeface="Calibri" panose="020F0502020204030204" pitchFamily="34" charset="0"/>
+                        </a:rPr>
+                        <a:t>Without</a:t>
+                      </a:r>
+                      <a:r>
+                        <a:rPr lang="tr-TR" sz="1600" b="1" i="0" u="none" strike="noStrike" dirty="0" smtClean="0">
+                          <a:solidFill>
+                            <a:srgbClr val="000000"/>
+                          </a:solidFill>
+                          <a:effectLst/>
+                          <a:latin typeface="Calibri" panose="020F0502020204030204" pitchFamily="34" charset="0"/>
+                        </a:rPr>
+                        <a:t> interleaving</a:t>
+                      </a:r>
+                      <a:endParaRPr lang="en-US" sz="1600" b="1" i="0" u="none" strike="noStrike" dirty="0">
+                        <a:solidFill>
+                          <a:srgbClr val="000000"/>
+                        </a:solidFill>
+                        <a:effectLst/>
+                        <a:latin typeface="Calibri" panose="020F0502020204030204" pitchFamily="34" charset="0"/>
+                      </a:endParaRPr>
+                    </a:p>
+                  </a:txBody>
+                  <a:tcPr marL="9525" marR="9525" marT="9525" marB="0" anchor="b">
+                    <a:solidFill>
+                      <a:schemeClr val="bg1">
+                        <a:lumMod val="85000"/>
+                      </a:schemeClr>
+                    </a:solidFill>
+                  </a:tcPr>
+                </a:tc>
+                <a:extLst>
+                  <a:ext uri="{0D108BD9-81ED-4DB2-BD59-A6C34878D82A}">
+                    <a16:rowId xmlns:a16="http://schemas.microsoft.com/office/drawing/2014/main" val="4231862664"/>
+                  </a:ext>
+                </a:extLst>
+              </a:tr>
+              <a:tr h="238119">
+                <a:tc>
+                  <a:txBody>
+                    <a:bodyPr/>
+                    <a:lstStyle/>
+                    <a:p>
+                      <a:pPr algn="ctr" fontAlgn="b"/>
+                      <a:r>
+                        <a:rPr lang="tr-TR" sz="1600" b="0" i="0" u="none" strike="noStrike" dirty="0" smtClean="0">
+                          <a:solidFill>
+                            <a:srgbClr val="000000"/>
+                          </a:solidFill>
+                          <a:effectLst/>
+                          <a:latin typeface="Calibri" panose="020F0502020204030204" pitchFamily="34" charset="0"/>
+                        </a:rPr>
+                        <a:t>Idc1-DC</a:t>
+                      </a:r>
+                      <a:endParaRPr lang="en-US" sz="1600" b="0" i="0" u="none" strike="noStrike" dirty="0">
+                        <a:solidFill>
+                          <a:srgbClr val="000000"/>
+                        </a:solidFill>
+                        <a:effectLst/>
+                        <a:latin typeface="Calibri" panose="020F0502020204030204" pitchFamily="34" charset="0"/>
+                      </a:endParaRPr>
+                    </a:p>
+                  </a:txBody>
+                  <a:tcPr marL="9525" marR="9525" marT="9525" marB="0" anchor="b">
+                    <a:solidFill>
+                      <a:schemeClr val="accent1">
+                        <a:lumMod val="20000"/>
+                        <a:lumOff val="80000"/>
+                      </a:schemeClr>
+                    </a:solidFill>
+                  </a:tcPr>
+                </a:tc>
+                <a:tc>
+                  <a:txBody>
+                    <a:bodyPr/>
+                    <a:lstStyle/>
+                    <a:p>
+                      <a:pPr algn="ctr" fontAlgn="b"/>
+                      <a:r>
+                        <a:rPr lang="tr-TR" sz="1600" b="0" i="0" u="none" strike="noStrike" dirty="0" smtClean="0">
+                          <a:solidFill>
+                            <a:srgbClr val="000000"/>
+                          </a:solidFill>
+                          <a:effectLst/>
+                          <a:latin typeface="Calibri" panose="020F0502020204030204" pitchFamily="34" charset="0"/>
+                        </a:rPr>
+                        <a:t>7.417 A</a:t>
+                      </a:r>
+                      <a:endParaRPr lang="en-US" sz="1600" b="0" i="0" u="none" strike="noStrike" dirty="0">
+                        <a:solidFill>
+                          <a:srgbClr val="000000"/>
+                        </a:solidFill>
+                        <a:effectLst/>
+                        <a:latin typeface="Calibri" panose="020F0502020204030204" pitchFamily="34" charset="0"/>
+                      </a:endParaRPr>
+                    </a:p>
+                  </a:txBody>
+                  <a:tcPr marL="9525" marR="9525" marT="9525" marB="0" anchor="b">
+                    <a:solidFill>
+                      <a:schemeClr val="accent1">
+                        <a:lumMod val="20000"/>
+                        <a:lumOff val="80000"/>
+                      </a:schemeClr>
+                    </a:solidFill>
+                  </a:tcPr>
+                </a:tc>
+                <a:tc>
+                  <a:txBody>
+                    <a:bodyPr/>
+                    <a:lstStyle/>
+                    <a:p>
+                      <a:pPr algn="ctr" fontAlgn="b"/>
+                      <a:r>
+                        <a:rPr lang="tr-TR" sz="1600" b="0" i="0" u="none" strike="noStrike" dirty="0" smtClean="0">
+                          <a:solidFill>
+                            <a:srgbClr val="000000"/>
+                          </a:solidFill>
+                          <a:effectLst/>
+                          <a:latin typeface="Calibri" panose="020F0502020204030204" pitchFamily="34" charset="0"/>
+                        </a:rPr>
+                        <a:t>7.417 A</a:t>
+                      </a:r>
+                      <a:endParaRPr lang="en-US" sz="1600" b="0" i="0" u="none" strike="noStrike" dirty="0">
+                        <a:solidFill>
+                          <a:srgbClr val="000000"/>
+                        </a:solidFill>
+                        <a:effectLst/>
+                        <a:latin typeface="Calibri" panose="020F0502020204030204" pitchFamily="34" charset="0"/>
+                      </a:endParaRPr>
+                    </a:p>
+                  </a:txBody>
+                  <a:tcPr marL="9525" marR="9525" marT="9525" marB="0" anchor="b">
+                    <a:solidFill>
+                      <a:schemeClr val="accent1">
+                        <a:lumMod val="20000"/>
+                        <a:lumOff val="80000"/>
+                      </a:schemeClr>
+                    </a:solidFill>
+                  </a:tcPr>
+                </a:tc>
+                <a:extLst>
+                  <a:ext uri="{0D108BD9-81ED-4DB2-BD59-A6C34878D82A}">
+                    <a16:rowId xmlns:a16="http://schemas.microsoft.com/office/drawing/2014/main" val="1591764390"/>
+                  </a:ext>
+                </a:extLst>
+              </a:tr>
+              <a:tr h="238119">
+                <a:tc>
+                  <a:txBody>
+                    <a:bodyPr/>
+                    <a:lstStyle/>
+                    <a:p>
+                      <a:pPr algn="ctr" fontAlgn="b"/>
+                      <a:r>
+                        <a:rPr lang="tr-TR" sz="1600" b="0" i="0" u="none" strike="noStrike" dirty="0" smtClean="0">
+                          <a:solidFill>
+                            <a:srgbClr val="000000"/>
+                          </a:solidFill>
+                          <a:effectLst/>
+                          <a:latin typeface="Calibri" panose="020F0502020204030204" pitchFamily="34" charset="0"/>
+                        </a:rPr>
+                        <a:t>Idc2-DC</a:t>
+                      </a:r>
+                      <a:endParaRPr lang="en-US" sz="1600" b="0" i="0" u="none" strike="noStrike" dirty="0">
+                        <a:solidFill>
+                          <a:srgbClr val="000000"/>
+                        </a:solidFill>
+                        <a:effectLst/>
+                        <a:latin typeface="Calibri" panose="020F0502020204030204" pitchFamily="34" charset="0"/>
+                      </a:endParaRPr>
+                    </a:p>
+                  </a:txBody>
+                  <a:tcPr marL="9525" marR="9525" marT="9525" marB="0" anchor="b">
+                    <a:solidFill>
+                      <a:schemeClr val="accent6">
+                        <a:lumMod val="40000"/>
+                        <a:lumOff val="60000"/>
+                      </a:schemeClr>
+                    </a:solidFill>
+                  </a:tcPr>
+                </a:tc>
+                <a:tc>
+                  <a:txBody>
+                    <a:bodyPr/>
+                    <a:lstStyle/>
+                    <a:p>
+                      <a:pPr algn="ctr" fontAlgn="b"/>
+                      <a:r>
+                        <a:rPr lang="tr-TR" sz="1600" b="0" i="0" u="none" strike="noStrike" dirty="0" smtClean="0">
+                          <a:solidFill>
+                            <a:srgbClr val="000000"/>
+                          </a:solidFill>
+                          <a:effectLst/>
+                          <a:latin typeface="Calibri" panose="020F0502020204030204" pitchFamily="34" charset="0"/>
+                        </a:rPr>
+                        <a:t>7.417 A</a:t>
+                      </a:r>
+                      <a:endParaRPr lang="en-US" sz="1600" b="0" i="0" u="none" strike="noStrike" dirty="0">
+                        <a:solidFill>
+                          <a:srgbClr val="000000"/>
+                        </a:solidFill>
+                        <a:effectLst/>
+                        <a:latin typeface="Calibri" panose="020F0502020204030204" pitchFamily="34" charset="0"/>
+                      </a:endParaRPr>
+                    </a:p>
+                  </a:txBody>
+                  <a:tcPr marL="9525" marR="9525" marT="9525" marB="0" anchor="b">
+                    <a:solidFill>
+                      <a:schemeClr val="accent6">
+                        <a:lumMod val="40000"/>
+                        <a:lumOff val="60000"/>
+                      </a:schemeClr>
+                    </a:solidFill>
+                  </a:tcPr>
+                </a:tc>
+                <a:tc>
+                  <a:txBody>
+                    <a:bodyPr/>
+                    <a:lstStyle/>
+                    <a:p>
+                      <a:pPr algn="ctr" fontAlgn="b"/>
+                      <a:r>
+                        <a:rPr lang="tr-TR" sz="1600" b="0" i="0" u="none" strike="noStrike" dirty="0" smtClean="0">
+                          <a:solidFill>
+                            <a:srgbClr val="000000"/>
+                          </a:solidFill>
+                          <a:effectLst/>
+                          <a:latin typeface="Calibri" panose="020F0502020204030204" pitchFamily="34" charset="0"/>
+                        </a:rPr>
+                        <a:t>7.417 A</a:t>
+                      </a:r>
+                      <a:endParaRPr lang="en-US" sz="1600" b="0" i="0" u="none" strike="noStrike" dirty="0">
+                        <a:solidFill>
+                          <a:srgbClr val="000000"/>
+                        </a:solidFill>
+                        <a:effectLst/>
+                        <a:latin typeface="Calibri" panose="020F0502020204030204" pitchFamily="34" charset="0"/>
+                      </a:endParaRPr>
+                    </a:p>
+                  </a:txBody>
+                  <a:tcPr marL="9525" marR="9525" marT="9525" marB="0" anchor="b">
+                    <a:solidFill>
+                      <a:schemeClr val="accent6">
+                        <a:lumMod val="40000"/>
+                        <a:lumOff val="60000"/>
+                      </a:schemeClr>
+                    </a:solidFill>
+                  </a:tcPr>
+                </a:tc>
+                <a:extLst>
+                  <a:ext uri="{0D108BD9-81ED-4DB2-BD59-A6C34878D82A}">
+                    <a16:rowId xmlns:a16="http://schemas.microsoft.com/office/drawing/2014/main" val="294692767"/>
+                  </a:ext>
+                </a:extLst>
+              </a:tr>
+              <a:tr h="238119">
+                <a:tc>
+                  <a:txBody>
+                    <a:bodyPr/>
+                    <a:lstStyle/>
+                    <a:p>
+                      <a:pPr algn="ctr" fontAlgn="b"/>
+                      <a:r>
+                        <a:rPr lang="tr-TR" sz="1600" b="0" i="0" u="none" strike="noStrike" dirty="0" smtClean="0">
+                          <a:solidFill>
+                            <a:srgbClr val="000000"/>
+                          </a:solidFill>
+                          <a:effectLst/>
+                          <a:latin typeface="Calibri" panose="020F0502020204030204" pitchFamily="34" charset="0"/>
+                        </a:rPr>
+                        <a:t>Idc1-RMS</a:t>
+                      </a:r>
+                      <a:endParaRPr lang="en-US" sz="1600" b="0" i="0" u="none" strike="noStrike" dirty="0">
+                        <a:solidFill>
+                          <a:srgbClr val="000000"/>
+                        </a:solidFill>
+                        <a:effectLst/>
+                        <a:latin typeface="Calibri" panose="020F0502020204030204" pitchFamily="34" charset="0"/>
+                      </a:endParaRPr>
+                    </a:p>
+                  </a:txBody>
+                  <a:tcPr marL="9525" marR="9525" marT="9525" marB="0" anchor="b">
+                    <a:solidFill>
+                      <a:schemeClr val="accent1">
+                        <a:lumMod val="20000"/>
+                        <a:lumOff val="80000"/>
+                      </a:schemeClr>
+                    </a:solidFill>
+                  </a:tcPr>
+                </a:tc>
+                <a:tc>
+                  <a:txBody>
+                    <a:bodyPr/>
+                    <a:lstStyle/>
+                    <a:p>
+                      <a:pPr algn="ctr" fontAlgn="b"/>
+                      <a:r>
+                        <a:rPr lang="tr-TR" sz="1600" b="0" i="0" u="none" strike="noStrike" dirty="0" smtClean="0">
+                          <a:solidFill>
+                            <a:srgbClr val="000000"/>
+                          </a:solidFill>
+                          <a:effectLst/>
+                          <a:latin typeface="Calibri" panose="020F0502020204030204" pitchFamily="34" charset="0"/>
+                        </a:rPr>
+                        <a:t>8.847 A</a:t>
+                      </a:r>
+                      <a:endParaRPr lang="en-US" sz="1600" b="0" i="0" u="none" strike="noStrike" dirty="0">
+                        <a:solidFill>
+                          <a:srgbClr val="000000"/>
+                        </a:solidFill>
+                        <a:effectLst/>
+                        <a:latin typeface="Calibri" panose="020F0502020204030204" pitchFamily="34" charset="0"/>
+                      </a:endParaRPr>
+                    </a:p>
+                  </a:txBody>
+                  <a:tcPr marL="9525" marR="9525" marT="9525" marB="0" anchor="b">
+                    <a:solidFill>
+                      <a:schemeClr val="accent1">
+                        <a:lumMod val="20000"/>
+                        <a:lumOff val="80000"/>
+                      </a:schemeClr>
+                    </a:solidFill>
+                  </a:tcPr>
+                </a:tc>
+                <a:tc>
+                  <a:txBody>
+                    <a:bodyPr/>
+                    <a:lstStyle/>
+                    <a:p>
+                      <a:pPr algn="ctr" fontAlgn="b"/>
+                      <a:r>
+                        <a:rPr lang="tr-TR" sz="1600" b="0" i="0" u="none" strike="noStrike" dirty="0" smtClean="0">
+                          <a:solidFill>
+                            <a:srgbClr val="000000"/>
+                          </a:solidFill>
+                          <a:effectLst/>
+                          <a:latin typeface="Calibri" panose="020F0502020204030204" pitchFamily="34" charset="0"/>
+                        </a:rPr>
+                        <a:t>8.847 A</a:t>
+                      </a:r>
+                      <a:endParaRPr lang="en-US" sz="1600" b="0" i="0" u="none" strike="noStrike" dirty="0">
+                        <a:solidFill>
+                          <a:srgbClr val="000000"/>
+                        </a:solidFill>
+                        <a:effectLst/>
+                        <a:latin typeface="Calibri" panose="020F0502020204030204" pitchFamily="34" charset="0"/>
+                      </a:endParaRPr>
+                    </a:p>
+                  </a:txBody>
+                  <a:tcPr marL="9525" marR="9525" marT="9525" marB="0" anchor="b">
+                    <a:solidFill>
+                      <a:schemeClr val="accent1">
+                        <a:lumMod val="20000"/>
+                        <a:lumOff val="80000"/>
+                      </a:schemeClr>
+                    </a:solidFill>
+                  </a:tcPr>
+                </a:tc>
+                <a:extLst>
+                  <a:ext uri="{0D108BD9-81ED-4DB2-BD59-A6C34878D82A}">
+                    <a16:rowId xmlns:a16="http://schemas.microsoft.com/office/drawing/2014/main" val="1624860496"/>
+                  </a:ext>
+                </a:extLst>
+              </a:tr>
+              <a:tr h="238119">
+                <a:tc>
+                  <a:txBody>
+                    <a:bodyPr/>
+                    <a:lstStyle/>
+                    <a:p>
+                      <a:pPr algn="ctr" fontAlgn="b"/>
+                      <a:r>
+                        <a:rPr lang="tr-TR" sz="1600" b="0" i="0" u="none" strike="noStrike" dirty="0" smtClean="0">
+                          <a:solidFill>
+                            <a:srgbClr val="000000"/>
+                          </a:solidFill>
+                          <a:effectLst/>
+                          <a:latin typeface="Calibri" panose="020F0502020204030204" pitchFamily="34" charset="0"/>
+                        </a:rPr>
+                        <a:t>Idc2-RMS</a:t>
+                      </a:r>
+                      <a:endParaRPr lang="en-US" sz="1600" b="0" i="0" u="none" strike="noStrike" dirty="0">
+                        <a:solidFill>
+                          <a:srgbClr val="000000"/>
+                        </a:solidFill>
+                        <a:effectLst/>
+                        <a:latin typeface="Calibri" panose="020F0502020204030204" pitchFamily="34" charset="0"/>
+                      </a:endParaRPr>
+                    </a:p>
+                  </a:txBody>
+                  <a:tcPr marL="9525" marR="9525" marT="9525" marB="0" anchor="b">
+                    <a:solidFill>
+                      <a:schemeClr val="accent6">
+                        <a:lumMod val="40000"/>
+                        <a:lumOff val="60000"/>
+                      </a:schemeClr>
+                    </a:solidFill>
+                  </a:tcPr>
+                </a:tc>
+                <a:tc>
+                  <a:txBody>
+                    <a:bodyPr/>
+                    <a:lstStyle/>
+                    <a:p>
+                      <a:pPr algn="ctr" fontAlgn="b"/>
+                      <a:r>
+                        <a:rPr lang="tr-TR" sz="1600" b="0" i="0" u="none" strike="noStrike" dirty="0" smtClean="0">
+                          <a:solidFill>
+                            <a:srgbClr val="000000"/>
+                          </a:solidFill>
+                          <a:effectLst/>
+                          <a:latin typeface="Calibri" panose="020F0502020204030204" pitchFamily="34" charset="0"/>
+                        </a:rPr>
+                        <a:t>8.847 A</a:t>
+                      </a:r>
+                      <a:endParaRPr lang="en-US" sz="1600" b="0" i="0" u="none" strike="noStrike" dirty="0">
+                        <a:solidFill>
+                          <a:srgbClr val="000000"/>
+                        </a:solidFill>
+                        <a:effectLst/>
+                        <a:latin typeface="Calibri" panose="020F0502020204030204" pitchFamily="34" charset="0"/>
+                      </a:endParaRPr>
+                    </a:p>
+                  </a:txBody>
+                  <a:tcPr marL="9525" marR="9525" marT="9525" marB="0" anchor="b">
+                    <a:solidFill>
+                      <a:schemeClr val="accent6">
+                        <a:lumMod val="40000"/>
+                        <a:lumOff val="60000"/>
+                      </a:schemeClr>
+                    </a:solidFill>
+                  </a:tcPr>
+                </a:tc>
+                <a:tc>
+                  <a:txBody>
+                    <a:bodyPr/>
+                    <a:lstStyle/>
+                    <a:p>
+                      <a:pPr algn="ctr" fontAlgn="b"/>
+                      <a:r>
+                        <a:rPr lang="tr-TR" sz="1600" b="0" i="0" u="none" strike="noStrike" dirty="0" smtClean="0">
+                          <a:solidFill>
+                            <a:srgbClr val="000000"/>
+                          </a:solidFill>
+                          <a:effectLst/>
+                          <a:latin typeface="Calibri" panose="020F0502020204030204" pitchFamily="34" charset="0"/>
+                        </a:rPr>
+                        <a:t>8.847 A</a:t>
+                      </a:r>
+                      <a:endParaRPr lang="en-US" sz="1600" b="0" i="0" u="none" strike="noStrike" dirty="0">
+                        <a:solidFill>
+                          <a:srgbClr val="000000"/>
+                        </a:solidFill>
+                        <a:effectLst/>
+                        <a:latin typeface="Calibri" panose="020F0502020204030204" pitchFamily="34" charset="0"/>
+                      </a:endParaRPr>
+                    </a:p>
+                  </a:txBody>
+                  <a:tcPr marL="9525" marR="9525" marT="9525" marB="0" anchor="b">
+                    <a:solidFill>
+                      <a:schemeClr val="accent6">
+                        <a:lumMod val="40000"/>
+                        <a:lumOff val="60000"/>
+                      </a:schemeClr>
+                    </a:solidFill>
+                  </a:tcPr>
+                </a:tc>
+                <a:extLst>
+                  <a:ext uri="{0D108BD9-81ED-4DB2-BD59-A6C34878D82A}">
+                    <a16:rowId xmlns:a16="http://schemas.microsoft.com/office/drawing/2014/main" val="3172081951"/>
+                  </a:ext>
+                </a:extLst>
+              </a:tr>
+              <a:tr h="238119">
+                <a:tc>
+                  <a:txBody>
+                    <a:bodyPr/>
+                    <a:lstStyle/>
+                    <a:p>
+                      <a:pPr algn="ctr" fontAlgn="b"/>
+                      <a:r>
+                        <a:rPr lang="tr-TR" sz="1600" b="0" i="0" u="none" strike="noStrike" dirty="0" smtClean="0">
+                          <a:solidFill>
+                            <a:srgbClr val="000000"/>
+                          </a:solidFill>
+                          <a:effectLst/>
+                          <a:latin typeface="Calibri" panose="020F0502020204030204" pitchFamily="34" charset="0"/>
+                        </a:rPr>
+                        <a:t>Icap1-RMS</a:t>
+                      </a:r>
+                      <a:endParaRPr lang="en-US" sz="1600" b="0" i="0" u="none" strike="noStrike" dirty="0">
+                        <a:solidFill>
+                          <a:srgbClr val="000000"/>
+                        </a:solidFill>
+                        <a:effectLst/>
+                        <a:latin typeface="Calibri" panose="020F0502020204030204" pitchFamily="34" charset="0"/>
+                      </a:endParaRPr>
+                    </a:p>
+                  </a:txBody>
+                  <a:tcPr marL="9525" marR="9525" marT="9525" marB="0" anchor="b">
+                    <a:solidFill>
+                      <a:schemeClr val="accent1">
+                        <a:lumMod val="20000"/>
+                        <a:lumOff val="80000"/>
+                      </a:schemeClr>
+                    </a:solidFill>
+                  </a:tcPr>
+                </a:tc>
+                <a:tc>
+                  <a:txBody>
+                    <a:bodyPr/>
+                    <a:lstStyle/>
+                    <a:p>
+                      <a:pPr algn="ctr" fontAlgn="b"/>
+                      <a:r>
+                        <a:rPr lang="tr-TR" sz="1600" b="0" i="0" u="none" strike="noStrike" dirty="0" smtClean="0">
+                          <a:solidFill>
+                            <a:srgbClr val="FF0000"/>
+                          </a:solidFill>
+                          <a:effectLst/>
+                          <a:latin typeface="Calibri" panose="020F0502020204030204" pitchFamily="34" charset="0"/>
+                        </a:rPr>
+                        <a:t>3.650 </a:t>
+                      </a:r>
+                      <a:r>
+                        <a:rPr lang="tr-TR" sz="1600" b="0" i="0" u="none" strike="noStrike" dirty="0" smtClean="0">
+                          <a:solidFill>
+                            <a:srgbClr val="FF0000"/>
+                          </a:solidFill>
+                          <a:effectLst/>
+                          <a:latin typeface="Calibri" panose="020F0502020204030204" pitchFamily="34" charset="0"/>
+                        </a:rPr>
+                        <a:t>A</a:t>
+                      </a:r>
+                      <a:endParaRPr lang="en-US" sz="1600" b="0" i="0" u="none" strike="noStrike" dirty="0">
+                        <a:solidFill>
+                          <a:srgbClr val="FF0000"/>
+                        </a:solidFill>
+                        <a:effectLst/>
+                        <a:latin typeface="Calibri" panose="020F0502020204030204" pitchFamily="34" charset="0"/>
+                      </a:endParaRPr>
+                    </a:p>
+                  </a:txBody>
+                  <a:tcPr marL="9525" marR="9525" marT="9525" marB="0" anchor="b">
+                    <a:solidFill>
+                      <a:schemeClr val="accent1">
+                        <a:lumMod val="20000"/>
+                        <a:lumOff val="80000"/>
+                      </a:schemeClr>
+                    </a:solidFill>
+                  </a:tcPr>
+                </a:tc>
+                <a:tc>
+                  <a:txBody>
+                    <a:bodyPr/>
+                    <a:lstStyle/>
+                    <a:p>
+                      <a:pPr algn="ctr" fontAlgn="b"/>
+                      <a:r>
+                        <a:rPr lang="tr-TR" sz="1600" b="0" i="0" u="none" strike="noStrike" dirty="0" smtClean="0">
+                          <a:solidFill>
+                            <a:srgbClr val="FF0000"/>
+                          </a:solidFill>
+                          <a:effectLst/>
+                          <a:latin typeface="Calibri" panose="020F0502020204030204" pitchFamily="34" charset="0"/>
+                        </a:rPr>
+                        <a:t>4.823 A</a:t>
+                      </a:r>
+                      <a:endParaRPr lang="en-US" sz="1600" b="0" i="0" u="none" strike="noStrike" dirty="0">
+                        <a:solidFill>
+                          <a:srgbClr val="FF0000"/>
+                        </a:solidFill>
+                        <a:effectLst/>
+                        <a:latin typeface="Calibri" panose="020F0502020204030204" pitchFamily="34" charset="0"/>
+                      </a:endParaRPr>
+                    </a:p>
+                  </a:txBody>
+                  <a:tcPr marL="9525" marR="9525" marT="9525" marB="0" anchor="b">
+                    <a:solidFill>
+                      <a:schemeClr val="accent1">
+                        <a:lumMod val="20000"/>
+                        <a:lumOff val="80000"/>
+                      </a:schemeClr>
+                    </a:solidFill>
+                  </a:tcPr>
+                </a:tc>
+                <a:extLst>
+                  <a:ext uri="{0D108BD9-81ED-4DB2-BD59-A6C34878D82A}">
+                    <a16:rowId xmlns:a16="http://schemas.microsoft.com/office/drawing/2014/main" val="1132043121"/>
+                  </a:ext>
+                </a:extLst>
+              </a:tr>
+              <a:tr h="238119">
+                <a:tc>
+                  <a:txBody>
+                    <a:bodyPr/>
+                    <a:lstStyle/>
+                    <a:p>
+                      <a:pPr algn="ctr" fontAlgn="b"/>
+                      <a:r>
+                        <a:rPr lang="tr-TR" sz="1600" b="0" i="0" u="none" strike="noStrike" dirty="0" smtClean="0">
+                          <a:solidFill>
+                            <a:srgbClr val="000000"/>
+                          </a:solidFill>
+                          <a:effectLst/>
+                          <a:latin typeface="Calibri" panose="020F0502020204030204" pitchFamily="34" charset="0"/>
+                        </a:rPr>
+                        <a:t>Icap2-RMS</a:t>
+                      </a:r>
+                      <a:endParaRPr lang="en-US" sz="1600" b="0" i="0" u="none" strike="noStrike" dirty="0">
+                        <a:solidFill>
+                          <a:srgbClr val="000000"/>
+                        </a:solidFill>
+                        <a:effectLst/>
+                        <a:latin typeface="Calibri" panose="020F0502020204030204" pitchFamily="34" charset="0"/>
+                      </a:endParaRPr>
+                    </a:p>
+                  </a:txBody>
+                  <a:tcPr marL="9525" marR="9525" marT="9525" marB="0" anchor="b">
+                    <a:solidFill>
+                      <a:schemeClr val="accent6">
+                        <a:lumMod val="40000"/>
+                        <a:lumOff val="60000"/>
+                      </a:schemeClr>
+                    </a:solidFill>
+                  </a:tcPr>
+                </a:tc>
+                <a:tc>
+                  <a:txBody>
+                    <a:bodyPr/>
+                    <a:lstStyle/>
+                    <a:p>
+                      <a:pPr algn="ctr" fontAlgn="b"/>
+                      <a:r>
+                        <a:rPr lang="tr-TR" sz="1600" b="0" i="0" u="none" strike="noStrike" dirty="0" smtClean="0">
+                          <a:solidFill>
+                            <a:srgbClr val="FF0000"/>
+                          </a:solidFill>
+                          <a:effectLst/>
+                          <a:latin typeface="Calibri" panose="020F0502020204030204" pitchFamily="34" charset="0"/>
+                        </a:rPr>
+                        <a:t>3.650 </a:t>
+                      </a:r>
+                      <a:r>
+                        <a:rPr lang="tr-TR" sz="1600" b="0" i="0" u="none" strike="noStrike" dirty="0" smtClean="0">
+                          <a:solidFill>
+                            <a:srgbClr val="FF0000"/>
+                          </a:solidFill>
+                          <a:effectLst/>
+                          <a:latin typeface="Calibri" panose="020F0502020204030204" pitchFamily="34" charset="0"/>
+                        </a:rPr>
+                        <a:t>A</a:t>
+                      </a:r>
+                      <a:endParaRPr lang="en-US" sz="1600" b="0" i="0" u="none" strike="noStrike" dirty="0">
+                        <a:solidFill>
+                          <a:srgbClr val="FF0000"/>
+                        </a:solidFill>
+                        <a:effectLst/>
+                        <a:latin typeface="Calibri" panose="020F0502020204030204" pitchFamily="34" charset="0"/>
+                      </a:endParaRPr>
+                    </a:p>
+                  </a:txBody>
+                  <a:tcPr marL="9525" marR="9525" marT="9525" marB="0" anchor="b">
+                    <a:solidFill>
+                      <a:schemeClr val="accent6">
+                        <a:lumMod val="40000"/>
+                        <a:lumOff val="60000"/>
+                      </a:schemeClr>
+                    </a:solidFill>
+                  </a:tcPr>
+                </a:tc>
+                <a:tc>
+                  <a:txBody>
+                    <a:bodyPr/>
+                    <a:lstStyle/>
+                    <a:p>
+                      <a:pPr algn="ctr" fontAlgn="b"/>
+                      <a:r>
+                        <a:rPr lang="tr-TR" sz="1600" b="0" i="0" u="none" strike="noStrike" dirty="0" smtClean="0">
+                          <a:solidFill>
+                            <a:srgbClr val="FF0000"/>
+                          </a:solidFill>
+                          <a:effectLst/>
+                          <a:latin typeface="Calibri" panose="020F0502020204030204" pitchFamily="34" charset="0"/>
+                        </a:rPr>
+                        <a:t>4.823 A</a:t>
+                      </a:r>
+                      <a:endParaRPr lang="en-US" sz="1600" b="0" i="0" u="none" strike="noStrike" dirty="0">
+                        <a:solidFill>
+                          <a:srgbClr val="FF0000"/>
+                        </a:solidFill>
+                        <a:effectLst/>
+                        <a:latin typeface="Calibri" panose="020F0502020204030204" pitchFamily="34" charset="0"/>
+                      </a:endParaRPr>
+                    </a:p>
+                  </a:txBody>
+                  <a:tcPr marL="9525" marR="9525" marT="9525" marB="0" anchor="b">
+                    <a:solidFill>
+                      <a:schemeClr val="accent6">
+                        <a:lumMod val="40000"/>
+                        <a:lumOff val="60000"/>
+                      </a:schemeClr>
+                    </a:solidFill>
+                  </a:tcPr>
+                </a:tc>
+                <a:extLst>
+                  <a:ext uri="{0D108BD9-81ED-4DB2-BD59-A6C34878D82A}">
+                    <a16:rowId xmlns:a16="http://schemas.microsoft.com/office/drawing/2014/main" val="3664379198"/>
+                  </a:ext>
+                </a:extLst>
+              </a:tr>
+              <a:tr h="238119">
+                <a:tc>
+                  <a:txBody>
+                    <a:bodyPr/>
+                    <a:lstStyle/>
+                    <a:p>
+                      <a:pPr algn="ctr" fontAlgn="b"/>
+                      <a:r>
+                        <a:rPr lang="tr-TR" sz="1600" b="0" i="0" u="none" strike="noStrike" dirty="0" err="1" smtClean="0">
+                          <a:solidFill>
+                            <a:srgbClr val="000000"/>
+                          </a:solidFill>
+                          <a:effectLst/>
+                          <a:latin typeface="Calibri" panose="020F0502020204030204" pitchFamily="34" charset="0"/>
+                        </a:rPr>
+                        <a:t>Iin</a:t>
+                      </a:r>
+                      <a:r>
+                        <a:rPr lang="tr-TR" sz="1600" b="0" i="0" u="none" strike="noStrike" dirty="0" smtClean="0">
+                          <a:solidFill>
+                            <a:srgbClr val="000000"/>
+                          </a:solidFill>
+                          <a:effectLst/>
+                          <a:latin typeface="Calibri" panose="020F0502020204030204" pitchFamily="34" charset="0"/>
+                        </a:rPr>
+                        <a:t>-DC</a:t>
+                      </a:r>
+                      <a:endParaRPr lang="en-US" sz="1600" b="0" i="0" u="none" strike="noStrike" dirty="0">
+                        <a:solidFill>
+                          <a:srgbClr val="000000"/>
+                        </a:solidFill>
+                        <a:effectLst/>
+                        <a:latin typeface="Calibri" panose="020F0502020204030204" pitchFamily="34" charset="0"/>
+                      </a:endParaRPr>
+                    </a:p>
+                  </a:txBody>
+                  <a:tcPr marL="9525" marR="9525" marT="9525" marB="0" anchor="b">
+                    <a:solidFill>
+                      <a:schemeClr val="accent1">
+                        <a:lumMod val="20000"/>
+                        <a:lumOff val="80000"/>
+                      </a:schemeClr>
+                    </a:solidFill>
+                  </a:tcPr>
+                </a:tc>
+                <a:tc>
+                  <a:txBody>
+                    <a:bodyPr/>
+                    <a:lstStyle/>
+                    <a:p>
+                      <a:pPr marL="0" marR="0" indent="0" algn="ctr" defTabSz="914400" rtl="0" eaLnBrk="1" fontAlgn="b" latinLnBrk="0" hangingPunct="1">
+                        <a:lnSpc>
+                          <a:spcPct val="100000"/>
+                        </a:lnSpc>
+                        <a:spcBef>
+                          <a:spcPts val="0"/>
+                        </a:spcBef>
+                        <a:spcAft>
+                          <a:spcPts val="0"/>
+                        </a:spcAft>
+                        <a:buClrTx/>
+                        <a:buSzTx/>
+                        <a:buFontTx/>
+                        <a:buNone/>
+                        <a:tabLst/>
+                        <a:defRPr/>
+                      </a:pPr>
+                      <a:r>
+                        <a:rPr lang="tr-TR" sz="1600" b="0" i="0" u="none" strike="noStrike" dirty="0" smtClean="0">
+                          <a:solidFill>
+                            <a:srgbClr val="000000"/>
+                          </a:solidFill>
+                          <a:effectLst/>
+                          <a:latin typeface="Calibri" panose="020F0502020204030204" pitchFamily="34" charset="0"/>
+                        </a:rPr>
+                        <a:t>14.83 A</a:t>
+                      </a:r>
+                      <a:endParaRPr lang="en-US" sz="1600" b="0" i="0" u="none" strike="noStrike" dirty="0" smtClean="0">
+                        <a:solidFill>
+                          <a:srgbClr val="000000"/>
+                        </a:solidFill>
+                        <a:effectLst/>
+                        <a:latin typeface="Calibri" panose="020F0502020204030204" pitchFamily="34" charset="0"/>
+                      </a:endParaRPr>
+                    </a:p>
+                  </a:txBody>
+                  <a:tcPr marL="9525" marR="9525" marT="9525" marB="0" anchor="b">
+                    <a:solidFill>
+                      <a:schemeClr val="accent1">
+                        <a:lumMod val="20000"/>
+                        <a:lumOff val="80000"/>
+                      </a:schemeClr>
+                    </a:solidFill>
+                  </a:tcPr>
+                </a:tc>
+                <a:tc>
+                  <a:txBody>
+                    <a:bodyPr/>
+                    <a:lstStyle/>
+                    <a:p>
+                      <a:pPr marL="0" marR="0" indent="0" algn="ctr" defTabSz="914400" rtl="0" eaLnBrk="1" fontAlgn="b" latinLnBrk="0" hangingPunct="1">
+                        <a:lnSpc>
+                          <a:spcPct val="100000"/>
+                        </a:lnSpc>
+                        <a:spcBef>
+                          <a:spcPts val="0"/>
+                        </a:spcBef>
+                        <a:spcAft>
+                          <a:spcPts val="0"/>
+                        </a:spcAft>
+                        <a:buClrTx/>
+                        <a:buSzTx/>
+                        <a:buFontTx/>
+                        <a:buNone/>
+                        <a:tabLst/>
+                        <a:defRPr/>
+                      </a:pPr>
+                      <a:r>
+                        <a:rPr lang="tr-TR" sz="1600" b="0" i="0" u="none" strike="noStrike" dirty="0" smtClean="0">
+                          <a:solidFill>
+                            <a:srgbClr val="000000"/>
+                          </a:solidFill>
+                          <a:effectLst/>
+                          <a:latin typeface="Calibri" panose="020F0502020204030204" pitchFamily="34" charset="0"/>
+                        </a:rPr>
+                        <a:t>14.83 A</a:t>
+                      </a:r>
+                      <a:endParaRPr lang="en-US" sz="1600" b="0" i="0" u="none" strike="noStrike" dirty="0" smtClean="0">
+                        <a:solidFill>
+                          <a:srgbClr val="000000"/>
+                        </a:solidFill>
+                        <a:effectLst/>
+                        <a:latin typeface="Calibri" panose="020F0502020204030204" pitchFamily="34" charset="0"/>
+                      </a:endParaRPr>
+                    </a:p>
+                  </a:txBody>
+                  <a:tcPr marL="9525" marR="9525" marT="9525" marB="0" anchor="b">
+                    <a:solidFill>
+                      <a:schemeClr val="accent1">
+                        <a:lumMod val="20000"/>
+                        <a:lumOff val="80000"/>
+                      </a:schemeClr>
+                    </a:solidFill>
+                  </a:tcPr>
+                </a:tc>
+                <a:extLst>
+                  <a:ext uri="{0D108BD9-81ED-4DB2-BD59-A6C34878D82A}">
+                    <a16:rowId xmlns:a16="http://schemas.microsoft.com/office/drawing/2014/main" val="1421460869"/>
+                  </a:ext>
+                </a:extLst>
+              </a:tr>
+              <a:tr h="238119">
+                <a:tc>
+                  <a:txBody>
+                    <a:bodyPr/>
+                    <a:lstStyle/>
+                    <a:p>
+                      <a:pPr algn="ctr" fontAlgn="b"/>
+                      <a:r>
+                        <a:rPr lang="tr-TR" sz="1600" b="0" i="0" u="none" strike="noStrike" dirty="0" err="1" smtClean="0">
+                          <a:solidFill>
+                            <a:srgbClr val="000000"/>
+                          </a:solidFill>
+                          <a:effectLst/>
+                          <a:latin typeface="Calibri" panose="020F0502020204030204" pitchFamily="34" charset="0"/>
+                        </a:rPr>
+                        <a:t>Iin</a:t>
+                      </a:r>
+                      <a:r>
+                        <a:rPr lang="tr-TR" sz="1600" b="0" i="0" u="none" strike="noStrike" dirty="0" smtClean="0">
+                          <a:solidFill>
+                            <a:srgbClr val="000000"/>
+                          </a:solidFill>
+                          <a:effectLst/>
+                          <a:latin typeface="Calibri" panose="020F0502020204030204" pitchFamily="34" charset="0"/>
+                        </a:rPr>
+                        <a:t>-RMS</a:t>
+                      </a:r>
+                      <a:endParaRPr lang="en-US" sz="1600" b="0" i="0" u="none" strike="noStrike" dirty="0">
+                        <a:solidFill>
+                          <a:srgbClr val="000000"/>
+                        </a:solidFill>
+                        <a:effectLst/>
+                        <a:latin typeface="Calibri" panose="020F0502020204030204" pitchFamily="34" charset="0"/>
+                      </a:endParaRPr>
+                    </a:p>
+                  </a:txBody>
+                  <a:tcPr marL="9525" marR="9525" marT="9525" marB="0" anchor="b">
+                    <a:solidFill>
+                      <a:schemeClr val="accent6">
+                        <a:lumMod val="40000"/>
+                        <a:lumOff val="60000"/>
+                      </a:schemeClr>
+                    </a:solidFill>
+                  </a:tcPr>
+                </a:tc>
+                <a:tc>
+                  <a:txBody>
+                    <a:bodyPr/>
+                    <a:lstStyle/>
+                    <a:p>
+                      <a:pPr marL="0" marR="0" indent="0" algn="ctr" defTabSz="914400" rtl="0" eaLnBrk="1" fontAlgn="b" latinLnBrk="0" hangingPunct="1">
+                        <a:lnSpc>
+                          <a:spcPct val="100000"/>
+                        </a:lnSpc>
+                        <a:spcBef>
+                          <a:spcPts val="0"/>
+                        </a:spcBef>
+                        <a:spcAft>
+                          <a:spcPts val="0"/>
+                        </a:spcAft>
+                        <a:buClrTx/>
+                        <a:buSzTx/>
+                        <a:buFontTx/>
+                        <a:buNone/>
+                        <a:tabLst/>
+                        <a:defRPr/>
+                      </a:pPr>
+                      <a:r>
+                        <a:rPr lang="tr-TR" sz="1600" b="0" i="0" u="none" strike="noStrike" dirty="0" smtClean="0">
+                          <a:solidFill>
+                            <a:srgbClr val="000000"/>
+                          </a:solidFill>
+                          <a:effectLst/>
+                          <a:latin typeface="Calibri" panose="020F0502020204030204" pitchFamily="34" charset="0"/>
+                        </a:rPr>
+                        <a:t>14.83 A</a:t>
+                      </a:r>
+                      <a:endParaRPr lang="en-US" sz="1600" b="0" i="0" u="none" strike="noStrike" dirty="0" smtClean="0">
+                        <a:solidFill>
+                          <a:srgbClr val="000000"/>
+                        </a:solidFill>
+                        <a:effectLst/>
+                        <a:latin typeface="Calibri" panose="020F0502020204030204" pitchFamily="34" charset="0"/>
+                      </a:endParaRPr>
+                    </a:p>
+                  </a:txBody>
+                  <a:tcPr marL="9525" marR="9525" marT="9525" marB="0" anchor="b">
+                    <a:solidFill>
+                      <a:schemeClr val="accent6">
+                        <a:lumMod val="40000"/>
+                        <a:lumOff val="60000"/>
+                      </a:schemeClr>
+                    </a:solidFill>
+                  </a:tcPr>
+                </a:tc>
+                <a:tc>
+                  <a:txBody>
+                    <a:bodyPr/>
+                    <a:lstStyle/>
+                    <a:p>
+                      <a:pPr marL="0" marR="0" indent="0" algn="ctr" defTabSz="914400" rtl="0" eaLnBrk="1" fontAlgn="b" latinLnBrk="0" hangingPunct="1">
+                        <a:lnSpc>
+                          <a:spcPct val="100000"/>
+                        </a:lnSpc>
+                        <a:spcBef>
+                          <a:spcPts val="0"/>
+                        </a:spcBef>
+                        <a:spcAft>
+                          <a:spcPts val="0"/>
+                        </a:spcAft>
+                        <a:buClrTx/>
+                        <a:buSzTx/>
+                        <a:buFontTx/>
+                        <a:buNone/>
+                        <a:tabLst/>
+                        <a:defRPr/>
+                      </a:pPr>
+                      <a:r>
+                        <a:rPr lang="tr-TR" sz="1600" b="0" i="0" u="none" strike="noStrike" dirty="0" smtClean="0">
+                          <a:solidFill>
+                            <a:srgbClr val="000000"/>
+                          </a:solidFill>
+                          <a:effectLst/>
+                          <a:latin typeface="Calibri" panose="020F0502020204030204" pitchFamily="34" charset="0"/>
+                        </a:rPr>
+                        <a:t>14.83 A</a:t>
+                      </a:r>
+                      <a:endParaRPr lang="en-US" sz="1600" b="0" i="0" u="none" strike="noStrike" dirty="0" smtClean="0">
+                        <a:solidFill>
+                          <a:srgbClr val="000000"/>
+                        </a:solidFill>
+                        <a:effectLst/>
+                        <a:latin typeface="Calibri" panose="020F0502020204030204" pitchFamily="34" charset="0"/>
+                      </a:endParaRPr>
+                    </a:p>
+                  </a:txBody>
+                  <a:tcPr marL="9525" marR="9525" marT="9525" marB="0" anchor="b">
+                    <a:solidFill>
+                      <a:schemeClr val="accent6">
+                        <a:lumMod val="40000"/>
+                        <a:lumOff val="60000"/>
+                      </a:schemeClr>
+                    </a:solidFill>
+                  </a:tcPr>
+                </a:tc>
+                <a:extLst>
+                  <a:ext uri="{0D108BD9-81ED-4DB2-BD59-A6C34878D82A}">
+                    <a16:rowId xmlns:a16="http://schemas.microsoft.com/office/drawing/2014/main" val="2042505319"/>
+                  </a:ext>
+                </a:extLst>
+              </a:tr>
+              <a:tr h="238119">
+                <a:tc>
+                  <a:txBody>
+                    <a:bodyPr/>
+                    <a:lstStyle/>
+                    <a:p>
+                      <a:pPr marL="0" marR="0" indent="0" algn="ctr" defTabSz="914400" rtl="0" eaLnBrk="1" fontAlgn="b" latinLnBrk="0" hangingPunct="1">
+                        <a:lnSpc>
+                          <a:spcPct val="100000"/>
+                        </a:lnSpc>
+                        <a:spcBef>
+                          <a:spcPts val="0"/>
+                        </a:spcBef>
+                        <a:spcAft>
+                          <a:spcPts val="0"/>
+                        </a:spcAft>
+                        <a:buClrTx/>
+                        <a:buSzTx/>
+                        <a:buFontTx/>
+                        <a:buNone/>
+                        <a:tabLst/>
+                        <a:defRPr/>
+                      </a:pPr>
+                      <a:r>
+                        <a:rPr lang="tr-TR" sz="1600" b="0" i="0" u="none" strike="noStrike" kern="1200" dirty="0" smtClean="0">
+                          <a:solidFill>
+                            <a:srgbClr val="000000"/>
+                          </a:solidFill>
+                          <a:effectLst/>
+                          <a:latin typeface="Calibri" panose="020F0502020204030204" pitchFamily="34" charset="0"/>
+                          <a:ea typeface="+mn-ea"/>
+                          <a:cs typeface="+mn-cs"/>
+                        </a:rPr>
+                        <a:t>Vdc-</a:t>
+                      </a:r>
+                      <a:r>
+                        <a:rPr lang="tr-TR" sz="1600" b="0" i="0" u="none" strike="noStrike" kern="1200" dirty="0" err="1" smtClean="0">
+                          <a:solidFill>
+                            <a:srgbClr val="000000"/>
+                          </a:solidFill>
+                          <a:effectLst/>
+                          <a:latin typeface="Calibri" panose="020F0502020204030204" pitchFamily="34" charset="0"/>
+                          <a:ea typeface="+mn-ea"/>
+                          <a:cs typeface="+mn-cs"/>
+                        </a:rPr>
+                        <a:t>pp</a:t>
+                      </a:r>
+                      <a:endParaRPr lang="en-US" sz="1600" b="0" i="0" u="none" strike="noStrike" kern="1200" dirty="0">
+                        <a:solidFill>
+                          <a:srgbClr val="000000"/>
+                        </a:solidFill>
+                        <a:effectLst/>
+                        <a:latin typeface="Calibri" panose="020F0502020204030204" pitchFamily="34" charset="0"/>
+                        <a:ea typeface="+mn-ea"/>
+                        <a:cs typeface="+mn-cs"/>
+                      </a:endParaRPr>
+                    </a:p>
+                  </a:txBody>
+                  <a:tcPr marL="9525" marR="9525" marT="9525" marB="0" anchor="b">
+                    <a:solidFill>
+                      <a:schemeClr val="accent1">
+                        <a:lumMod val="20000"/>
+                        <a:lumOff val="80000"/>
+                      </a:schemeClr>
+                    </a:solidFill>
+                  </a:tcPr>
+                </a:tc>
+                <a:tc>
+                  <a:txBody>
+                    <a:bodyPr/>
+                    <a:lstStyle/>
+                    <a:p>
+                      <a:pPr marL="0" marR="0" indent="0" algn="ctr" defTabSz="914400" rtl="0" eaLnBrk="1" fontAlgn="b" latinLnBrk="0" hangingPunct="1">
+                        <a:lnSpc>
+                          <a:spcPct val="100000"/>
+                        </a:lnSpc>
+                        <a:spcBef>
+                          <a:spcPts val="0"/>
+                        </a:spcBef>
+                        <a:spcAft>
+                          <a:spcPts val="0"/>
+                        </a:spcAft>
+                        <a:buClrTx/>
+                        <a:buSzTx/>
+                        <a:buFontTx/>
+                        <a:buNone/>
+                        <a:tabLst/>
+                        <a:defRPr/>
+                      </a:pPr>
+                      <a:r>
+                        <a:rPr lang="tr-TR" sz="1600" b="0" i="0" u="none" strike="noStrike" kern="1200" dirty="0" smtClean="0">
+                          <a:solidFill>
+                            <a:srgbClr val="FF0000"/>
+                          </a:solidFill>
+                          <a:effectLst/>
+                          <a:latin typeface="Calibri" panose="020F0502020204030204" pitchFamily="34" charset="0"/>
+                          <a:ea typeface="+mn-ea"/>
+                          <a:cs typeface="+mn-cs"/>
+                        </a:rPr>
+                        <a:t>3.08 %</a:t>
+                      </a:r>
+                      <a:endParaRPr lang="en-US" sz="1600" b="0" i="0" u="none" strike="noStrike" kern="1200" dirty="0">
+                        <a:solidFill>
+                          <a:srgbClr val="FF0000"/>
+                        </a:solidFill>
+                        <a:effectLst/>
+                        <a:latin typeface="Calibri" panose="020F0502020204030204" pitchFamily="34" charset="0"/>
+                        <a:ea typeface="+mn-ea"/>
+                        <a:cs typeface="+mn-cs"/>
+                      </a:endParaRPr>
+                    </a:p>
+                  </a:txBody>
+                  <a:tcPr marL="9525" marR="9525" marT="9525" marB="0" anchor="b">
+                    <a:solidFill>
+                      <a:schemeClr val="accent1">
+                        <a:lumMod val="20000"/>
+                        <a:lumOff val="80000"/>
+                      </a:schemeClr>
+                    </a:solidFill>
+                  </a:tcPr>
+                </a:tc>
+                <a:tc>
+                  <a:txBody>
+                    <a:bodyPr/>
+                    <a:lstStyle/>
+                    <a:p>
+                      <a:pPr marL="0" marR="0" indent="0" algn="ctr" defTabSz="914400" rtl="0" eaLnBrk="1" fontAlgn="b" latinLnBrk="0" hangingPunct="1">
+                        <a:lnSpc>
+                          <a:spcPct val="100000"/>
+                        </a:lnSpc>
+                        <a:spcBef>
+                          <a:spcPts val="0"/>
+                        </a:spcBef>
+                        <a:spcAft>
+                          <a:spcPts val="0"/>
+                        </a:spcAft>
+                        <a:buClrTx/>
+                        <a:buSzTx/>
+                        <a:buFontTx/>
+                        <a:buNone/>
+                        <a:tabLst/>
+                        <a:defRPr/>
+                      </a:pPr>
+                      <a:r>
+                        <a:rPr lang="tr-TR" sz="1600" b="0" i="0" u="none" strike="noStrike" kern="1200" dirty="0" smtClean="0">
+                          <a:solidFill>
+                            <a:srgbClr val="FF0000"/>
+                          </a:solidFill>
+                          <a:effectLst/>
+                          <a:latin typeface="Calibri" panose="020F0502020204030204" pitchFamily="34" charset="0"/>
+                          <a:ea typeface="+mn-ea"/>
+                          <a:cs typeface="+mn-cs"/>
+                        </a:rPr>
+                        <a:t>6.5 %</a:t>
+                      </a:r>
+                      <a:endParaRPr lang="en-US" sz="1600" b="0" i="0" u="none" strike="noStrike" kern="1200" dirty="0" smtClean="0">
+                        <a:solidFill>
+                          <a:srgbClr val="FF0000"/>
+                        </a:solidFill>
+                        <a:effectLst/>
+                        <a:latin typeface="Calibri" panose="020F0502020204030204" pitchFamily="34" charset="0"/>
+                        <a:ea typeface="+mn-ea"/>
+                        <a:cs typeface="+mn-cs"/>
+                      </a:endParaRPr>
+                    </a:p>
+                  </a:txBody>
+                  <a:tcPr marL="9525" marR="9525" marT="9525" marB="0" anchor="b">
+                    <a:solidFill>
+                      <a:schemeClr val="accent1">
+                        <a:lumMod val="20000"/>
+                        <a:lumOff val="80000"/>
+                      </a:schemeClr>
+                    </a:solidFill>
+                  </a:tcPr>
+                </a:tc>
+                <a:extLst>
+                  <a:ext uri="{0D108BD9-81ED-4DB2-BD59-A6C34878D82A}">
+                    <a16:rowId xmlns:a16="http://schemas.microsoft.com/office/drawing/2014/main" val="2332162909"/>
+                  </a:ext>
+                </a:extLst>
+              </a:tr>
+            </a:tbl>
+          </a:graphicData>
+        </a:graphic>
+      </p:graphicFrame>
+    </p:spTree>
+    <p:extLst>
+      <p:ext uri="{BB962C8B-B14F-4D97-AF65-F5344CB8AC3E}">
+        <p14:creationId xmlns:p14="http://schemas.microsoft.com/office/powerpoint/2010/main" val="1666291102"/>
+      </p:ext>
+    </p:extLst>
+  </p:cSld>
+  <p:clrMapOvr>
+    <a:masterClrMapping/>
+  </p:clrMapOvr>
+  <p:timing>
+    <p:tnLst>
+      <p:par>
+        <p:cTn id="1" dur="indefinite" restart="never" nodeType="tmRoot"/>
+      </p:par>
+    </p:tnLst>
+  </p:timing>
+</p:sld>
+</file>
+
+<file path=ppt/slides/slide31.xml><?xml version="1.0" encoding="utf-8"?>
+<p:sld xmlns:a="http://schemas.openxmlformats.org/drawingml/2006/main" xmlns:r="http://schemas.openxmlformats.org/officeDocument/2006/relationships" xmlns:p="http://schemas.openxmlformats.org/presentationml/2006/main">
+  <p:cSld>
+    <p:spTree>
+      <p:nvGrpSpPr>
+        <p:cNvPr id="1" name=""/>
+        <p:cNvGrpSpPr/>
+        <p:nvPr/>
+      </p:nvGrpSpPr>
+      <p:grpSpPr>
+        <a:xfrm>
+          <a:off x="0" y="0"/>
+          <a:ext cx="0" cy="0"/>
+          <a:chOff x="0" y="0"/>
+          <a:chExt cx="0" cy="0"/>
+        </a:xfrm>
+      </p:grpSpPr>
+      <p:sp>
+        <p:nvSpPr>
+          <p:cNvPr id="8" name="Rectangle 7"/>
+          <p:cNvSpPr/>
+          <p:nvPr/>
+        </p:nvSpPr>
+        <p:spPr>
+          <a:xfrm>
+            <a:off x="478970" y="150669"/>
+            <a:ext cx="8207829" cy="523220"/>
+          </a:xfrm>
+          <a:prstGeom prst="rect">
+            <a:avLst/>
+          </a:prstGeom>
+        </p:spPr>
+        <p:txBody>
+          <a:bodyPr wrap="square">
+            <a:spAutoFit/>
+          </a:bodyPr>
+          <a:lstStyle/>
+          <a:p>
+            <a:pPr algn="ctr"/>
+            <a:r>
+              <a:rPr lang="en-US" sz="2800" b="1" dirty="0" smtClean="0">
+                <a:solidFill>
+                  <a:schemeClr val="accent1">
+                    <a:lumMod val="50000"/>
+                  </a:schemeClr>
+                </a:solidFill>
+                <a:cs typeface="Arial" panose="020B0604020202020204" pitchFamily="34" charset="0"/>
+              </a:rPr>
+              <a:t>2-parallel </a:t>
+            </a:r>
+            <a:r>
+              <a:rPr lang="en-US" sz="2800" b="1" dirty="0">
+                <a:solidFill>
+                  <a:schemeClr val="accent1">
+                    <a:lumMod val="50000"/>
+                  </a:schemeClr>
+                </a:solidFill>
+                <a:cs typeface="Arial" panose="020B0604020202020204" pitchFamily="34" charset="0"/>
+              </a:rPr>
+              <a:t>with and without </a:t>
+            </a:r>
+            <a:r>
+              <a:rPr lang="en-US" sz="2800" b="1" dirty="0" smtClean="0">
+                <a:solidFill>
+                  <a:schemeClr val="accent1">
+                    <a:lumMod val="50000"/>
+                  </a:schemeClr>
+                </a:solidFill>
+                <a:cs typeface="Arial" panose="020B0604020202020204" pitchFamily="34" charset="0"/>
+              </a:rPr>
+              <a:t>interleaving</a:t>
+            </a:r>
+            <a:r>
+              <a:rPr lang="tr-TR" sz="2800" b="1" dirty="0" smtClean="0">
+                <a:solidFill>
+                  <a:schemeClr val="accent1">
+                    <a:lumMod val="50000"/>
+                  </a:schemeClr>
+                </a:solidFill>
+                <a:cs typeface="Arial" panose="020B0604020202020204" pitchFamily="34" charset="0"/>
+              </a:rPr>
+              <a:t> </a:t>
+            </a:r>
+            <a:endParaRPr lang="en-US" sz="2800" dirty="0">
+              <a:solidFill>
+                <a:schemeClr val="accent1">
+                  <a:lumMod val="50000"/>
+                </a:schemeClr>
+              </a:solidFill>
+              <a:cs typeface="Arial" panose="020B0604020202020204" pitchFamily="34" charset="0"/>
+            </a:endParaRPr>
+          </a:p>
+        </p:txBody>
+      </p:sp>
+      <p:sp>
+        <p:nvSpPr>
+          <p:cNvPr id="26" name="Rectangle 25"/>
+          <p:cNvSpPr/>
+          <p:nvPr/>
+        </p:nvSpPr>
+        <p:spPr>
+          <a:xfrm>
+            <a:off x="193846" y="706938"/>
+            <a:ext cx="8950154" cy="369332"/>
+          </a:xfrm>
+          <a:prstGeom prst="rect">
+            <a:avLst/>
+          </a:prstGeom>
+        </p:spPr>
+        <p:txBody>
+          <a:bodyPr wrap="square">
+            <a:spAutoFit/>
+          </a:bodyPr>
+          <a:lstStyle/>
+          <a:p>
+            <a:pPr marL="285750" indent="-285750">
+              <a:buFont typeface="Arial" panose="020B0604020202020204" pitchFamily="34" charset="0"/>
+              <a:buChar char="•"/>
+            </a:pPr>
+            <a:r>
+              <a:rPr lang="tr-TR" dirty="0" err="1" smtClean="0">
+                <a:solidFill>
+                  <a:srgbClr val="002060"/>
+                </a:solidFill>
+                <a:cs typeface="Arial" panose="020B0604020202020204" pitchFamily="34" charset="0"/>
+              </a:rPr>
+              <a:t>In</a:t>
+            </a:r>
+            <a:r>
+              <a:rPr lang="tr-TR" dirty="0" smtClean="0">
+                <a:solidFill>
+                  <a:srgbClr val="002060"/>
+                </a:solidFill>
+                <a:cs typeface="Arial" panose="020B0604020202020204" pitchFamily="34" charset="0"/>
+              </a:rPr>
+              <a:t> </a:t>
+            </a:r>
+            <a:r>
+              <a:rPr lang="tr-TR" dirty="0" err="1" smtClean="0">
+                <a:solidFill>
+                  <a:srgbClr val="002060"/>
+                </a:solidFill>
+                <a:cs typeface="Arial" panose="020B0604020202020204" pitchFamily="34" charset="0"/>
+              </a:rPr>
+              <a:t>the</a:t>
+            </a:r>
+            <a:endParaRPr lang="tr-TR" dirty="0" smtClean="0">
+              <a:solidFill>
+                <a:srgbClr val="002060"/>
+              </a:solidFill>
+              <a:cs typeface="Arial" panose="020B0604020202020204" pitchFamily="34" charset="0"/>
+            </a:endParaRPr>
+          </a:p>
+        </p:txBody>
+      </p:sp>
+    </p:spTree>
+    <p:extLst>
+      <p:ext uri="{BB962C8B-B14F-4D97-AF65-F5344CB8AC3E}">
+        <p14:creationId xmlns:p14="http://schemas.microsoft.com/office/powerpoint/2010/main" val="1269575545"/>
+      </p:ext>
+    </p:extLst>
+  </p:cSld>
+  <p:clrMapOvr>
+    <a:masterClrMapping/>
+  </p:clrMapOvr>
+  <p:timing>
+    <p:tnLst>
+      <p:par>
+        <p:cTn id="1" dur="indefinite" restart="never" nodeType="tmRoot"/>
+      </p:par>
+    </p:tnLst>
+  </p:timing>
+</p:sld>
+</file>
+
+<file path=ppt/slides/slide32.xml><?xml version="1.0" encoding="utf-8"?>
+<p:sld xmlns:a="http://schemas.openxmlformats.org/drawingml/2006/main" xmlns:r="http://schemas.openxmlformats.org/officeDocument/2006/relationships" xmlns:p="http://schemas.openxmlformats.org/presentationml/2006/main">
+  <p:cSld>
+    <p:spTree>
+      <p:nvGrpSpPr>
+        <p:cNvPr id="1" name=""/>
+        <p:cNvGrpSpPr/>
+        <p:nvPr/>
+      </p:nvGrpSpPr>
+      <p:grpSpPr>
+        <a:xfrm>
+          <a:off x="0" y="0"/>
+          <a:ext cx="0" cy="0"/>
+          <a:chOff x="0" y="0"/>
+          <a:chExt cx="0" cy="0"/>
+        </a:xfrm>
+      </p:grpSpPr>
+      <p:pic>
+        <p:nvPicPr>
+          <p:cNvPr id="7" name="Picture 6"/>
+          <p:cNvPicPr>
+            <a:picLocks noChangeAspect="1"/>
+          </p:cNvPicPr>
+          <p:nvPr/>
+        </p:nvPicPr>
+        <p:blipFill rotWithShape="1">
+          <a:blip r:embed="rId3">
+            <a:extLst>
+              <a:ext uri="{28A0092B-C50C-407E-A947-70E740481C1C}">
+                <a14:useLocalDpi xmlns:a14="http://schemas.microsoft.com/office/drawing/2010/main" val="0"/>
+              </a:ext>
+            </a:extLst>
+          </a:blip>
+          <a:srcRect l="29334" t="40357" r="29333" b="42024"/>
+          <a:stretch/>
+        </p:blipFill>
+        <p:spPr>
+          <a:xfrm>
+            <a:off x="1673677" y="3053443"/>
+            <a:ext cx="5937419" cy="2024743"/>
+          </a:xfrm>
+          <a:prstGeom prst="rect">
+            <a:avLst/>
+          </a:prstGeom>
+        </p:spPr>
+      </p:pic>
+    </p:spTree>
+    <p:extLst>
+      <p:ext uri="{BB962C8B-B14F-4D97-AF65-F5344CB8AC3E}">
+        <p14:creationId xmlns:p14="http://schemas.microsoft.com/office/powerpoint/2010/main" val="202850587"/>
+      </p:ext>
+    </p:extLst>
+  </p:cSld>
+  <p:clrMapOvr>
+    <a:masterClrMapping/>
+  </p:clrMapOvr>
+  <p:timing>
+    <p:tnLst>
+      <p:par>
+        <p:cTn id="1" dur="indefinite" restart="never" nodeType="tmRoot"/>
+      </p:par>
+    </p:tnLst>
+  </p:timing>
+</p:sld>
+</file>
+
+<file path=ppt/slides/slide33.xml><?xml version="1.0" encoding="utf-8"?>
+<p:sld xmlns:a="http://schemas.openxmlformats.org/drawingml/2006/main" xmlns:r="http://schemas.openxmlformats.org/officeDocument/2006/relationships" xmlns:p="http://schemas.openxmlformats.org/presentationml/2006/main">
+  <p:cSld>
+    <p:spTree>
+      <p:nvGrpSpPr>
+        <p:cNvPr id="1" name=""/>
+        <p:cNvGrpSpPr/>
+        <p:nvPr/>
+      </p:nvGrpSpPr>
+      <p:grpSpPr>
+        <a:xfrm>
+          <a:off x="0" y="0"/>
+          <a:ext cx="0" cy="0"/>
+          <a:chOff x="0" y="0"/>
+          <a:chExt cx="0" cy="0"/>
+        </a:xfrm>
+      </p:grpSpPr>
+      <p:sp>
+        <p:nvSpPr>
+          <p:cNvPr id="6" name="Rectangle 5"/>
+          <p:cNvSpPr/>
+          <p:nvPr/>
+        </p:nvSpPr>
+        <p:spPr>
+          <a:xfrm>
+            <a:off x="210392" y="3123175"/>
+            <a:ext cx="8744983" cy="707886"/>
+          </a:xfrm>
+          <a:prstGeom prst="rect">
+            <a:avLst/>
+          </a:prstGeom>
+        </p:spPr>
+        <p:txBody>
+          <a:bodyPr wrap="square">
+            <a:spAutoFit/>
+          </a:bodyPr>
+          <a:lstStyle/>
+          <a:p>
+            <a:pPr algn="ctr"/>
+            <a:r>
+              <a:rPr lang="tr-TR" sz="4000" b="1" dirty="0" err="1" smtClean="0">
+                <a:solidFill>
+                  <a:srgbClr val="002060"/>
+                </a:solidFill>
+                <a:cs typeface="Arial" panose="020B0604020202020204" pitchFamily="34" charset="0"/>
+              </a:rPr>
+              <a:t>Thank</a:t>
+            </a:r>
+            <a:r>
+              <a:rPr lang="tr-TR" sz="4000" b="1" dirty="0" smtClean="0">
+                <a:solidFill>
+                  <a:srgbClr val="002060"/>
+                </a:solidFill>
+                <a:cs typeface="Arial" panose="020B0604020202020204" pitchFamily="34" charset="0"/>
+              </a:rPr>
+              <a:t> </a:t>
+            </a:r>
+            <a:r>
+              <a:rPr lang="tr-TR" sz="4000" b="1" dirty="0" err="1" smtClean="0">
+                <a:solidFill>
+                  <a:srgbClr val="002060"/>
+                </a:solidFill>
+                <a:cs typeface="Arial" panose="020B0604020202020204" pitchFamily="34" charset="0"/>
+              </a:rPr>
+              <a:t>you</a:t>
+            </a:r>
+            <a:r>
+              <a:rPr lang="tr-TR" sz="4000" b="1" dirty="0" smtClean="0">
+                <a:solidFill>
+                  <a:srgbClr val="002060"/>
+                </a:solidFill>
+                <a:cs typeface="Arial" panose="020B0604020202020204" pitchFamily="34" charset="0"/>
+              </a:rPr>
+              <a:t> !</a:t>
+            </a:r>
+            <a:endParaRPr lang="tr-TR" sz="4000" b="1" dirty="0">
+              <a:solidFill>
+                <a:srgbClr val="FF0000"/>
+              </a:solidFill>
+            </a:endParaRPr>
+          </a:p>
+        </p:txBody>
+      </p:sp>
+      <p:pic>
+        <p:nvPicPr>
+          <p:cNvPr id="4" name="Picture 3" descr="C:\Users\ugurm\Desktop\gitthub\IMMD\GRW2017\Metu5.png"/>
+          <p:cNvPicPr/>
+          <p:nvPr/>
+        </p:nvPicPr>
+        <p:blipFill rotWithShape="1">
+          <a:blip r:embed="rId3" cstate="print">
+            <a:extLst>
+              <a:ext uri="{28A0092B-C50C-407E-A947-70E740481C1C}">
+                <a14:useLocalDpi xmlns:a14="http://schemas.microsoft.com/office/drawing/2010/main" val="0"/>
+              </a:ext>
+            </a:extLst>
+          </a:blip>
+          <a:srcRect l="14652" t="39667" r="15041" b="41051"/>
+          <a:stretch/>
+        </p:blipFill>
+        <p:spPr bwMode="auto">
+          <a:xfrm>
+            <a:off x="5716828" y="6097904"/>
+            <a:ext cx="3427172" cy="760096"/>
+          </a:xfrm>
+          <a:prstGeom prst="rect">
+            <a:avLst/>
+          </a:prstGeom>
+          <a:noFill/>
+          <a:ln>
+            <a:noFill/>
+          </a:ln>
+          <a:extLst>
+            <a:ext uri="{53640926-AAD7-44D8-BBD7-CCE9431645EC}">
+              <a14:shadowObscured xmlns:a14="http://schemas.microsoft.com/office/drawing/2010/main"/>
+            </a:ext>
+          </a:extLst>
+        </p:spPr>
+      </p:pic>
+      <p:sp>
+        <p:nvSpPr>
+          <p:cNvPr id="5" name="Rectangle 4"/>
+          <p:cNvSpPr/>
+          <p:nvPr/>
+        </p:nvSpPr>
+        <p:spPr>
+          <a:xfrm>
+            <a:off x="1" y="6360480"/>
+            <a:ext cx="3265714" cy="430887"/>
+          </a:xfrm>
+          <a:prstGeom prst="rect">
+            <a:avLst/>
+          </a:prstGeom>
+        </p:spPr>
+        <p:txBody>
+          <a:bodyPr wrap="square">
+            <a:spAutoFit/>
+          </a:bodyPr>
+          <a:lstStyle/>
+          <a:p>
+            <a:pPr algn="ctr"/>
+            <a:r>
+              <a:rPr lang="tr-TR" sz="2200" b="1" i="1" dirty="0" smtClean="0">
+                <a:solidFill>
+                  <a:schemeClr val="bg2">
+                    <a:lumMod val="50000"/>
+                  </a:schemeClr>
+                </a:solidFill>
+                <a:cs typeface="Arial" panose="020B0604020202020204" pitchFamily="34" charset="0"/>
+                <a:hlinkClick r:id="rId4"/>
+              </a:rPr>
+              <a:t>m</a:t>
+            </a:r>
+            <a:r>
+              <a:rPr lang="en-US" sz="2200" b="1" i="1" dirty="0" err="1" smtClean="0">
+                <a:solidFill>
+                  <a:schemeClr val="bg2">
+                    <a:lumMod val="50000"/>
+                  </a:schemeClr>
+                </a:solidFill>
+                <a:cs typeface="Arial" panose="020B0604020202020204" pitchFamily="34" charset="0"/>
+                <a:hlinkClick r:id="rId4"/>
+              </a:rPr>
+              <a:t>esut.ugur</a:t>
+            </a:r>
+            <a:r>
+              <a:rPr lang="tr-TR" sz="2200" b="1" i="1" dirty="0" smtClean="0">
+                <a:solidFill>
+                  <a:schemeClr val="bg2">
+                    <a:lumMod val="50000"/>
+                  </a:schemeClr>
+                </a:solidFill>
+                <a:cs typeface="Arial" panose="020B0604020202020204" pitchFamily="34" charset="0"/>
+                <a:hlinkClick r:id="rId4"/>
+              </a:rPr>
+              <a:t>@</a:t>
+            </a:r>
+            <a:r>
+              <a:rPr lang="en-US" sz="2200" b="1" i="1" dirty="0" smtClean="0">
+                <a:solidFill>
+                  <a:schemeClr val="bg2">
+                    <a:lumMod val="50000"/>
+                  </a:schemeClr>
+                </a:solidFill>
+                <a:cs typeface="Arial" panose="020B0604020202020204" pitchFamily="34" charset="0"/>
+                <a:hlinkClick r:id="rId4"/>
+              </a:rPr>
+              <a:t>metu.edu.tr</a:t>
+            </a:r>
+            <a:endParaRPr lang="en-US" sz="2200" i="1" dirty="0">
+              <a:solidFill>
+                <a:schemeClr val="bg2">
+                  <a:lumMod val="50000"/>
+                </a:schemeClr>
+              </a:solidFill>
+              <a:cs typeface="Arial" panose="020B0604020202020204" pitchFamily="34" charset="0"/>
+            </a:endParaRPr>
+          </a:p>
+        </p:txBody>
+      </p:sp>
+    </p:spTree>
+    <p:extLst>
+      <p:ext uri="{BB962C8B-B14F-4D97-AF65-F5344CB8AC3E}">
+        <p14:creationId xmlns:p14="http://schemas.microsoft.com/office/powerpoint/2010/main" val="1036085452"/>
       </p:ext>
     </p:extLst>
   </p:cSld>

</xml_diff>